<commit_message>
Soccer betting app working, MVVM folders cleaned
</commit_message>
<xml_diff>
--- a/SoccerBettingApp/Presentation/Soccer Betting APP Presentation.pptx
+++ b/SoccerBettingApp/Presentation/Soccer Betting APP Presentation.pptx
@@ -5,10 +5,10 @@
     <p:sldMasterId id="2147483648" r:id="rId4"/>
   </p:sldMasterIdLst>
   <p:notesMasterIdLst>
-    <p:notesMasterId r:id="rId18"/>
+    <p:notesMasterId r:id="rId20"/>
   </p:notesMasterIdLst>
   <p:handoutMasterIdLst>
-    <p:handoutMasterId r:id="rId19"/>
+    <p:handoutMasterId r:id="rId21"/>
   </p:handoutMasterIdLst>
   <p:sldIdLst>
     <p:sldId id="268" r:id="rId5"/>
@@ -17,13 +17,15 @@
     <p:sldId id="261" r:id="rId8"/>
     <p:sldId id="325" r:id="rId9"/>
     <p:sldId id="332" r:id="rId10"/>
-    <p:sldId id="317" r:id="rId11"/>
-    <p:sldId id="328" r:id="rId12"/>
-    <p:sldId id="329" r:id="rId13"/>
-    <p:sldId id="318" r:id="rId14"/>
-    <p:sldId id="331" r:id="rId15"/>
-    <p:sldId id="321" r:id="rId16"/>
-    <p:sldId id="293" r:id="rId17"/>
+    <p:sldId id="333" r:id="rId11"/>
+    <p:sldId id="334" r:id="rId12"/>
+    <p:sldId id="317" r:id="rId13"/>
+    <p:sldId id="328" r:id="rId14"/>
+    <p:sldId id="329" r:id="rId15"/>
+    <p:sldId id="318" r:id="rId16"/>
+    <p:sldId id="331" r:id="rId17"/>
+    <p:sldId id="321" r:id="rId18"/>
+    <p:sldId id="293" r:id="rId19"/>
   </p:sldIdLst>
   <p:sldSz cx="12192000" cy="6858000"/>
   <p:notesSz cx="6858000" cy="9144000"/>
@@ -829,7 +831,7 @@
     </p:spTree>
     <p:extLst>
       <p:ext uri="{BB962C8B-B14F-4D97-AF65-F5344CB8AC3E}">
-        <p14:creationId xmlns:p14="http://schemas.microsoft.com/office/powerpoint/2010/main" val="2866502394"/>
+        <p14:creationId xmlns:p14="http://schemas.microsoft.com/office/powerpoint/2010/main" val="3657124793"/>
       </p:ext>
     </p:extLst>
   </p:cSld>
@@ -913,7 +915,7 @@
     </p:spTree>
     <p:extLst>
       <p:ext uri="{BB962C8B-B14F-4D97-AF65-F5344CB8AC3E}">
-        <p14:creationId xmlns:p14="http://schemas.microsoft.com/office/powerpoint/2010/main" val="4286758428"/>
+        <p14:creationId xmlns:p14="http://schemas.microsoft.com/office/powerpoint/2010/main" val="848025919"/>
       </p:ext>
     </p:extLst>
   </p:cSld>
@@ -997,7 +999,7 @@
     </p:spTree>
     <p:extLst>
       <p:ext uri="{BB962C8B-B14F-4D97-AF65-F5344CB8AC3E}">
-        <p14:creationId xmlns:p14="http://schemas.microsoft.com/office/powerpoint/2010/main" val="1268660428"/>
+        <p14:creationId xmlns:p14="http://schemas.microsoft.com/office/powerpoint/2010/main" val="2866502394"/>
       </p:ext>
     </p:extLst>
   </p:cSld>
@@ -1073,6 +1075,174 @@
             <a:fld id="{9C900A82-9926-4DBA-8BA5-A22EEB8ACF8E}" type="slidenum">
               <a:rPr lang="en-US" smtClean="0"/>
               <a:t>13</a:t>
+            </a:fld>
+            <a:endParaRPr lang="en-US" dirty="0"/>
+          </a:p>
+        </p:txBody>
+      </p:sp>
+    </p:spTree>
+    <p:extLst>
+      <p:ext uri="{BB962C8B-B14F-4D97-AF65-F5344CB8AC3E}">
+        <p14:creationId xmlns:p14="http://schemas.microsoft.com/office/powerpoint/2010/main" val="4286758428"/>
+      </p:ext>
+    </p:extLst>
+  </p:cSld>
+  <p:clrMapOvr>
+    <a:masterClrMapping/>
+  </p:clrMapOvr>
+</p:notes>
+</file>
+
+<file path=ppt/notesSlides/notesSlide14.xml><?xml version="1.0" encoding="utf-8"?>
+<p:notes xmlns:a="http://schemas.openxmlformats.org/drawingml/2006/main" xmlns:r="http://schemas.openxmlformats.org/officeDocument/2006/relationships" xmlns:p="http://schemas.openxmlformats.org/presentationml/2006/main">
+  <p:cSld>
+    <p:spTree>
+      <p:nvGrpSpPr>
+        <p:cNvPr id="1" name=""/>
+        <p:cNvGrpSpPr/>
+        <p:nvPr/>
+      </p:nvGrpSpPr>
+      <p:grpSpPr>
+        <a:xfrm>
+          <a:off x="0" y="0"/>
+          <a:ext cx="0" cy="0"/>
+          <a:chOff x="0" y="0"/>
+          <a:chExt cx="0" cy="0"/>
+        </a:xfrm>
+      </p:grpSpPr>
+      <p:sp>
+        <p:nvSpPr>
+          <p:cNvPr id="2" name="Slide Image Placeholder 1"/>
+          <p:cNvSpPr>
+            <a:spLocks noGrp="1" noRot="1" noChangeAspect="1"/>
+          </p:cNvSpPr>
+          <p:nvPr>
+            <p:ph type="sldImg"/>
+          </p:nvPr>
+        </p:nvSpPr>
+        <p:spPr/>
+      </p:sp>
+      <p:sp>
+        <p:nvSpPr>
+          <p:cNvPr id="3" name="Notes Placeholder 2"/>
+          <p:cNvSpPr>
+            <a:spLocks noGrp="1"/>
+          </p:cNvSpPr>
+          <p:nvPr>
+            <p:ph type="body" idx="1"/>
+          </p:nvPr>
+        </p:nvSpPr>
+        <p:spPr/>
+        <p:txBody>
+          <a:bodyPr/>
+          <a:lstStyle/>
+          <a:p>
+            <a:endParaRPr lang="en-US" dirty="0"/>
+          </a:p>
+        </p:txBody>
+      </p:sp>
+      <p:sp>
+        <p:nvSpPr>
+          <p:cNvPr id="4" name="Slide Number Placeholder 3"/>
+          <p:cNvSpPr>
+            <a:spLocks noGrp="1"/>
+          </p:cNvSpPr>
+          <p:nvPr>
+            <p:ph type="sldNum" sz="quarter" idx="5"/>
+          </p:nvPr>
+        </p:nvSpPr>
+        <p:spPr/>
+        <p:txBody>
+          <a:bodyPr/>
+          <a:lstStyle/>
+          <a:p>
+            <a:fld id="{9C900A82-9926-4DBA-8BA5-A22EEB8ACF8E}" type="slidenum">
+              <a:rPr lang="en-US" smtClean="0"/>
+              <a:t>14</a:t>
+            </a:fld>
+            <a:endParaRPr lang="en-US" dirty="0"/>
+          </a:p>
+        </p:txBody>
+      </p:sp>
+    </p:spTree>
+    <p:extLst>
+      <p:ext uri="{BB962C8B-B14F-4D97-AF65-F5344CB8AC3E}">
+        <p14:creationId xmlns:p14="http://schemas.microsoft.com/office/powerpoint/2010/main" val="1268660428"/>
+      </p:ext>
+    </p:extLst>
+  </p:cSld>
+  <p:clrMapOvr>
+    <a:masterClrMapping/>
+  </p:clrMapOvr>
+</p:notes>
+</file>
+
+<file path=ppt/notesSlides/notesSlide15.xml><?xml version="1.0" encoding="utf-8"?>
+<p:notes xmlns:a="http://schemas.openxmlformats.org/drawingml/2006/main" xmlns:r="http://schemas.openxmlformats.org/officeDocument/2006/relationships" xmlns:p="http://schemas.openxmlformats.org/presentationml/2006/main">
+  <p:cSld>
+    <p:spTree>
+      <p:nvGrpSpPr>
+        <p:cNvPr id="1" name=""/>
+        <p:cNvGrpSpPr/>
+        <p:nvPr/>
+      </p:nvGrpSpPr>
+      <p:grpSpPr>
+        <a:xfrm>
+          <a:off x="0" y="0"/>
+          <a:ext cx="0" cy="0"/>
+          <a:chOff x="0" y="0"/>
+          <a:chExt cx="0" cy="0"/>
+        </a:xfrm>
+      </p:grpSpPr>
+      <p:sp>
+        <p:nvSpPr>
+          <p:cNvPr id="2" name="Slide Image Placeholder 1"/>
+          <p:cNvSpPr>
+            <a:spLocks noGrp="1" noRot="1" noChangeAspect="1"/>
+          </p:cNvSpPr>
+          <p:nvPr>
+            <p:ph type="sldImg"/>
+          </p:nvPr>
+        </p:nvSpPr>
+        <p:spPr/>
+      </p:sp>
+      <p:sp>
+        <p:nvSpPr>
+          <p:cNvPr id="3" name="Notes Placeholder 2"/>
+          <p:cNvSpPr>
+            <a:spLocks noGrp="1"/>
+          </p:cNvSpPr>
+          <p:nvPr>
+            <p:ph type="body" idx="1"/>
+          </p:nvPr>
+        </p:nvSpPr>
+        <p:spPr/>
+        <p:txBody>
+          <a:bodyPr/>
+          <a:lstStyle/>
+          <a:p>
+            <a:endParaRPr lang="en-US" dirty="0"/>
+          </a:p>
+        </p:txBody>
+      </p:sp>
+      <p:sp>
+        <p:nvSpPr>
+          <p:cNvPr id="4" name="Slide Number Placeholder 3"/>
+          <p:cNvSpPr>
+            <a:spLocks noGrp="1"/>
+          </p:cNvSpPr>
+          <p:nvPr>
+            <p:ph type="sldNum" sz="quarter" idx="5"/>
+          </p:nvPr>
+        </p:nvSpPr>
+        <p:spPr/>
+        <p:txBody>
+          <a:bodyPr/>
+          <a:lstStyle/>
+          <a:p>
+            <a:fld id="{9C900A82-9926-4DBA-8BA5-A22EEB8ACF8E}" type="slidenum">
+              <a:rPr lang="en-US" smtClean="0"/>
+              <a:t>15</a:t>
             </a:fld>
             <a:endParaRPr lang="en-US" dirty="0"/>
           </a:p>
@@ -1551,7 +1721,13 @@
   <p:cSld>
     <p:spTree>
       <p:nvGrpSpPr>
-        <p:cNvPr id="1" name=""/>
+        <p:cNvPr id="1" name="">
+          <a:extLst>
+            <a:ext uri="{FF2B5EF4-FFF2-40B4-BE49-F238E27FC236}">
+              <a16:creationId xmlns:a16="http://schemas.microsoft.com/office/drawing/2014/main" id="{9470D17F-D937-179A-75BD-6D80ABBB7C78}"/>
+            </a:ext>
+          </a:extLst>
+        </p:cNvPr>
         <p:cNvGrpSpPr/>
         <p:nvPr/>
       </p:nvGrpSpPr>
@@ -1565,7 +1741,13 @@
       </p:grpSpPr>
       <p:sp>
         <p:nvSpPr>
-          <p:cNvPr id="2" name="Slide Image Placeholder 1"/>
+          <p:cNvPr id="2" name="Slide Image Placeholder 1">
+            <a:extLst>
+              <a:ext uri="{FF2B5EF4-FFF2-40B4-BE49-F238E27FC236}">
+                <a16:creationId xmlns:a16="http://schemas.microsoft.com/office/drawing/2014/main" id="{9FDD7FD3-7AC1-CA84-6653-847221E912B5}"/>
+              </a:ext>
+            </a:extLst>
+          </p:cNvPr>
           <p:cNvSpPr>
             <a:spLocks noGrp="1" noRot="1" noChangeAspect="1"/>
           </p:cNvSpPr>
@@ -1577,7 +1759,13 @@
       </p:sp>
       <p:sp>
         <p:nvSpPr>
-          <p:cNvPr id="3" name="Notes Placeholder 2"/>
+          <p:cNvPr id="3" name="Notes Placeholder 2">
+            <a:extLst>
+              <a:ext uri="{FF2B5EF4-FFF2-40B4-BE49-F238E27FC236}">
+                <a16:creationId xmlns:a16="http://schemas.microsoft.com/office/drawing/2014/main" id="{8169064D-8644-39DC-DDF1-EFD74BD81875}"/>
+              </a:ext>
+            </a:extLst>
+          </p:cNvPr>
           <p:cNvSpPr>
             <a:spLocks noGrp="1"/>
           </p:cNvSpPr>
@@ -1596,7 +1784,13 @@
       </p:sp>
       <p:sp>
         <p:nvSpPr>
-          <p:cNvPr id="4" name="Slide Number Placeholder 3"/>
+          <p:cNvPr id="4" name="Slide Number Placeholder 3">
+            <a:extLst>
+              <a:ext uri="{FF2B5EF4-FFF2-40B4-BE49-F238E27FC236}">
+                <a16:creationId xmlns:a16="http://schemas.microsoft.com/office/drawing/2014/main" id="{8E8DCDF5-13A8-146E-B099-CB73909E9533}"/>
+              </a:ext>
+            </a:extLst>
+          </p:cNvPr>
           <p:cNvSpPr>
             <a:spLocks noGrp="1"/>
           </p:cNvSpPr>
@@ -1620,7 +1814,7 @@
     </p:spTree>
     <p:extLst>
       <p:ext uri="{BB962C8B-B14F-4D97-AF65-F5344CB8AC3E}">
-        <p14:creationId xmlns:p14="http://schemas.microsoft.com/office/powerpoint/2010/main" val="607878643"/>
+        <p14:creationId xmlns:p14="http://schemas.microsoft.com/office/powerpoint/2010/main" val="3119306549"/>
       </p:ext>
     </p:extLst>
   </p:cSld>
@@ -1635,7 +1829,13 @@
   <p:cSld>
     <p:spTree>
       <p:nvGrpSpPr>
-        <p:cNvPr id="1" name=""/>
+        <p:cNvPr id="1" name="">
+          <a:extLst>
+            <a:ext uri="{FF2B5EF4-FFF2-40B4-BE49-F238E27FC236}">
+              <a16:creationId xmlns:a16="http://schemas.microsoft.com/office/drawing/2014/main" id="{D0DBE20C-AE58-CB43-23E2-EDE5BB7124D8}"/>
+            </a:ext>
+          </a:extLst>
+        </p:cNvPr>
         <p:cNvGrpSpPr/>
         <p:nvPr/>
       </p:nvGrpSpPr>
@@ -1649,7 +1849,13 @@
       </p:grpSpPr>
       <p:sp>
         <p:nvSpPr>
-          <p:cNvPr id="2" name="Slide Image Placeholder 1"/>
+          <p:cNvPr id="2" name="Slide Image Placeholder 1">
+            <a:extLst>
+              <a:ext uri="{FF2B5EF4-FFF2-40B4-BE49-F238E27FC236}">
+                <a16:creationId xmlns:a16="http://schemas.microsoft.com/office/drawing/2014/main" id="{457EAAF8-DE41-134C-E239-B823C6B208B2}"/>
+              </a:ext>
+            </a:extLst>
+          </p:cNvPr>
           <p:cNvSpPr>
             <a:spLocks noGrp="1" noRot="1" noChangeAspect="1"/>
           </p:cNvSpPr>
@@ -1661,7 +1867,13 @@
       </p:sp>
       <p:sp>
         <p:nvSpPr>
-          <p:cNvPr id="3" name="Notes Placeholder 2"/>
+          <p:cNvPr id="3" name="Notes Placeholder 2">
+            <a:extLst>
+              <a:ext uri="{FF2B5EF4-FFF2-40B4-BE49-F238E27FC236}">
+                <a16:creationId xmlns:a16="http://schemas.microsoft.com/office/drawing/2014/main" id="{30B242CD-7DF4-DE48-BD82-96ABFF4B9A8B}"/>
+              </a:ext>
+            </a:extLst>
+          </p:cNvPr>
           <p:cNvSpPr>
             <a:spLocks noGrp="1"/>
           </p:cNvSpPr>
@@ -1680,7 +1892,13 @@
       </p:sp>
       <p:sp>
         <p:nvSpPr>
-          <p:cNvPr id="4" name="Slide Number Placeholder 3"/>
+          <p:cNvPr id="4" name="Slide Number Placeholder 3">
+            <a:extLst>
+              <a:ext uri="{FF2B5EF4-FFF2-40B4-BE49-F238E27FC236}">
+                <a16:creationId xmlns:a16="http://schemas.microsoft.com/office/drawing/2014/main" id="{BC54F47F-EBC7-8EF9-F9E4-CA837AD10083}"/>
+              </a:ext>
+            </a:extLst>
+          </p:cNvPr>
           <p:cNvSpPr>
             <a:spLocks noGrp="1"/>
           </p:cNvSpPr>
@@ -1704,7 +1922,7 @@
     </p:spTree>
     <p:extLst>
       <p:ext uri="{BB962C8B-B14F-4D97-AF65-F5344CB8AC3E}">
-        <p14:creationId xmlns:p14="http://schemas.microsoft.com/office/powerpoint/2010/main" val="3657124793"/>
+        <p14:creationId xmlns:p14="http://schemas.microsoft.com/office/powerpoint/2010/main" val="1320385941"/>
       </p:ext>
     </p:extLst>
   </p:cSld>
@@ -1788,7 +2006,7 @@
     </p:spTree>
     <p:extLst>
       <p:ext uri="{BB962C8B-B14F-4D97-AF65-F5344CB8AC3E}">
-        <p14:creationId xmlns:p14="http://schemas.microsoft.com/office/powerpoint/2010/main" val="848025919"/>
+        <p14:creationId xmlns:p14="http://schemas.microsoft.com/office/powerpoint/2010/main" val="607878643"/>
       </p:ext>
     </p:extLst>
   </p:cSld>
@@ -10547,6 +10765,644 @@
           <p:cNvPr id="2" name="Title 1">
             <a:extLst>
               <a:ext uri="{FF2B5EF4-FFF2-40B4-BE49-F238E27FC236}">
+                <a16:creationId xmlns:a16="http://schemas.microsoft.com/office/drawing/2014/main" id="{A0952A0C-ED2A-077C-70BC-DEB140E04A7B}"/>
+              </a:ext>
+            </a:extLst>
+          </p:cNvPr>
+          <p:cNvSpPr>
+            <a:spLocks noGrp="1"/>
+          </p:cNvSpPr>
+          <p:nvPr>
+            <p:ph type="title"/>
+          </p:nvPr>
+        </p:nvSpPr>
+        <p:spPr>
+          <a:xfrm>
+            <a:off x="677334" y="694944"/>
+            <a:ext cx="3789177" cy="4572000"/>
+          </a:xfrm>
+        </p:spPr>
+        <p:txBody>
+          <a:bodyPr/>
+          <a:lstStyle/>
+          <a:p>
+            <a:r>
+              <a:rPr lang="en-US" dirty="0"/>
+              <a:t>Financial overview</a:t>
+            </a:r>
+          </a:p>
+        </p:txBody>
+      </p:sp>
+      <p:sp>
+        <p:nvSpPr>
+          <p:cNvPr id="3" name="Content Placeholder 2">
+            <a:extLst>
+              <a:ext uri="{FF2B5EF4-FFF2-40B4-BE49-F238E27FC236}">
+                <a16:creationId xmlns:a16="http://schemas.microsoft.com/office/drawing/2014/main" id="{8E9FC3B2-3EF0-BDB4-4819-4161FC7EEF1A}"/>
+              </a:ext>
+            </a:extLst>
+          </p:cNvPr>
+          <p:cNvSpPr>
+            <a:spLocks noGrp="1"/>
+          </p:cNvSpPr>
+          <p:nvPr>
+            <p:ph idx="1"/>
+          </p:nvPr>
+        </p:nvSpPr>
+        <p:spPr>
+          <a:xfrm>
+            <a:off x="5753101" y="862641"/>
+            <a:ext cx="4339805" cy="2566357"/>
+          </a:xfrm>
+        </p:spPr>
+        <p:txBody>
+          <a:bodyPr/>
+          <a:lstStyle/>
+          <a:p>
+            <a:r>
+              <a:rPr lang="en-US" dirty="0"/>
+              <a:t>Our financial overview reflects a robust and resilient fiscal performance.</a:t>
+            </a:r>
+          </a:p>
+          <a:p>
+            <a:r>
+              <a:rPr lang="en-US" dirty="0"/>
+              <a:t>Key indicators show consistent revenue growth over the past quarter, attributed to strategic cost management and successful marketing.</a:t>
+            </a:r>
+          </a:p>
+        </p:txBody>
+      </p:sp>
+      <p:sp>
+        <p:nvSpPr>
+          <p:cNvPr id="4" name="Content Placeholder 3">
+            <a:extLst>
+              <a:ext uri="{FF2B5EF4-FFF2-40B4-BE49-F238E27FC236}">
+                <a16:creationId xmlns:a16="http://schemas.microsoft.com/office/drawing/2014/main" id="{8F149607-A897-2741-D897-4F179735F7A3}"/>
+              </a:ext>
+            </a:extLst>
+          </p:cNvPr>
+          <p:cNvSpPr>
+            <a:spLocks noGrp="1"/>
+          </p:cNvSpPr>
+          <p:nvPr>
+            <p:ph idx="12"/>
+          </p:nvPr>
+        </p:nvSpPr>
+        <p:spPr>
+          <a:xfrm>
+            <a:off x="5753101" y="3657818"/>
+            <a:ext cx="4339805" cy="2734053"/>
+          </a:xfrm>
+        </p:spPr>
+        <p:txBody>
+          <a:bodyPr/>
+          <a:lstStyle/>
+          <a:p>
+            <a:r>
+              <a:rPr lang="en-US" dirty="0"/>
+              <a:t>Operating margins have improved, signaling operational efficiency, while strengthening our reserves.</a:t>
+            </a:r>
+          </a:p>
+          <a:p>
+            <a:r>
+              <a:rPr lang="en-US" dirty="0"/>
+              <a:t>This underscores our commitment to financial stability, positioning us for sustained growth. </a:t>
+            </a:r>
+          </a:p>
+        </p:txBody>
+      </p:sp>
+    </p:spTree>
+    <p:extLst>
+      <p:ext uri="{BB962C8B-B14F-4D97-AF65-F5344CB8AC3E}">
+        <p14:creationId xmlns:p14="http://schemas.microsoft.com/office/powerpoint/2010/main" val="3513107352"/>
+      </p:ext>
+    </p:extLst>
+  </p:cSld>
+  <p:clrMapOvr>
+    <a:masterClrMapping/>
+  </p:clrMapOvr>
+</p:sld>
+</file>
+
+<file path=ppt/slides/slide11.xml><?xml version="1.0" encoding="utf-8"?>
+<p:sld xmlns:a="http://schemas.openxmlformats.org/drawingml/2006/main" xmlns:r="http://schemas.openxmlformats.org/officeDocument/2006/relationships" xmlns:p="http://schemas.openxmlformats.org/presentationml/2006/main">
+  <p:cSld>
+    <p:spTree>
+      <p:nvGrpSpPr>
+        <p:cNvPr id="1" name=""/>
+        <p:cNvGrpSpPr/>
+        <p:nvPr/>
+      </p:nvGrpSpPr>
+      <p:grpSpPr>
+        <a:xfrm>
+          <a:off x="0" y="0"/>
+          <a:ext cx="0" cy="0"/>
+          <a:chOff x="0" y="0"/>
+          <a:chExt cx="0" cy="0"/>
+        </a:xfrm>
+      </p:grpSpPr>
+      <p:sp>
+        <p:nvSpPr>
+          <p:cNvPr id="3" name="Title 2">
+            <a:extLst>
+              <a:ext uri="{FF2B5EF4-FFF2-40B4-BE49-F238E27FC236}">
+                <a16:creationId xmlns:a16="http://schemas.microsoft.com/office/drawing/2014/main" id="{2633516D-AB15-124A-1833-DD5D9DE9CF65}"/>
+              </a:ext>
+            </a:extLst>
+          </p:cNvPr>
+          <p:cNvSpPr>
+            <a:spLocks noGrp="1"/>
+          </p:cNvSpPr>
+          <p:nvPr>
+            <p:ph type="title"/>
+          </p:nvPr>
+        </p:nvSpPr>
+        <p:spPr>
+          <a:xfrm>
+            <a:off x="677334" y="694945"/>
+            <a:ext cx="10058400" cy="1280160"/>
+          </a:xfrm>
+        </p:spPr>
+        <p:txBody>
+          <a:bodyPr/>
+          <a:lstStyle/>
+          <a:p>
+            <a:r>
+              <a:rPr lang="en-US" dirty="0"/>
+              <a:t>Quarterly targets</a:t>
+            </a:r>
+          </a:p>
+        </p:txBody>
+      </p:sp>
+      <p:sp>
+        <p:nvSpPr>
+          <p:cNvPr id="4" name="Content Placeholder 3">
+            <a:extLst>
+              <a:ext uri="{FF2B5EF4-FFF2-40B4-BE49-F238E27FC236}">
+                <a16:creationId xmlns:a16="http://schemas.microsoft.com/office/drawing/2014/main" id="{C69773C3-E729-93EA-2151-22EB12BF1BE0}"/>
+              </a:ext>
+            </a:extLst>
+          </p:cNvPr>
+          <p:cNvSpPr>
+            <a:spLocks noGrp="1"/>
+          </p:cNvSpPr>
+          <p:nvPr>
+            <p:ph sz="quarter" idx="13"/>
+          </p:nvPr>
+        </p:nvSpPr>
+        <p:spPr>
+          <a:xfrm>
+            <a:off x="686741" y="2140864"/>
+            <a:ext cx="3797114" cy="3494753"/>
+          </a:xfrm>
+        </p:spPr>
+        <p:txBody>
+          <a:bodyPr/>
+          <a:lstStyle/>
+          <a:p>
+            <a:r>
+              <a:rPr lang="en-US" dirty="0"/>
+              <a:t>Market expansion</a:t>
+            </a:r>
+          </a:p>
+          <a:p>
+            <a:r>
+              <a:rPr lang="en-US" dirty="0"/>
+              <a:t>Product innovation</a:t>
+            </a:r>
+          </a:p>
+          <a:p>
+            <a:r>
+              <a:rPr lang="en-US" dirty="0"/>
+              <a:t>Customer retention</a:t>
+            </a:r>
+          </a:p>
+          <a:p>
+            <a:r>
+              <a:rPr lang="en-US" dirty="0"/>
+              <a:t>Operational efficiency</a:t>
+            </a:r>
+          </a:p>
+          <a:p>
+            <a:endParaRPr lang="en-US" dirty="0"/>
+          </a:p>
+        </p:txBody>
+      </p:sp>
+      <p:graphicFrame>
+        <p:nvGraphicFramePr>
+          <p:cNvPr id="5" name="Table Placeholder 2">
+            <a:extLst>
+              <a:ext uri="{FF2B5EF4-FFF2-40B4-BE49-F238E27FC236}">
+                <a16:creationId xmlns:a16="http://schemas.microsoft.com/office/drawing/2014/main" id="{75268C26-696B-469B-6E84-E2DA897FB4F4}"/>
+              </a:ext>
+            </a:extLst>
+          </p:cNvPr>
+          <p:cNvGraphicFramePr>
+            <a:graphicFrameLocks noGrp="1"/>
+          </p:cNvGraphicFramePr>
+          <p:nvPr>
+            <p:ph type="tbl" sz="quarter" idx="14"/>
+            <p:extLst>
+              <p:ext uri="{D42A27DB-BD31-4B8C-83A1-F6EECF244321}">
+                <p14:modId xmlns:p14="http://schemas.microsoft.com/office/powerpoint/2010/main" val="1368234980"/>
+              </p:ext>
+            </p:extLst>
+          </p:nvPr>
+        </p:nvGraphicFramePr>
+        <p:xfrm>
+          <a:off x="5054600" y="2103438"/>
+          <a:ext cx="6451600" cy="3524216"/>
+        </p:xfrm>
+        <a:graphic>
+          <a:graphicData uri="http://schemas.openxmlformats.org/drawingml/2006/table">
+            <a:tbl>
+              <a:tblPr firstRow="1" bandRow="1">
+                <a:tableStyleId>{7E9639D4-E3E2-4D34-9284-5A2195B3D0D7}</a:tableStyleId>
+              </a:tblPr>
+              <a:tblGrid>
+                <a:gridCol w="1612900">
+                  <a:extLst>
+                    <a:ext uri="{9D8B030D-6E8A-4147-A177-3AD203B41FA5}">
+                      <a16:colId xmlns:a16="http://schemas.microsoft.com/office/drawing/2014/main" val="30750867"/>
+                    </a:ext>
+                  </a:extLst>
+                </a:gridCol>
+                <a:gridCol w="1612900">
+                  <a:extLst>
+                    <a:ext uri="{9D8B030D-6E8A-4147-A177-3AD203B41FA5}">
+                      <a16:colId xmlns:a16="http://schemas.microsoft.com/office/drawing/2014/main" val="1038941322"/>
+                    </a:ext>
+                  </a:extLst>
+                </a:gridCol>
+                <a:gridCol w="1612900">
+                  <a:extLst>
+                    <a:ext uri="{9D8B030D-6E8A-4147-A177-3AD203B41FA5}">
+                      <a16:colId xmlns:a16="http://schemas.microsoft.com/office/drawing/2014/main" val="529645500"/>
+                    </a:ext>
+                  </a:extLst>
+                </a:gridCol>
+                <a:gridCol w="1612900">
+                  <a:extLst>
+                    <a:ext uri="{9D8B030D-6E8A-4147-A177-3AD203B41FA5}">
+                      <a16:colId xmlns:a16="http://schemas.microsoft.com/office/drawing/2014/main" val="3469610457"/>
+                    </a:ext>
+                  </a:extLst>
+                </a:gridCol>
+              </a:tblGrid>
+              <a:tr h="930012">
+                <a:tc>
+                  <a:txBody>
+                    <a:bodyPr/>
+                    <a:lstStyle/>
+                    <a:p>
+                      <a:pPr algn="ctr"/>
+                      <a:r>
+                        <a:rPr lang="en-US" dirty="0"/>
+                        <a:t>Quarter</a:t>
+                      </a:r>
+                    </a:p>
+                  </a:txBody>
+                  <a:tcPr anchor="ctr"/>
+                </a:tc>
+                <a:tc>
+                  <a:txBody>
+                    <a:bodyPr/>
+                    <a:lstStyle/>
+                    <a:p>
+                      <a:pPr algn="ctr"/>
+                      <a:r>
+                        <a:rPr lang="en-US" dirty="0"/>
+                        <a:t>Revenue growth (%)</a:t>
+                      </a:r>
+                    </a:p>
+                  </a:txBody>
+                  <a:tcPr anchor="ctr"/>
+                </a:tc>
+                <a:tc>
+                  <a:txBody>
+                    <a:bodyPr/>
+                    <a:lstStyle/>
+                    <a:p>
+                      <a:pPr algn="ctr"/>
+                      <a:r>
+                        <a:rPr lang="en-US" dirty="0"/>
+                        <a:t>Market share increase (%)</a:t>
+                      </a:r>
+                    </a:p>
+                  </a:txBody>
+                  <a:tcPr anchor="ctr"/>
+                </a:tc>
+                <a:tc>
+                  <a:txBody>
+                    <a:bodyPr/>
+                    <a:lstStyle/>
+                    <a:p>
+                      <a:pPr algn="ctr"/>
+                      <a:r>
+                        <a:rPr lang="en-US" dirty="0"/>
+                        <a:t>Customer acquisition</a:t>
+                      </a:r>
+                    </a:p>
+                  </a:txBody>
+                  <a:tcPr anchor="ctr"/>
+                </a:tc>
+                <a:extLst>
+                  <a:ext uri="{0D108BD9-81ED-4DB2-BD59-A6C34878D82A}">
+                    <a16:rowId xmlns:a16="http://schemas.microsoft.com/office/drawing/2014/main" val="4251432886"/>
+                  </a:ext>
+                </a:extLst>
+              </a:tr>
+              <a:tr h="648551">
+                <a:tc>
+                  <a:txBody>
+                    <a:bodyPr/>
+                    <a:lstStyle/>
+                    <a:p>
+                      <a:pPr algn="ctr"/>
+                      <a:r>
+                        <a:rPr lang="en-US" dirty="0"/>
+                        <a:t>Q1</a:t>
+                      </a:r>
+                    </a:p>
+                  </a:txBody>
+                  <a:tcPr anchor="ctr"/>
+                </a:tc>
+                <a:tc>
+                  <a:txBody>
+                    <a:bodyPr/>
+                    <a:lstStyle/>
+                    <a:p>
+                      <a:pPr algn="ctr"/>
+                      <a:r>
+                        <a:rPr lang="en-US" dirty="0"/>
+                        <a:t>12</a:t>
+                      </a:r>
+                    </a:p>
+                  </a:txBody>
+                  <a:tcPr anchor="ctr"/>
+                </a:tc>
+                <a:tc>
+                  <a:txBody>
+                    <a:bodyPr/>
+                    <a:lstStyle/>
+                    <a:p>
+                      <a:pPr algn="ctr"/>
+                      <a:r>
+                        <a:rPr lang="en-US" dirty="0"/>
+                        <a:t>2</a:t>
+                      </a:r>
+                    </a:p>
+                  </a:txBody>
+                  <a:tcPr anchor="ctr"/>
+                </a:tc>
+                <a:tc>
+                  <a:txBody>
+                    <a:bodyPr/>
+                    <a:lstStyle/>
+                    <a:p>
+                      <a:pPr algn="ctr"/>
+                      <a:r>
+                        <a:rPr lang="en-US" dirty="0"/>
+                        <a:t>500</a:t>
+                      </a:r>
+                    </a:p>
+                  </a:txBody>
+                  <a:tcPr anchor="ctr"/>
+                </a:tc>
+                <a:extLst>
+                  <a:ext uri="{0D108BD9-81ED-4DB2-BD59-A6C34878D82A}">
+                    <a16:rowId xmlns:a16="http://schemas.microsoft.com/office/drawing/2014/main" val="360240625"/>
+                  </a:ext>
+                </a:extLst>
+              </a:tr>
+              <a:tr h="648551">
+                <a:tc>
+                  <a:txBody>
+                    <a:bodyPr/>
+                    <a:lstStyle/>
+                    <a:p>
+                      <a:pPr algn="ctr"/>
+                      <a:r>
+                        <a:rPr lang="en-US" dirty="0"/>
+                        <a:t>Q2</a:t>
+                      </a:r>
+                    </a:p>
+                  </a:txBody>
+                  <a:tcPr anchor="ctr"/>
+                </a:tc>
+                <a:tc>
+                  <a:txBody>
+                    <a:bodyPr/>
+                    <a:lstStyle/>
+                    <a:p>
+                      <a:pPr algn="ctr"/>
+                      <a:r>
+                        <a:rPr lang="en-US" dirty="0"/>
+                        <a:t>15</a:t>
+                      </a:r>
+                    </a:p>
+                  </a:txBody>
+                  <a:tcPr anchor="ctr"/>
+                </a:tc>
+                <a:tc>
+                  <a:txBody>
+                    <a:bodyPr/>
+                    <a:lstStyle/>
+                    <a:p>
+                      <a:pPr algn="ctr"/>
+                      <a:r>
+                        <a:rPr lang="en-US" dirty="0"/>
+                        <a:t>3</a:t>
+                      </a:r>
+                    </a:p>
+                  </a:txBody>
+                  <a:tcPr anchor="ctr"/>
+                </a:tc>
+                <a:tc>
+                  <a:txBody>
+                    <a:bodyPr/>
+                    <a:lstStyle/>
+                    <a:p>
+                      <a:pPr algn="ctr"/>
+                      <a:r>
+                        <a:rPr lang="en-US" dirty="0"/>
+                        <a:t>600</a:t>
+                      </a:r>
+                    </a:p>
+                  </a:txBody>
+                  <a:tcPr anchor="ctr"/>
+                </a:tc>
+                <a:extLst>
+                  <a:ext uri="{0D108BD9-81ED-4DB2-BD59-A6C34878D82A}">
+                    <a16:rowId xmlns:a16="http://schemas.microsoft.com/office/drawing/2014/main" val="2762393470"/>
+                  </a:ext>
+                </a:extLst>
+              </a:tr>
+              <a:tr h="648551">
+                <a:tc>
+                  <a:txBody>
+                    <a:bodyPr/>
+                    <a:lstStyle/>
+                    <a:p>
+                      <a:pPr algn="ctr"/>
+                      <a:r>
+                        <a:rPr lang="en-US" dirty="0"/>
+                        <a:t>Q3</a:t>
+                      </a:r>
+                    </a:p>
+                  </a:txBody>
+                  <a:tcPr anchor="ctr"/>
+                </a:tc>
+                <a:tc>
+                  <a:txBody>
+                    <a:bodyPr/>
+                    <a:lstStyle/>
+                    <a:p>
+                      <a:pPr algn="ctr"/>
+                      <a:r>
+                        <a:rPr lang="en-US" dirty="0"/>
+                        <a:t>18</a:t>
+                      </a:r>
+                    </a:p>
+                  </a:txBody>
+                  <a:tcPr anchor="ctr"/>
+                </a:tc>
+                <a:tc>
+                  <a:txBody>
+                    <a:bodyPr/>
+                    <a:lstStyle/>
+                    <a:p>
+                      <a:pPr algn="ctr"/>
+                      <a:r>
+                        <a:rPr lang="en-US" dirty="0"/>
+                        <a:t>4</a:t>
+                      </a:r>
+                    </a:p>
+                  </a:txBody>
+                  <a:tcPr anchor="ctr"/>
+                </a:tc>
+                <a:tc>
+                  <a:txBody>
+                    <a:bodyPr/>
+                    <a:lstStyle/>
+                    <a:p>
+                      <a:pPr algn="ctr"/>
+                      <a:r>
+                        <a:rPr lang="en-US" dirty="0"/>
+                        <a:t>700</a:t>
+                      </a:r>
+                    </a:p>
+                  </a:txBody>
+                  <a:tcPr anchor="ctr"/>
+                </a:tc>
+                <a:extLst>
+                  <a:ext uri="{0D108BD9-81ED-4DB2-BD59-A6C34878D82A}">
+                    <a16:rowId xmlns:a16="http://schemas.microsoft.com/office/drawing/2014/main" val="1311364400"/>
+                  </a:ext>
+                </a:extLst>
+              </a:tr>
+              <a:tr h="648551">
+                <a:tc>
+                  <a:txBody>
+                    <a:bodyPr/>
+                    <a:lstStyle/>
+                    <a:p>
+                      <a:pPr algn="ctr"/>
+                      <a:r>
+                        <a:rPr lang="en-US" dirty="0"/>
+                        <a:t>Q4</a:t>
+                      </a:r>
+                    </a:p>
+                  </a:txBody>
+                  <a:tcPr anchor="ctr"/>
+                </a:tc>
+                <a:tc>
+                  <a:txBody>
+                    <a:bodyPr/>
+                    <a:lstStyle/>
+                    <a:p>
+                      <a:pPr algn="ctr"/>
+                      <a:r>
+                        <a:rPr lang="en-US" dirty="0"/>
+                        <a:t>20</a:t>
+                      </a:r>
+                    </a:p>
+                  </a:txBody>
+                  <a:tcPr anchor="ctr"/>
+                </a:tc>
+                <a:tc>
+                  <a:txBody>
+                    <a:bodyPr/>
+                    <a:lstStyle/>
+                    <a:p>
+                      <a:pPr algn="ctr"/>
+                      <a:r>
+                        <a:rPr lang="en-US" dirty="0"/>
+                        <a:t>5</a:t>
+                      </a:r>
+                    </a:p>
+                  </a:txBody>
+                  <a:tcPr anchor="ctr"/>
+                </a:tc>
+                <a:tc>
+                  <a:txBody>
+                    <a:bodyPr/>
+                    <a:lstStyle/>
+                    <a:p>
+                      <a:pPr algn="ctr"/>
+                      <a:r>
+                        <a:rPr lang="en-US" dirty="0"/>
+                        <a:t>800</a:t>
+                      </a:r>
+                    </a:p>
+                  </a:txBody>
+                  <a:tcPr anchor="ctr"/>
+                </a:tc>
+                <a:extLst>
+                  <a:ext uri="{0D108BD9-81ED-4DB2-BD59-A6C34878D82A}">
+                    <a16:rowId xmlns:a16="http://schemas.microsoft.com/office/drawing/2014/main" val="2526263980"/>
+                  </a:ext>
+                </a:extLst>
+              </a:tr>
+            </a:tbl>
+          </a:graphicData>
+        </a:graphic>
+      </p:graphicFrame>
+    </p:spTree>
+    <p:extLst>
+      <p:ext uri="{BB962C8B-B14F-4D97-AF65-F5344CB8AC3E}">
+        <p14:creationId xmlns:p14="http://schemas.microsoft.com/office/powerpoint/2010/main" val="3648998020"/>
+      </p:ext>
+    </p:extLst>
+  </p:cSld>
+  <p:clrMapOvr>
+    <a:masterClrMapping/>
+  </p:clrMapOvr>
+</p:sld>
+</file>
+
+<file path=ppt/slides/slide12.xml><?xml version="1.0" encoding="utf-8"?>
+<p:sld xmlns:a="http://schemas.openxmlformats.org/drawingml/2006/main" xmlns:r="http://schemas.openxmlformats.org/officeDocument/2006/relationships" xmlns:p="http://schemas.openxmlformats.org/presentationml/2006/main">
+  <p:cSld>
+    <p:spTree>
+      <p:nvGrpSpPr>
+        <p:cNvPr id="1" name=""/>
+        <p:cNvGrpSpPr/>
+        <p:nvPr/>
+      </p:nvGrpSpPr>
+      <p:grpSpPr>
+        <a:xfrm>
+          <a:off x="0" y="0"/>
+          <a:ext cx="0" cy="0"/>
+          <a:chOff x="0" y="0"/>
+          <a:chExt cx="0" cy="0"/>
+        </a:xfrm>
+      </p:grpSpPr>
+      <p:sp>
+        <p:nvSpPr>
+          <p:cNvPr id="2" name="Title 1">
+            <a:extLst>
+              <a:ext uri="{FF2B5EF4-FFF2-40B4-BE49-F238E27FC236}">
                 <a16:creationId xmlns:a16="http://schemas.microsoft.com/office/drawing/2014/main" id="{F23D827C-C581-E816-3880-8B429F22C0BC}"/>
               </a:ext>
             </a:extLst>
@@ -11031,7 +11887,7 @@
 </p:sld>
 </file>
 
-<file path=ppt/slides/slide11.xml><?xml version="1.0" encoding="utf-8"?>
+<file path=ppt/slides/slide13.xml><?xml version="1.0" encoding="utf-8"?>
 <p:sld xmlns:a="http://schemas.openxmlformats.org/drawingml/2006/main" xmlns:r="http://schemas.openxmlformats.org/officeDocument/2006/relationships" xmlns:p="http://schemas.openxmlformats.org/presentationml/2006/main">
   <p:cSld>
     <p:spTree>
@@ -11141,7 +11997,7 @@
 </p:sld>
 </file>
 
-<file path=ppt/slides/slide12.xml><?xml version="1.0" encoding="utf-8"?>
+<file path=ppt/slides/slide14.xml><?xml version="1.0" encoding="utf-8"?>
 <p:sld xmlns:a="http://schemas.openxmlformats.org/drawingml/2006/main" xmlns:r="http://schemas.openxmlformats.org/officeDocument/2006/relationships" xmlns:p="http://schemas.openxmlformats.org/presentationml/2006/main">
   <p:cSld>
     <p:spTree>
@@ -11300,7 +12156,7 @@
 </p:sld>
 </file>
 
-<file path=ppt/slides/slide13.xml><?xml version="1.0" encoding="utf-8"?>
+<file path=ppt/slides/slide15.xml><?xml version="1.0" encoding="utf-8"?>
 <p:sld xmlns:a="http://schemas.openxmlformats.org/drawingml/2006/main" xmlns:r="http://schemas.openxmlformats.org/officeDocument/2006/relationships" xmlns:p="http://schemas.openxmlformats.org/presentationml/2006/main">
   <p:cSld>
     <p:spTree>
@@ -11941,11 +12797,45 @@
           </a:bodyPr>
           <a:lstStyle/>
           <a:p>
+            <a:pPr algn="ctr"/>
+            <a:r>
+              <a:rPr lang="en-US" dirty="0"/>
+              <a:t>Models</a:t>
+            </a:r>
+            <a:br>
+              <a:rPr lang="en-US" dirty="0"/>
+            </a:br>
+            <a:br>
+              <a:rPr lang="en-US" dirty="0"/>
+            </a:br>
+            <a:r>
+              <a:rPr lang="en-US" dirty="0" err="1"/>
+              <a:t>Bet.cs</a:t>
+            </a:r>
+            <a:r>
+              <a:rPr lang="en-US" dirty="0"/>
+              <a:t> (go over properties)</a:t>
+            </a:r>
+            <a:br>
+              <a:rPr lang="en-US" dirty="0"/>
+            </a:br>
+            <a:br>
+              <a:rPr lang="en-US" dirty="0"/>
+            </a:br>
             <a:r>
               <a:rPr lang="en-US" dirty="0" err="1"/>
               <a:t>Match.cs</a:t>
             </a:r>
-            <a:endParaRPr lang="en-US" dirty="0"/>
+            <a:br>
+              <a:rPr lang="en-US" dirty="0"/>
+            </a:br>
+            <a:br>
+              <a:rPr lang="en-US" dirty="0"/>
+            </a:br>
+            <a:r>
+              <a:rPr lang="en-US" dirty="0"/>
+              <a:t>User(go over properties)</a:t>
+            </a:r>
           </a:p>
         </p:txBody>
       </p:sp>
@@ -11967,7 +12857,7 @@
         </p:nvSpPr>
         <p:spPr bwMode="auto">
           <a:xfrm>
-            <a:off x="5600480" y="1010459"/>
+            <a:off x="5591336" y="553259"/>
             <a:ext cx="4993457" cy="4017704"/>
           </a:xfrm>
           <a:prstGeom prst="rect">
@@ -11991,15 +12881,7 @@
             </a:r>
             <a:r>
               <a:rPr lang="en-US" altLang="en-US" dirty="0"/>
-              <a:t> </a:t>
-            </a:r>
-            <a:r>
-              <a:rPr lang="en-US" altLang="en-US"/>
-              <a:t>for automated </a:t>
-            </a:r>
-            <a:r>
-              <a:rPr lang="en-US" altLang="en-US" dirty="0"/>
-              <a:t>UI updates. </a:t>
+              <a:t> for automated UI updates. </a:t>
             </a:r>
           </a:p>
         </p:txBody>
@@ -12022,7 +12904,13 @@
   <p:cSld>
     <p:spTree>
       <p:nvGrpSpPr>
-        <p:cNvPr id="1" name=""/>
+        <p:cNvPr id="1" name="">
+          <a:extLst>
+            <a:ext uri="{FF2B5EF4-FFF2-40B4-BE49-F238E27FC236}">
+              <a16:creationId xmlns:a16="http://schemas.microsoft.com/office/drawing/2014/main" id="{0B6E1F65-D387-F120-2091-B522611D7E48}"/>
+            </a:ext>
+          </a:extLst>
+        </p:cNvPr>
         <p:cNvGrpSpPr/>
         <p:nvPr/>
       </p:nvGrpSpPr>
@@ -12036,10 +12924,10 @@
       </p:grpSpPr>
       <p:sp>
         <p:nvSpPr>
-          <p:cNvPr id="3" name="Title 2">
+          <p:cNvPr id="2" name="Title 1">
             <a:extLst>
               <a:ext uri="{FF2B5EF4-FFF2-40B4-BE49-F238E27FC236}">
-                <a16:creationId xmlns:a16="http://schemas.microsoft.com/office/drawing/2014/main" id="{5539E868-C38F-BE6F-C489-F81E4EA421B8}"/>
+                <a16:creationId xmlns:a16="http://schemas.microsoft.com/office/drawing/2014/main" id="{CB642380-3197-211E-B7F0-0DBE6EA32422}"/>
               </a:ext>
             </a:extLst>
           </p:cNvPr>
@@ -12051,121 +12939,72 @@
           </p:nvPr>
         </p:nvSpPr>
         <p:spPr>
-          <a:xfrm>
-            <a:off x="677334" y="694944"/>
-            <a:ext cx="5880629" cy="1690444"/>
-          </a:xfrm>
+          <a:noFill/>
         </p:spPr>
         <p:txBody>
-          <a:bodyPr/>
+          <a:bodyPr>
+            <a:noAutofit/>
+          </a:bodyPr>
           <a:lstStyle/>
           <a:p>
+            <a:pPr algn="ctr"/>
             <a:r>
               <a:rPr lang="en-US" dirty="0"/>
-              <a:t>Marketing strategies</a:t>
+              <a:t>Views</a:t>
+            </a:r>
+            <a:br>
+              <a:rPr lang="en-US" dirty="0"/>
+            </a:br>
+            <a:br>
+              <a:rPr lang="en-US" dirty="0"/>
+            </a:br>
+            <a:r>
+              <a:rPr lang="en-US" dirty="0"/>
+              <a:t>(go over each of them briefly)</a:t>
             </a:r>
           </a:p>
         </p:txBody>
       </p:sp>
       <p:sp>
         <p:nvSpPr>
-          <p:cNvPr id="2" name="Content Placeholder 1">
+          <p:cNvPr id="10" name="Rectangle 7">
             <a:extLst>
               <a:ext uri="{FF2B5EF4-FFF2-40B4-BE49-F238E27FC236}">
-                <a16:creationId xmlns:a16="http://schemas.microsoft.com/office/drawing/2014/main" id="{4AF53888-D548-07B3-4DD3-A6B963163C0C}"/>
+                <a16:creationId xmlns:a16="http://schemas.microsoft.com/office/drawing/2014/main" id="{A1C1BE06-0F91-DD9A-E228-32CF6DCC8410}"/>
               </a:ext>
             </a:extLst>
           </p:cNvPr>
           <p:cNvSpPr>
-            <a:spLocks noGrp="1"/>
+            <a:spLocks noGrp="1" noChangeArrowheads="1"/>
           </p:cNvSpPr>
           <p:nvPr>
-            <p:ph idx="14"/>
-          </p:nvPr>
-        </p:nvSpPr>
-        <p:spPr>
+            <p:ph idx="1"/>
+          </p:nvPr>
+        </p:nvSpPr>
+        <p:spPr bwMode="auto">
           <a:xfrm>
-            <a:off x="677334" y="2476239"/>
-            <a:ext cx="5880629" cy="3237948"/>
+            <a:off x="5591336" y="553259"/>
+            <a:ext cx="4993457" cy="4017704"/>
           </a:xfrm>
+          <a:prstGeom prst="rect">
+            <a:avLst/>
+          </a:prstGeom>
+          <a:noFill/>
         </p:spPr>
         <p:txBody>
-          <a:bodyPr/>
+          <a:bodyPr vert="horz" lIns="0" tIns="0" rIns="0" bIns="0" rtlCol="0" anchor="t" anchorCtr="0">
+            <a:normAutofit/>
+          </a:bodyPr>
           <a:lstStyle/>
           <a:p>
-            <a:r>
-              <a:rPr lang="en-US" dirty="0"/>
-              <a:t>Implement personalized engagement strategies</a:t>
-            </a:r>
-          </a:p>
-          <a:p>
-            <a:r>
-              <a:rPr lang="en-US" dirty="0"/>
-              <a:t>Tailor campaigns to resonate with specific demographics, fostering a sense of relevance and connection</a:t>
-            </a:r>
-          </a:p>
-          <a:p>
-            <a:r>
-              <a:rPr lang="en-US" dirty="0"/>
-              <a:t>Collaborate with influencers and thought leaders to amplify our brand message</a:t>
-            </a:r>
-          </a:p>
-          <a:p>
-            <a:endParaRPr lang="en-US" dirty="0"/>
+            <a:endParaRPr lang="en-US" altLang="en-US" dirty="0"/>
           </a:p>
         </p:txBody>
       </p:sp>
-      <p:pic>
-        <p:nvPicPr>
-          <p:cNvPr id="11" name="Picture Placeholder 10" descr="A person writing on a glass board">
-            <a:extLst>
-              <a:ext uri="{FF2B5EF4-FFF2-40B4-BE49-F238E27FC236}">
-                <a16:creationId xmlns:a16="http://schemas.microsoft.com/office/drawing/2014/main" id="{D78464A7-BA23-769A-56AD-2AE7CBC9CF8B}"/>
-              </a:ext>
-            </a:extLst>
-          </p:cNvPr>
-          <p:cNvPicPr>
-            <a:picLocks noGrp="1" noChangeAspect="1"/>
-          </p:cNvPicPr>
-          <p:nvPr>
-            <p:ph type="pic" sz="quarter" idx="15"/>
-          </p:nvPr>
-        </p:nvPicPr>
-        <p:blipFill>
-          <a:blip r:embed="rId3">
-            <a:duotone>
-              <a:schemeClr val="accent1">
-                <a:shade val="45000"/>
-                <a:satMod val="135000"/>
-              </a:schemeClr>
-              <a:prstClr val="white"/>
-            </a:duotone>
-            <a:extLst>
-              <a:ext uri="{BEBA8EAE-BF5A-486C-A8C5-ECC9F3942E4B}">
-                <a14:imgProps xmlns:a14="http://schemas.microsoft.com/office/drawing/2010/main">
-                  <a14:imgLayer r:embed="rId4">
-                    <a14:imgEffect>
-                      <a14:brightnessContrast bright="-20000"/>
-                    </a14:imgEffect>
-                  </a14:imgLayer>
-                </a14:imgProps>
-              </a:ext>
-            </a:extLst>
-          </a:blip>
-          <a:srcRect l="24873" r="24873"/>
-          <a:stretch/>
-        </p:blipFill>
-        <p:spPr>
-          <a:xfrm>
-            <a:off x="7018338" y="0"/>
-            <a:ext cx="5173662" cy="6858000"/>
-          </a:xfrm>
-        </p:spPr>
-      </p:pic>
     </p:spTree>
     <p:extLst>
       <p:ext uri="{BB962C8B-B14F-4D97-AF65-F5344CB8AC3E}">
-        <p14:creationId xmlns:p14="http://schemas.microsoft.com/office/powerpoint/2010/main" val="2203045136"/>
+        <p14:creationId xmlns:p14="http://schemas.microsoft.com/office/powerpoint/2010/main" val="4153612333"/>
       </p:ext>
     </p:extLst>
   </p:cSld>
@@ -12180,7 +13019,13 @@
   <p:cSld>
     <p:spTree>
       <p:nvGrpSpPr>
-        <p:cNvPr id="1" name=""/>
+        <p:cNvPr id="1" name="">
+          <a:extLst>
+            <a:ext uri="{FF2B5EF4-FFF2-40B4-BE49-F238E27FC236}">
+              <a16:creationId xmlns:a16="http://schemas.microsoft.com/office/drawing/2014/main" id="{4985D484-3F3A-DFF3-05FB-2E059421A08D}"/>
+            </a:ext>
+          </a:extLst>
+        </p:cNvPr>
         <p:cNvGrpSpPr/>
         <p:nvPr/>
       </p:nvGrpSpPr>
@@ -12197,7 +13042,7 @@
           <p:cNvPr id="2" name="Title 1">
             <a:extLst>
               <a:ext uri="{FF2B5EF4-FFF2-40B4-BE49-F238E27FC236}">
-                <a16:creationId xmlns:a16="http://schemas.microsoft.com/office/drawing/2014/main" id="{A0952A0C-ED2A-077C-70BC-DEB140E04A7B}"/>
+                <a16:creationId xmlns:a16="http://schemas.microsoft.com/office/drawing/2014/main" id="{6C29BDFC-005B-DA4D-AD04-C0B9AC102321}"/>
               </a:ext>
             </a:extLst>
           </p:cNvPr>
@@ -12209,104 +13054,95 @@
           </p:nvPr>
         </p:nvSpPr>
         <p:spPr>
-          <a:xfrm>
-            <a:off x="677334" y="694944"/>
-            <a:ext cx="3789177" cy="4572000"/>
-          </a:xfrm>
+          <a:noFill/>
         </p:spPr>
         <p:txBody>
-          <a:bodyPr/>
+          <a:bodyPr>
+            <a:noAutofit/>
+          </a:bodyPr>
           <a:lstStyle/>
           <a:p>
-            <a:r>
+            <a:pPr algn="ctr"/>
+            <a:r>
+              <a:rPr lang="en-US" dirty="0" err="1"/>
+              <a:t>ViewsModels</a:t>
+            </a:r>
+            <a:br>
               <a:rPr lang="en-US" dirty="0"/>
-              <a:t>Financial overview</a:t>
-            </a:r>
+            </a:br>
+            <a:br>
+              <a:rPr lang="en-US" dirty="0"/>
+            </a:br>
+            <a:r>
+              <a:rPr lang="en-US" dirty="0" err="1"/>
+              <a:t>baseviewmodel.cs</a:t>
+            </a:r>
+            <a:endParaRPr lang="en-US" dirty="0"/>
           </a:p>
         </p:txBody>
       </p:sp>
       <p:sp>
         <p:nvSpPr>
-          <p:cNvPr id="3" name="Content Placeholder 2">
+          <p:cNvPr id="10" name="Rectangle 7">
             <a:extLst>
               <a:ext uri="{FF2B5EF4-FFF2-40B4-BE49-F238E27FC236}">
-                <a16:creationId xmlns:a16="http://schemas.microsoft.com/office/drawing/2014/main" id="{8E9FC3B2-3EF0-BDB4-4819-4161FC7EEF1A}"/>
+                <a16:creationId xmlns:a16="http://schemas.microsoft.com/office/drawing/2014/main" id="{86AF83DE-1E0E-FCB2-615F-FF15E8D75486}"/>
               </a:ext>
             </a:extLst>
           </p:cNvPr>
           <p:cNvSpPr>
-            <a:spLocks noGrp="1"/>
+            <a:spLocks noGrp="1" noChangeArrowheads="1"/>
           </p:cNvSpPr>
           <p:nvPr>
             <p:ph idx="1"/>
           </p:nvPr>
         </p:nvSpPr>
-        <p:spPr>
+        <p:spPr bwMode="auto">
           <a:xfrm>
-            <a:off x="5753101" y="862641"/>
-            <a:ext cx="4339805" cy="2566357"/>
+            <a:off x="5591336" y="553259"/>
+            <a:ext cx="4993457" cy="4017704"/>
           </a:xfrm>
+          <a:prstGeom prst="rect">
+            <a:avLst/>
+          </a:prstGeom>
+          <a:noFill/>
         </p:spPr>
         <p:txBody>
-          <a:bodyPr/>
+          <a:bodyPr vert="horz" lIns="0" tIns="0" rIns="0" bIns="0" rtlCol="0" anchor="t" anchorCtr="0">
+            <a:normAutofit/>
+          </a:bodyPr>
           <a:lstStyle/>
           <a:p>
             <a:r>
+              <a:rPr lang="en-US" b="1" dirty="0" err="1"/>
+              <a:t>baseviewmodel.cs</a:t>
+            </a:r>
+            <a:r>
+              <a:rPr lang="en-US" b="1" dirty="0"/>
+              <a:t>: </a:t>
+            </a:r>
+            <a:r>
               <a:rPr lang="en-US" dirty="0"/>
-              <a:t>Our financial overview reflects a robust and resilient fiscal performance.</a:t>
-            </a:r>
-          </a:p>
-          <a:p>
+              <a:t>its main purpose is to support data binding between the </a:t>
+            </a:r>
+            <a:r>
+              <a:rPr lang="en-US" dirty="0" err="1"/>
+              <a:t>ViewModel</a:t>
+            </a:r>
             <a:r>
               <a:rPr lang="en-US" dirty="0"/>
-              <a:t>Key indicators show consistent revenue growth over the past quarter, attributed to strategic cost management and successful marketing.</a:t>
-            </a:r>
-          </a:p>
-        </p:txBody>
-      </p:sp>
-      <p:sp>
-        <p:nvSpPr>
-          <p:cNvPr id="4" name="Content Placeholder 3">
-            <a:extLst>
-              <a:ext uri="{FF2B5EF4-FFF2-40B4-BE49-F238E27FC236}">
-                <a16:creationId xmlns:a16="http://schemas.microsoft.com/office/drawing/2014/main" id="{8F149607-A897-2741-D897-4F179735F7A3}"/>
-              </a:ext>
-            </a:extLst>
-          </p:cNvPr>
-          <p:cNvSpPr>
-            <a:spLocks noGrp="1"/>
-          </p:cNvSpPr>
-          <p:nvPr>
-            <p:ph idx="12"/>
-          </p:nvPr>
-        </p:nvSpPr>
-        <p:spPr>
-          <a:xfrm>
-            <a:off x="5753101" y="3657818"/>
-            <a:ext cx="4339805" cy="2734053"/>
-          </a:xfrm>
-        </p:spPr>
-        <p:txBody>
-          <a:bodyPr/>
-          <a:lstStyle/>
-          <a:p>
-            <a:r>
-              <a:rPr lang="en-US" dirty="0"/>
-              <a:t>Operating margins have improved, signaling operational efficiency, while strengthening our reserves.</a:t>
-            </a:r>
-          </a:p>
-          <a:p>
-            <a:r>
-              <a:rPr lang="en-US" dirty="0"/>
-              <a:t>This underscores our commitment to financial stability, positioning us for sustained growth. </a:t>
-            </a:r>
+              <a:t> and the UI.</a:t>
+            </a:r>
+          </a:p>
+          <a:p>
+            <a:endParaRPr lang="en-US" altLang="en-US" dirty="0"/>
           </a:p>
         </p:txBody>
       </p:sp>
     </p:spTree>
     <p:extLst>
       <p:ext uri="{BB962C8B-B14F-4D97-AF65-F5344CB8AC3E}">
-        <p14:creationId xmlns:p14="http://schemas.microsoft.com/office/powerpoint/2010/main" val="3513107352"/>
+        <p14:creationId xmlns:p14="http://schemas.microsoft.com/office/powerpoint/2010/main" val="3403845436"/>
       </p:ext>
     </p:extLst>
   </p:cSld>
@@ -12338,7 +13174,7 @@
           <p:cNvPr id="3" name="Title 2">
             <a:extLst>
               <a:ext uri="{FF2B5EF4-FFF2-40B4-BE49-F238E27FC236}">
-                <a16:creationId xmlns:a16="http://schemas.microsoft.com/office/drawing/2014/main" id="{2633516D-AB15-124A-1833-DD5D9DE9CF65}"/>
+                <a16:creationId xmlns:a16="http://schemas.microsoft.com/office/drawing/2014/main" id="{5539E868-C38F-BE6F-C489-F81E4EA421B8}"/>
               </a:ext>
             </a:extLst>
           </p:cNvPr>
@@ -12351,8 +13187,8 @@
         </p:nvSpPr>
         <p:spPr>
           <a:xfrm>
-            <a:off x="677334" y="694945"/>
-            <a:ext cx="10058400" cy="1280160"/>
+            <a:off x="677334" y="694944"/>
+            <a:ext cx="5880629" cy="1690444"/>
           </a:xfrm>
         </p:spPr>
         <p:txBody>
@@ -12361,17 +13197,17 @@
           <a:p>
             <a:r>
               <a:rPr lang="en-US" dirty="0"/>
-              <a:t>Quarterly targets</a:t>
+              <a:t>Marketing strategies</a:t>
             </a:r>
           </a:p>
         </p:txBody>
       </p:sp>
       <p:sp>
         <p:nvSpPr>
-          <p:cNvPr id="4" name="Content Placeholder 3">
+          <p:cNvPr id="2" name="Content Placeholder 1">
             <a:extLst>
               <a:ext uri="{FF2B5EF4-FFF2-40B4-BE49-F238E27FC236}">
-                <a16:creationId xmlns:a16="http://schemas.microsoft.com/office/drawing/2014/main" id="{C69773C3-E729-93EA-2151-22EB12BF1BE0}"/>
+                <a16:creationId xmlns:a16="http://schemas.microsoft.com/office/drawing/2014/main" id="{4AF53888-D548-07B3-4DD3-A6B963163C0C}"/>
               </a:ext>
             </a:extLst>
           </p:cNvPr>
@@ -12379,13 +13215,13 @@
             <a:spLocks noGrp="1"/>
           </p:cNvSpPr>
           <p:nvPr>
-            <p:ph sz="quarter" idx="13"/>
+            <p:ph idx="14"/>
           </p:nvPr>
         </p:nvSpPr>
         <p:spPr>
           <a:xfrm>
-            <a:off x="686741" y="2140864"/>
-            <a:ext cx="3797114" cy="3494753"/>
+            <a:off x="677334" y="2476239"/>
+            <a:ext cx="5880629" cy="3237948"/>
           </a:xfrm>
         </p:spPr>
         <p:txBody>
@@ -12394,25 +13230,19 @@
           <a:p>
             <a:r>
               <a:rPr lang="en-US" dirty="0"/>
-              <a:t>Market expansion</a:t>
+              <a:t>Implement personalized engagement strategies</a:t>
             </a:r>
           </a:p>
           <a:p>
             <a:r>
               <a:rPr lang="en-US" dirty="0"/>
-              <a:t>Product innovation</a:t>
+              <a:t>Tailor campaigns to resonate with specific demographics, fostering a sense of relevance and connection</a:t>
             </a:r>
           </a:p>
           <a:p>
             <a:r>
               <a:rPr lang="en-US" dirty="0"/>
-              <a:t>Customer retention</a:t>
-            </a:r>
-          </a:p>
-          <a:p>
-            <a:r>
-              <a:rPr lang="en-US" dirty="0"/>
-              <a:t>Operational efficiency</a:t>
+              <a:t>Collaborate with influencers and thought leaders to amplify our brand message</a:t>
             </a:r>
           </a:p>
           <a:p>
@@ -12420,390 +13250,57 @@
           </a:p>
         </p:txBody>
       </p:sp>
-      <p:graphicFrame>
-        <p:nvGraphicFramePr>
-          <p:cNvPr id="5" name="Table Placeholder 2">
+      <p:pic>
+        <p:nvPicPr>
+          <p:cNvPr id="11" name="Picture Placeholder 10" descr="A person writing on a glass board">
             <a:extLst>
               <a:ext uri="{FF2B5EF4-FFF2-40B4-BE49-F238E27FC236}">
-                <a16:creationId xmlns:a16="http://schemas.microsoft.com/office/drawing/2014/main" id="{75268C26-696B-469B-6E84-E2DA897FB4F4}"/>
+                <a16:creationId xmlns:a16="http://schemas.microsoft.com/office/drawing/2014/main" id="{D78464A7-BA23-769A-56AD-2AE7CBC9CF8B}"/>
               </a:ext>
             </a:extLst>
           </p:cNvPr>
-          <p:cNvGraphicFramePr>
-            <a:graphicFrameLocks noGrp="1"/>
-          </p:cNvGraphicFramePr>
-          <p:nvPr>
-            <p:ph type="tbl" sz="quarter" idx="14"/>
-            <p:extLst>
-              <p:ext uri="{D42A27DB-BD31-4B8C-83A1-F6EECF244321}">
-                <p14:modId xmlns:p14="http://schemas.microsoft.com/office/powerpoint/2010/main" val="1368234980"/>
-              </p:ext>
-            </p:extLst>
-          </p:nvPr>
-        </p:nvGraphicFramePr>
-        <p:xfrm>
-          <a:off x="5054600" y="2103438"/>
-          <a:ext cx="6451600" cy="3524216"/>
-        </p:xfrm>
-        <a:graphic>
-          <a:graphicData uri="http://schemas.openxmlformats.org/drawingml/2006/table">
-            <a:tbl>
-              <a:tblPr firstRow="1" bandRow="1">
-                <a:tableStyleId>{7E9639D4-E3E2-4D34-9284-5A2195B3D0D7}</a:tableStyleId>
-              </a:tblPr>
-              <a:tblGrid>
-                <a:gridCol w="1612900">
-                  <a:extLst>
-                    <a:ext uri="{9D8B030D-6E8A-4147-A177-3AD203B41FA5}">
-                      <a16:colId xmlns:a16="http://schemas.microsoft.com/office/drawing/2014/main" val="30750867"/>
-                    </a:ext>
-                  </a:extLst>
-                </a:gridCol>
-                <a:gridCol w="1612900">
-                  <a:extLst>
-                    <a:ext uri="{9D8B030D-6E8A-4147-A177-3AD203B41FA5}">
-                      <a16:colId xmlns:a16="http://schemas.microsoft.com/office/drawing/2014/main" val="1038941322"/>
-                    </a:ext>
-                  </a:extLst>
-                </a:gridCol>
-                <a:gridCol w="1612900">
-                  <a:extLst>
-                    <a:ext uri="{9D8B030D-6E8A-4147-A177-3AD203B41FA5}">
-                      <a16:colId xmlns:a16="http://schemas.microsoft.com/office/drawing/2014/main" val="529645500"/>
-                    </a:ext>
-                  </a:extLst>
-                </a:gridCol>
-                <a:gridCol w="1612900">
-                  <a:extLst>
-                    <a:ext uri="{9D8B030D-6E8A-4147-A177-3AD203B41FA5}">
-                      <a16:colId xmlns:a16="http://schemas.microsoft.com/office/drawing/2014/main" val="3469610457"/>
-                    </a:ext>
-                  </a:extLst>
-                </a:gridCol>
-              </a:tblGrid>
-              <a:tr h="930012">
-                <a:tc>
-                  <a:txBody>
-                    <a:bodyPr/>
-                    <a:lstStyle/>
-                    <a:p>
-                      <a:pPr algn="ctr"/>
-                      <a:r>
-                        <a:rPr lang="en-US" dirty="0"/>
-                        <a:t>Quarter</a:t>
-                      </a:r>
-                    </a:p>
-                  </a:txBody>
-                  <a:tcPr anchor="ctr"/>
-                </a:tc>
-                <a:tc>
-                  <a:txBody>
-                    <a:bodyPr/>
-                    <a:lstStyle/>
-                    <a:p>
-                      <a:pPr algn="ctr"/>
-                      <a:r>
-                        <a:rPr lang="en-US" dirty="0"/>
-                        <a:t>Revenue growth (%)</a:t>
-                      </a:r>
-                    </a:p>
-                  </a:txBody>
-                  <a:tcPr anchor="ctr"/>
-                </a:tc>
-                <a:tc>
-                  <a:txBody>
-                    <a:bodyPr/>
-                    <a:lstStyle/>
-                    <a:p>
-                      <a:pPr algn="ctr"/>
-                      <a:r>
-                        <a:rPr lang="en-US" dirty="0"/>
-                        <a:t>Market share increase (%)</a:t>
-                      </a:r>
-                    </a:p>
-                  </a:txBody>
-                  <a:tcPr anchor="ctr"/>
-                </a:tc>
-                <a:tc>
-                  <a:txBody>
-                    <a:bodyPr/>
-                    <a:lstStyle/>
-                    <a:p>
-                      <a:pPr algn="ctr"/>
-                      <a:r>
-                        <a:rPr lang="en-US" dirty="0"/>
-                        <a:t>Customer acquisition</a:t>
-                      </a:r>
-                    </a:p>
-                  </a:txBody>
-                  <a:tcPr anchor="ctr"/>
-                </a:tc>
-                <a:extLst>
-                  <a:ext uri="{0D108BD9-81ED-4DB2-BD59-A6C34878D82A}">
-                    <a16:rowId xmlns:a16="http://schemas.microsoft.com/office/drawing/2014/main" val="4251432886"/>
-                  </a:ext>
-                </a:extLst>
-              </a:tr>
-              <a:tr h="648551">
-                <a:tc>
-                  <a:txBody>
-                    <a:bodyPr/>
-                    <a:lstStyle/>
-                    <a:p>
-                      <a:pPr algn="ctr"/>
-                      <a:r>
-                        <a:rPr lang="en-US" dirty="0"/>
-                        <a:t>Q1</a:t>
-                      </a:r>
-                    </a:p>
-                  </a:txBody>
-                  <a:tcPr anchor="ctr"/>
-                </a:tc>
-                <a:tc>
-                  <a:txBody>
-                    <a:bodyPr/>
-                    <a:lstStyle/>
-                    <a:p>
-                      <a:pPr algn="ctr"/>
-                      <a:r>
-                        <a:rPr lang="en-US" dirty="0"/>
-                        <a:t>12</a:t>
-                      </a:r>
-                    </a:p>
-                  </a:txBody>
-                  <a:tcPr anchor="ctr"/>
-                </a:tc>
-                <a:tc>
-                  <a:txBody>
-                    <a:bodyPr/>
-                    <a:lstStyle/>
-                    <a:p>
-                      <a:pPr algn="ctr"/>
-                      <a:r>
-                        <a:rPr lang="en-US" dirty="0"/>
-                        <a:t>2</a:t>
-                      </a:r>
-                    </a:p>
-                  </a:txBody>
-                  <a:tcPr anchor="ctr"/>
-                </a:tc>
-                <a:tc>
-                  <a:txBody>
-                    <a:bodyPr/>
-                    <a:lstStyle/>
-                    <a:p>
-                      <a:pPr algn="ctr"/>
-                      <a:r>
-                        <a:rPr lang="en-US" dirty="0"/>
-                        <a:t>500</a:t>
-                      </a:r>
-                    </a:p>
-                  </a:txBody>
-                  <a:tcPr anchor="ctr"/>
-                </a:tc>
-                <a:extLst>
-                  <a:ext uri="{0D108BD9-81ED-4DB2-BD59-A6C34878D82A}">
-                    <a16:rowId xmlns:a16="http://schemas.microsoft.com/office/drawing/2014/main" val="360240625"/>
-                  </a:ext>
-                </a:extLst>
-              </a:tr>
-              <a:tr h="648551">
-                <a:tc>
-                  <a:txBody>
-                    <a:bodyPr/>
-                    <a:lstStyle/>
-                    <a:p>
-                      <a:pPr algn="ctr"/>
-                      <a:r>
-                        <a:rPr lang="en-US" dirty="0"/>
-                        <a:t>Q2</a:t>
-                      </a:r>
-                    </a:p>
-                  </a:txBody>
-                  <a:tcPr anchor="ctr"/>
-                </a:tc>
-                <a:tc>
-                  <a:txBody>
-                    <a:bodyPr/>
-                    <a:lstStyle/>
-                    <a:p>
-                      <a:pPr algn="ctr"/>
-                      <a:r>
-                        <a:rPr lang="en-US" dirty="0"/>
-                        <a:t>15</a:t>
-                      </a:r>
-                    </a:p>
-                  </a:txBody>
-                  <a:tcPr anchor="ctr"/>
-                </a:tc>
-                <a:tc>
-                  <a:txBody>
-                    <a:bodyPr/>
-                    <a:lstStyle/>
-                    <a:p>
-                      <a:pPr algn="ctr"/>
-                      <a:r>
-                        <a:rPr lang="en-US" dirty="0"/>
-                        <a:t>3</a:t>
-                      </a:r>
-                    </a:p>
-                  </a:txBody>
-                  <a:tcPr anchor="ctr"/>
-                </a:tc>
-                <a:tc>
-                  <a:txBody>
-                    <a:bodyPr/>
-                    <a:lstStyle/>
-                    <a:p>
-                      <a:pPr algn="ctr"/>
-                      <a:r>
-                        <a:rPr lang="en-US" dirty="0"/>
-                        <a:t>600</a:t>
-                      </a:r>
-                    </a:p>
-                  </a:txBody>
-                  <a:tcPr anchor="ctr"/>
-                </a:tc>
-                <a:extLst>
-                  <a:ext uri="{0D108BD9-81ED-4DB2-BD59-A6C34878D82A}">
-                    <a16:rowId xmlns:a16="http://schemas.microsoft.com/office/drawing/2014/main" val="2762393470"/>
-                  </a:ext>
-                </a:extLst>
-              </a:tr>
-              <a:tr h="648551">
-                <a:tc>
-                  <a:txBody>
-                    <a:bodyPr/>
-                    <a:lstStyle/>
-                    <a:p>
-                      <a:pPr algn="ctr"/>
-                      <a:r>
-                        <a:rPr lang="en-US" dirty="0"/>
-                        <a:t>Q3</a:t>
-                      </a:r>
-                    </a:p>
-                  </a:txBody>
-                  <a:tcPr anchor="ctr"/>
-                </a:tc>
-                <a:tc>
-                  <a:txBody>
-                    <a:bodyPr/>
-                    <a:lstStyle/>
-                    <a:p>
-                      <a:pPr algn="ctr"/>
-                      <a:r>
-                        <a:rPr lang="en-US" dirty="0"/>
-                        <a:t>18</a:t>
-                      </a:r>
-                    </a:p>
-                  </a:txBody>
-                  <a:tcPr anchor="ctr"/>
-                </a:tc>
-                <a:tc>
-                  <a:txBody>
-                    <a:bodyPr/>
-                    <a:lstStyle/>
-                    <a:p>
-                      <a:pPr algn="ctr"/>
-                      <a:r>
-                        <a:rPr lang="en-US" dirty="0"/>
-                        <a:t>4</a:t>
-                      </a:r>
-                    </a:p>
-                  </a:txBody>
-                  <a:tcPr anchor="ctr"/>
-                </a:tc>
-                <a:tc>
-                  <a:txBody>
-                    <a:bodyPr/>
-                    <a:lstStyle/>
-                    <a:p>
-                      <a:pPr algn="ctr"/>
-                      <a:r>
-                        <a:rPr lang="en-US" dirty="0"/>
-                        <a:t>700</a:t>
-                      </a:r>
-                    </a:p>
-                  </a:txBody>
-                  <a:tcPr anchor="ctr"/>
-                </a:tc>
-                <a:extLst>
-                  <a:ext uri="{0D108BD9-81ED-4DB2-BD59-A6C34878D82A}">
-                    <a16:rowId xmlns:a16="http://schemas.microsoft.com/office/drawing/2014/main" val="1311364400"/>
-                  </a:ext>
-                </a:extLst>
-              </a:tr>
-              <a:tr h="648551">
-                <a:tc>
-                  <a:txBody>
-                    <a:bodyPr/>
-                    <a:lstStyle/>
-                    <a:p>
-                      <a:pPr algn="ctr"/>
-                      <a:r>
-                        <a:rPr lang="en-US" dirty="0"/>
-                        <a:t>Q4</a:t>
-                      </a:r>
-                    </a:p>
-                  </a:txBody>
-                  <a:tcPr anchor="ctr"/>
-                </a:tc>
-                <a:tc>
-                  <a:txBody>
-                    <a:bodyPr/>
-                    <a:lstStyle/>
-                    <a:p>
-                      <a:pPr algn="ctr"/>
-                      <a:r>
-                        <a:rPr lang="en-US" dirty="0"/>
-                        <a:t>20</a:t>
-                      </a:r>
-                    </a:p>
-                  </a:txBody>
-                  <a:tcPr anchor="ctr"/>
-                </a:tc>
-                <a:tc>
-                  <a:txBody>
-                    <a:bodyPr/>
-                    <a:lstStyle/>
-                    <a:p>
-                      <a:pPr algn="ctr"/>
-                      <a:r>
-                        <a:rPr lang="en-US" dirty="0"/>
-                        <a:t>5</a:t>
-                      </a:r>
-                    </a:p>
-                  </a:txBody>
-                  <a:tcPr anchor="ctr"/>
-                </a:tc>
-                <a:tc>
-                  <a:txBody>
-                    <a:bodyPr/>
-                    <a:lstStyle/>
-                    <a:p>
-                      <a:pPr algn="ctr"/>
-                      <a:r>
-                        <a:rPr lang="en-US" dirty="0"/>
-                        <a:t>800</a:t>
-                      </a:r>
-                    </a:p>
-                  </a:txBody>
-                  <a:tcPr anchor="ctr"/>
-                </a:tc>
-                <a:extLst>
-                  <a:ext uri="{0D108BD9-81ED-4DB2-BD59-A6C34878D82A}">
-                    <a16:rowId xmlns:a16="http://schemas.microsoft.com/office/drawing/2014/main" val="2526263980"/>
-                  </a:ext>
-                </a:extLst>
-              </a:tr>
-            </a:tbl>
-          </a:graphicData>
-        </a:graphic>
-      </p:graphicFrame>
+          <p:cNvPicPr>
+            <a:picLocks noGrp="1" noChangeAspect="1"/>
+          </p:cNvPicPr>
+          <p:nvPr>
+            <p:ph type="pic" sz="quarter" idx="15"/>
+          </p:nvPr>
+        </p:nvPicPr>
+        <p:blipFill>
+          <a:blip r:embed="rId3">
+            <a:duotone>
+              <a:schemeClr val="accent1">
+                <a:shade val="45000"/>
+                <a:satMod val="135000"/>
+              </a:schemeClr>
+              <a:prstClr val="white"/>
+            </a:duotone>
+            <a:extLst>
+              <a:ext uri="{BEBA8EAE-BF5A-486C-A8C5-ECC9F3942E4B}">
+                <a14:imgProps xmlns:a14="http://schemas.microsoft.com/office/drawing/2010/main">
+                  <a14:imgLayer r:embed="rId4">
+                    <a14:imgEffect>
+                      <a14:brightnessContrast bright="-20000"/>
+                    </a14:imgEffect>
+                  </a14:imgLayer>
+                </a14:imgProps>
+              </a:ext>
+            </a:extLst>
+          </a:blip>
+          <a:srcRect l="24873" r="24873"/>
+          <a:stretch/>
+        </p:blipFill>
+        <p:spPr>
+          <a:xfrm>
+            <a:off x="7018338" y="0"/>
+            <a:ext cx="5173662" cy="6858000"/>
+          </a:xfrm>
+        </p:spPr>
+      </p:pic>
     </p:spTree>
     <p:extLst>
       <p:ext uri="{BB962C8B-B14F-4D97-AF65-F5344CB8AC3E}">
-        <p14:creationId xmlns:p14="http://schemas.microsoft.com/office/powerpoint/2010/main" val="3648998020"/>
+        <p14:creationId xmlns:p14="http://schemas.microsoft.com/office/powerpoint/2010/main" val="2203045136"/>
       </p:ext>
     </p:extLst>
   </p:cSld>

</xml_diff>

<commit_message>
Soccer betting app beta version
</commit_message>
<xml_diff>
--- a/SoccerBettingApp/Presentation/Soccer Betting APP Presentation.pptx
+++ b/SoccerBettingApp/Presentation/Soccer Betting APP Presentation.pptx
@@ -5,27 +5,21 @@
     <p:sldMasterId id="2147483648" r:id="rId4"/>
   </p:sldMasterIdLst>
   <p:notesMasterIdLst>
-    <p:notesMasterId r:id="rId20"/>
+    <p:notesMasterId r:id="rId14"/>
   </p:notesMasterIdLst>
   <p:handoutMasterIdLst>
-    <p:handoutMasterId r:id="rId21"/>
+    <p:handoutMasterId r:id="rId15"/>
   </p:handoutMasterIdLst>
   <p:sldIdLst>
     <p:sldId id="268" r:id="rId5"/>
     <p:sldId id="324" r:id="rId6"/>
     <p:sldId id="310" r:id="rId7"/>
     <p:sldId id="261" r:id="rId8"/>
-    <p:sldId id="325" r:id="rId9"/>
-    <p:sldId id="332" r:id="rId10"/>
-    <p:sldId id="333" r:id="rId11"/>
-    <p:sldId id="334" r:id="rId12"/>
-    <p:sldId id="317" r:id="rId13"/>
-    <p:sldId id="328" r:id="rId14"/>
-    <p:sldId id="329" r:id="rId15"/>
-    <p:sldId id="318" r:id="rId16"/>
-    <p:sldId id="331" r:id="rId17"/>
-    <p:sldId id="321" r:id="rId18"/>
-    <p:sldId id="293" r:id="rId19"/>
+    <p:sldId id="332" r:id="rId9"/>
+    <p:sldId id="333" r:id="rId10"/>
+    <p:sldId id="334" r:id="rId11"/>
+    <p:sldId id="335" r:id="rId12"/>
+    <p:sldId id="293" r:id="rId13"/>
   </p:sldIdLst>
   <p:sldSz cx="12192000" cy="6858000"/>
   <p:notesSz cx="6858000" cy="9144000"/>
@@ -757,510 +751,6 @@
 </p:notes>
 </file>
 
-<file path=ppt/notesSlides/notesSlide10.xml><?xml version="1.0" encoding="utf-8"?>
-<p:notes xmlns:a="http://schemas.openxmlformats.org/drawingml/2006/main" xmlns:r="http://schemas.openxmlformats.org/officeDocument/2006/relationships" xmlns:p="http://schemas.openxmlformats.org/presentationml/2006/main">
-  <p:cSld>
-    <p:spTree>
-      <p:nvGrpSpPr>
-        <p:cNvPr id="1" name=""/>
-        <p:cNvGrpSpPr/>
-        <p:nvPr/>
-      </p:nvGrpSpPr>
-      <p:grpSpPr>
-        <a:xfrm>
-          <a:off x="0" y="0"/>
-          <a:ext cx="0" cy="0"/>
-          <a:chOff x="0" y="0"/>
-          <a:chExt cx="0" cy="0"/>
-        </a:xfrm>
-      </p:grpSpPr>
-      <p:sp>
-        <p:nvSpPr>
-          <p:cNvPr id="2" name="Slide Image Placeholder 1"/>
-          <p:cNvSpPr>
-            <a:spLocks noGrp="1" noRot="1" noChangeAspect="1"/>
-          </p:cNvSpPr>
-          <p:nvPr>
-            <p:ph type="sldImg"/>
-          </p:nvPr>
-        </p:nvSpPr>
-        <p:spPr/>
-      </p:sp>
-      <p:sp>
-        <p:nvSpPr>
-          <p:cNvPr id="3" name="Notes Placeholder 2"/>
-          <p:cNvSpPr>
-            <a:spLocks noGrp="1"/>
-          </p:cNvSpPr>
-          <p:nvPr>
-            <p:ph type="body" idx="1"/>
-          </p:nvPr>
-        </p:nvSpPr>
-        <p:spPr/>
-        <p:txBody>
-          <a:bodyPr/>
-          <a:lstStyle/>
-          <a:p>
-            <a:endParaRPr lang="en-US" dirty="0"/>
-          </a:p>
-        </p:txBody>
-      </p:sp>
-      <p:sp>
-        <p:nvSpPr>
-          <p:cNvPr id="4" name="Slide Number Placeholder 3"/>
-          <p:cNvSpPr>
-            <a:spLocks noGrp="1"/>
-          </p:cNvSpPr>
-          <p:nvPr>
-            <p:ph type="sldNum" sz="quarter" idx="5"/>
-          </p:nvPr>
-        </p:nvSpPr>
-        <p:spPr/>
-        <p:txBody>
-          <a:bodyPr/>
-          <a:lstStyle/>
-          <a:p>
-            <a:fld id="{9C900A82-9926-4DBA-8BA5-A22EEB8ACF8E}" type="slidenum">
-              <a:rPr lang="en-US" smtClean="0"/>
-              <a:t>10</a:t>
-            </a:fld>
-            <a:endParaRPr lang="en-US" dirty="0"/>
-          </a:p>
-        </p:txBody>
-      </p:sp>
-    </p:spTree>
-    <p:extLst>
-      <p:ext uri="{BB962C8B-B14F-4D97-AF65-F5344CB8AC3E}">
-        <p14:creationId xmlns:p14="http://schemas.microsoft.com/office/powerpoint/2010/main" val="3657124793"/>
-      </p:ext>
-    </p:extLst>
-  </p:cSld>
-  <p:clrMapOvr>
-    <a:masterClrMapping/>
-  </p:clrMapOvr>
-</p:notes>
-</file>
-
-<file path=ppt/notesSlides/notesSlide11.xml><?xml version="1.0" encoding="utf-8"?>
-<p:notes xmlns:a="http://schemas.openxmlformats.org/drawingml/2006/main" xmlns:r="http://schemas.openxmlformats.org/officeDocument/2006/relationships" xmlns:p="http://schemas.openxmlformats.org/presentationml/2006/main">
-  <p:cSld>
-    <p:spTree>
-      <p:nvGrpSpPr>
-        <p:cNvPr id="1" name=""/>
-        <p:cNvGrpSpPr/>
-        <p:nvPr/>
-      </p:nvGrpSpPr>
-      <p:grpSpPr>
-        <a:xfrm>
-          <a:off x="0" y="0"/>
-          <a:ext cx="0" cy="0"/>
-          <a:chOff x="0" y="0"/>
-          <a:chExt cx="0" cy="0"/>
-        </a:xfrm>
-      </p:grpSpPr>
-      <p:sp>
-        <p:nvSpPr>
-          <p:cNvPr id="2" name="Slide Image Placeholder 1"/>
-          <p:cNvSpPr>
-            <a:spLocks noGrp="1" noRot="1" noChangeAspect="1"/>
-          </p:cNvSpPr>
-          <p:nvPr>
-            <p:ph type="sldImg"/>
-          </p:nvPr>
-        </p:nvSpPr>
-        <p:spPr/>
-      </p:sp>
-      <p:sp>
-        <p:nvSpPr>
-          <p:cNvPr id="3" name="Notes Placeholder 2"/>
-          <p:cNvSpPr>
-            <a:spLocks noGrp="1"/>
-          </p:cNvSpPr>
-          <p:nvPr>
-            <p:ph type="body" idx="1"/>
-          </p:nvPr>
-        </p:nvSpPr>
-        <p:spPr/>
-        <p:txBody>
-          <a:bodyPr/>
-          <a:lstStyle/>
-          <a:p>
-            <a:endParaRPr lang="en-US" dirty="0"/>
-          </a:p>
-        </p:txBody>
-      </p:sp>
-      <p:sp>
-        <p:nvSpPr>
-          <p:cNvPr id="4" name="Slide Number Placeholder 3"/>
-          <p:cNvSpPr>
-            <a:spLocks noGrp="1"/>
-          </p:cNvSpPr>
-          <p:nvPr>
-            <p:ph type="sldNum" sz="quarter" idx="5"/>
-          </p:nvPr>
-        </p:nvSpPr>
-        <p:spPr/>
-        <p:txBody>
-          <a:bodyPr/>
-          <a:lstStyle/>
-          <a:p>
-            <a:fld id="{9C900A82-9926-4DBA-8BA5-A22EEB8ACF8E}" type="slidenum">
-              <a:rPr lang="en-US" smtClean="0"/>
-              <a:t>11</a:t>
-            </a:fld>
-            <a:endParaRPr lang="en-US" dirty="0"/>
-          </a:p>
-        </p:txBody>
-      </p:sp>
-    </p:spTree>
-    <p:extLst>
-      <p:ext uri="{BB962C8B-B14F-4D97-AF65-F5344CB8AC3E}">
-        <p14:creationId xmlns:p14="http://schemas.microsoft.com/office/powerpoint/2010/main" val="848025919"/>
-      </p:ext>
-    </p:extLst>
-  </p:cSld>
-  <p:clrMapOvr>
-    <a:masterClrMapping/>
-  </p:clrMapOvr>
-</p:notes>
-</file>
-
-<file path=ppt/notesSlides/notesSlide12.xml><?xml version="1.0" encoding="utf-8"?>
-<p:notes xmlns:a="http://schemas.openxmlformats.org/drawingml/2006/main" xmlns:r="http://schemas.openxmlformats.org/officeDocument/2006/relationships" xmlns:p="http://schemas.openxmlformats.org/presentationml/2006/main">
-  <p:cSld>
-    <p:spTree>
-      <p:nvGrpSpPr>
-        <p:cNvPr id="1" name=""/>
-        <p:cNvGrpSpPr/>
-        <p:nvPr/>
-      </p:nvGrpSpPr>
-      <p:grpSpPr>
-        <a:xfrm>
-          <a:off x="0" y="0"/>
-          <a:ext cx="0" cy="0"/>
-          <a:chOff x="0" y="0"/>
-          <a:chExt cx="0" cy="0"/>
-        </a:xfrm>
-      </p:grpSpPr>
-      <p:sp>
-        <p:nvSpPr>
-          <p:cNvPr id="2" name="Slide Image Placeholder 1"/>
-          <p:cNvSpPr>
-            <a:spLocks noGrp="1" noRot="1" noChangeAspect="1"/>
-          </p:cNvSpPr>
-          <p:nvPr>
-            <p:ph type="sldImg"/>
-          </p:nvPr>
-        </p:nvSpPr>
-        <p:spPr/>
-      </p:sp>
-      <p:sp>
-        <p:nvSpPr>
-          <p:cNvPr id="3" name="Notes Placeholder 2"/>
-          <p:cNvSpPr>
-            <a:spLocks noGrp="1"/>
-          </p:cNvSpPr>
-          <p:nvPr>
-            <p:ph type="body" idx="1"/>
-          </p:nvPr>
-        </p:nvSpPr>
-        <p:spPr/>
-        <p:txBody>
-          <a:bodyPr/>
-          <a:lstStyle/>
-          <a:p>
-            <a:endParaRPr lang="en-US" dirty="0"/>
-          </a:p>
-        </p:txBody>
-      </p:sp>
-      <p:sp>
-        <p:nvSpPr>
-          <p:cNvPr id="4" name="Slide Number Placeholder 3"/>
-          <p:cNvSpPr>
-            <a:spLocks noGrp="1"/>
-          </p:cNvSpPr>
-          <p:nvPr>
-            <p:ph type="sldNum" sz="quarter" idx="5"/>
-          </p:nvPr>
-        </p:nvSpPr>
-        <p:spPr/>
-        <p:txBody>
-          <a:bodyPr/>
-          <a:lstStyle/>
-          <a:p>
-            <a:fld id="{9C900A82-9926-4DBA-8BA5-A22EEB8ACF8E}" type="slidenum">
-              <a:rPr lang="en-US" smtClean="0"/>
-              <a:t>12</a:t>
-            </a:fld>
-            <a:endParaRPr lang="en-US" dirty="0"/>
-          </a:p>
-        </p:txBody>
-      </p:sp>
-    </p:spTree>
-    <p:extLst>
-      <p:ext uri="{BB962C8B-B14F-4D97-AF65-F5344CB8AC3E}">
-        <p14:creationId xmlns:p14="http://schemas.microsoft.com/office/powerpoint/2010/main" val="2866502394"/>
-      </p:ext>
-    </p:extLst>
-  </p:cSld>
-  <p:clrMapOvr>
-    <a:masterClrMapping/>
-  </p:clrMapOvr>
-</p:notes>
-</file>
-
-<file path=ppt/notesSlides/notesSlide13.xml><?xml version="1.0" encoding="utf-8"?>
-<p:notes xmlns:a="http://schemas.openxmlformats.org/drawingml/2006/main" xmlns:r="http://schemas.openxmlformats.org/officeDocument/2006/relationships" xmlns:p="http://schemas.openxmlformats.org/presentationml/2006/main">
-  <p:cSld>
-    <p:spTree>
-      <p:nvGrpSpPr>
-        <p:cNvPr id="1" name=""/>
-        <p:cNvGrpSpPr/>
-        <p:nvPr/>
-      </p:nvGrpSpPr>
-      <p:grpSpPr>
-        <a:xfrm>
-          <a:off x="0" y="0"/>
-          <a:ext cx="0" cy="0"/>
-          <a:chOff x="0" y="0"/>
-          <a:chExt cx="0" cy="0"/>
-        </a:xfrm>
-      </p:grpSpPr>
-      <p:sp>
-        <p:nvSpPr>
-          <p:cNvPr id="2" name="Slide Image Placeholder 1"/>
-          <p:cNvSpPr>
-            <a:spLocks noGrp="1" noRot="1" noChangeAspect="1"/>
-          </p:cNvSpPr>
-          <p:nvPr>
-            <p:ph type="sldImg"/>
-          </p:nvPr>
-        </p:nvSpPr>
-        <p:spPr/>
-      </p:sp>
-      <p:sp>
-        <p:nvSpPr>
-          <p:cNvPr id="3" name="Notes Placeholder 2"/>
-          <p:cNvSpPr>
-            <a:spLocks noGrp="1"/>
-          </p:cNvSpPr>
-          <p:nvPr>
-            <p:ph type="body" idx="1"/>
-          </p:nvPr>
-        </p:nvSpPr>
-        <p:spPr/>
-        <p:txBody>
-          <a:bodyPr/>
-          <a:lstStyle/>
-          <a:p>
-            <a:endParaRPr lang="en-US" dirty="0"/>
-          </a:p>
-        </p:txBody>
-      </p:sp>
-      <p:sp>
-        <p:nvSpPr>
-          <p:cNvPr id="4" name="Slide Number Placeholder 3"/>
-          <p:cNvSpPr>
-            <a:spLocks noGrp="1"/>
-          </p:cNvSpPr>
-          <p:nvPr>
-            <p:ph type="sldNum" sz="quarter" idx="5"/>
-          </p:nvPr>
-        </p:nvSpPr>
-        <p:spPr/>
-        <p:txBody>
-          <a:bodyPr/>
-          <a:lstStyle/>
-          <a:p>
-            <a:fld id="{9C900A82-9926-4DBA-8BA5-A22EEB8ACF8E}" type="slidenum">
-              <a:rPr lang="en-US" smtClean="0"/>
-              <a:t>13</a:t>
-            </a:fld>
-            <a:endParaRPr lang="en-US" dirty="0"/>
-          </a:p>
-        </p:txBody>
-      </p:sp>
-    </p:spTree>
-    <p:extLst>
-      <p:ext uri="{BB962C8B-B14F-4D97-AF65-F5344CB8AC3E}">
-        <p14:creationId xmlns:p14="http://schemas.microsoft.com/office/powerpoint/2010/main" val="4286758428"/>
-      </p:ext>
-    </p:extLst>
-  </p:cSld>
-  <p:clrMapOvr>
-    <a:masterClrMapping/>
-  </p:clrMapOvr>
-</p:notes>
-</file>
-
-<file path=ppt/notesSlides/notesSlide14.xml><?xml version="1.0" encoding="utf-8"?>
-<p:notes xmlns:a="http://schemas.openxmlformats.org/drawingml/2006/main" xmlns:r="http://schemas.openxmlformats.org/officeDocument/2006/relationships" xmlns:p="http://schemas.openxmlformats.org/presentationml/2006/main">
-  <p:cSld>
-    <p:spTree>
-      <p:nvGrpSpPr>
-        <p:cNvPr id="1" name=""/>
-        <p:cNvGrpSpPr/>
-        <p:nvPr/>
-      </p:nvGrpSpPr>
-      <p:grpSpPr>
-        <a:xfrm>
-          <a:off x="0" y="0"/>
-          <a:ext cx="0" cy="0"/>
-          <a:chOff x="0" y="0"/>
-          <a:chExt cx="0" cy="0"/>
-        </a:xfrm>
-      </p:grpSpPr>
-      <p:sp>
-        <p:nvSpPr>
-          <p:cNvPr id="2" name="Slide Image Placeholder 1"/>
-          <p:cNvSpPr>
-            <a:spLocks noGrp="1" noRot="1" noChangeAspect="1"/>
-          </p:cNvSpPr>
-          <p:nvPr>
-            <p:ph type="sldImg"/>
-          </p:nvPr>
-        </p:nvSpPr>
-        <p:spPr/>
-      </p:sp>
-      <p:sp>
-        <p:nvSpPr>
-          <p:cNvPr id="3" name="Notes Placeholder 2"/>
-          <p:cNvSpPr>
-            <a:spLocks noGrp="1"/>
-          </p:cNvSpPr>
-          <p:nvPr>
-            <p:ph type="body" idx="1"/>
-          </p:nvPr>
-        </p:nvSpPr>
-        <p:spPr/>
-        <p:txBody>
-          <a:bodyPr/>
-          <a:lstStyle/>
-          <a:p>
-            <a:endParaRPr lang="en-US" dirty="0"/>
-          </a:p>
-        </p:txBody>
-      </p:sp>
-      <p:sp>
-        <p:nvSpPr>
-          <p:cNvPr id="4" name="Slide Number Placeholder 3"/>
-          <p:cNvSpPr>
-            <a:spLocks noGrp="1"/>
-          </p:cNvSpPr>
-          <p:nvPr>
-            <p:ph type="sldNum" sz="quarter" idx="5"/>
-          </p:nvPr>
-        </p:nvSpPr>
-        <p:spPr/>
-        <p:txBody>
-          <a:bodyPr/>
-          <a:lstStyle/>
-          <a:p>
-            <a:fld id="{9C900A82-9926-4DBA-8BA5-A22EEB8ACF8E}" type="slidenum">
-              <a:rPr lang="en-US" smtClean="0"/>
-              <a:t>14</a:t>
-            </a:fld>
-            <a:endParaRPr lang="en-US" dirty="0"/>
-          </a:p>
-        </p:txBody>
-      </p:sp>
-    </p:spTree>
-    <p:extLst>
-      <p:ext uri="{BB962C8B-B14F-4D97-AF65-F5344CB8AC3E}">
-        <p14:creationId xmlns:p14="http://schemas.microsoft.com/office/powerpoint/2010/main" val="1268660428"/>
-      </p:ext>
-    </p:extLst>
-  </p:cSld>
-  <p:clrMapOvr>
-    <a:masterClrMapping/>
-  </p:clrMapOvr>
-</p:notes>
-</file>
-
-<file path=ppt/notesSlides/notesSlide15.xml><?xml version="1.0" encoding="utf-8"?>
-<p:notes xmlns:a="http://schemas.openxmlformats.org/drawingml/2006/main" xmlns:r="http://schemas.openxmlformats.org/officeDocument/2006/relationships" xmlns:p="http://schemas.openxmlformats.org/presentationml/2006/main">
-  <p:cSld>
-    <p:spTree>
-      <p:nvGrpSpPr>
-        <p:cNvPr id="1" name=""/>
-        <p:cNvGrpSpPr/>
-        <p:nvPr/>
-      </p:nvGrpSpPr>
-      <p:grpSpPr>
-        <a:xfrm>
-          <a:off x="0" y="0"/>
-          <a:ext cx="0" cy="0"/>
-          <a:chOff x="0" y="0"/>
-          <a:chExt cx="0" cy="0"/>
-        </a:xfrm>
-      </p:grpSpPr>
-      <p:sp>
-        <p:nvSpPr>
-          <p:cNvPr id="2" name="Slide Image Placeholder 1"/>
-          <p:cNvSpPr>
-            <a:spLocks noGrp="1" noRot="1" noChangeAspect="1"/>
-          </p:cNvSpPr>
-          <p:nvPr>
-            <p:ph type="sldImg"/>
-          </p:nvPr>
-        </p:nvSpPr>
-        <p:spPr/>
-      </p:sp>
-      <p:sp>
-        <p:nvSpPr>
-          <p:cNvPr id="3" name="Notes Placeholder 2"/>
-          <p:cNvSpPr>
-            <a:spLocks noGrp="1"/>
-          </p:cNvSpPr>
-          <p:nvPr>
-            <p:ph type="body" idx="1"/>
-          </p:nvPr>
-        </p:nvSpPr>
-        <p:spPr/>
-        <p:txBody>
-          <a:bodyPr/>
-          <a:lstStyle/>
-          <a:p>
-            <a:endParaRPr lang="en-US" dirty="0"/>
-          </a:p>
-        </p:txBody>
-      </p:sp>
-      <p:sp>
-        <p:nvSpPr>
-          <p:cNvPr id="4" name="Slide Number Placeholder 3"/>
-          <p:cNvSpPr>
-            <a:spLocks noGrp="1"/>
-          </p:cNvSpPr>
-          <p:nvPr>
-            <p:ph type="sldNum" sz="quarter" idx="5"/>
-          </p:nvPr>
-        </p:nvSpPr>
-        <p:spPr/>
-        <p:txBody>
-          <a:bodyPr/>
-          <a:lstStyle/>
-          <a:p>
-            <a:fld id="{9C900A82-9926-4DBA-8BA5-A22EEB8ACF8E}" type="slidenum">
-              <a:rPr lang="en-US" smtClean="0"/>
-              <a:t>15</a:t>
-            </a:fld>
-            <a:endParaRPr lang="en-US" dirty="0"/>
-          </a:p>
-        </p:txBody>
-      </p:sp>
-    </p:spTree>
-    <p:extLst>
-      <p:ext uri="{BB962C8B-B14F-4D97-AF65-F5344CB8AC3E}">
-        <p14:creationId xmlns:p14="http://schemas.microsoft.com/office/powerpoint/2010/main" val="1599872789"/>
-      </p:ext>
-    </p:extLst>
-  </p:cSld>
-  <p:clrMapOvr>
-    <a:masterClrMapping/>
-  </p:clrMapOvr>
-</p:notes>
-</file>
-
 <file path=ppt/notesSlides/notesSlide2.xml><?xml version="1.0" encoding="utf-8"?>
 <p:notes xmlns:a="http://schemas.openxmlformats.org/drawingml/2006/main" xmlns:r="http://schemas.openxmlformats.org/officeDocument/2006/relationships" xmlns:p="http://schemas.openxmlformats.org/presentationml/2006/main">
   <p:cSld>
@@ -1529,90 +1019,6 @@
   <p:cSld>
     <p:spTree>
       <p:nvGrpSpPr>
-        <p:cNvPr id="1" name=""/>
-        <p:cNvGrpSpPr/>
-        <p:nvPr/>
-      </p:nvGrpSpPr>
-      <p:grpSpPr>
-        <a:xfrm>
-          <a:off x="0" y="0"/>
-          <a:ext cx="0" cy="0"/>
-          <a:chOff x="0" y="0"/>
-          <a:chExt cx="0" cy="0"/>
-        </a:xfrm>
-      </p:grpSpPr>
-      <p:sp>
-        <p:nvSpPr>
-          <p:cNvPr id="2" name="Slide Image Placeholder 1"/>
-          <p:cNvSpPr>
-            <a:spLocks noGrp="1" noRot="1" noChangeAspect="1"/>
-          </p:cNvSpPr>
-          <p:nvPr>
-            <p:ph type="sldImg"/>
-          </p:nvPr>
-        </p:nvSpPr>
-        <p:spPr/>
-      </p:sp>
-      <p:sp>
-        <p:nvSpPr>
-          <p:cNvPr id="3" name="Notes Placeholder 2"/>
-          <p:cNvSpPr>
-            <a:spLocks noGrp="1"/>
-          </p:cNvSpPr>
-          <p:nvPr>
-            <p:ph type="body" idx="1"/>
-          </p:nvPr>
-        </p:nvSpPr>
-        <p:spPr/>
-        <p:txBody>
-          <a:bodyPr/>
-          <a:lstStyle/>
-          <a:p>
-            <a:endParaRPr lang="en-US" dirty="0"/>
-          </a:p>
-        </p:txBody>
-      </p:sp>
-      <p:sp>
-        <p:nvSpPr>
-          <p:cNvPr id="4" name="Slide Number Placeholder 3"/>
-          <p:cNvSpPr>
-            <a:spLocks noGrp="1"/>
-          </p:cNvSpPr>
-          <p:nvPr>
-            <p:ph type="sldNum" sz="quarter" idx="5"/>
-          </p:nvPr>
-        </p:nvSpPr>
-        <p:spPr/>
-        <p:txBody>
-          <a:bodyPr/>
-          <a:lstStyle/>
-          <a:p>
-            <a:fld id="{9C900A82-9926-4DBA-8BA5-A22EEB8ACF8E}" type="slidenum">
-              <a:rPr lang="en-US" smtClean="0"/>
-              <a:t>5</a:t>
-            </a:fld>
-            <a:endParaRPr lang="en-US" dirty="0"/>
-          </a:p>
-        </p:txBody>
-      </p:sp>
-    </p:spTree>
-    <p:extLst>
-      <p:ext uri="{BB962C8B-B14F-4D97-AF65-F5344CB8AC3E}">
-        <p14:creationId xmlns:p14="http://schemas.microsoft.com/office/powerpoint/2010/main" val="4198010920"/>
-      </p:ext>
-    </p:extLst>
-  </p:cSld>
-  <p:clrMapOvr>
-    <a:masterClrMapping/>
-  </p:clrMapOvr>
-</p:notes>
-</file>
-
-<file path=ppt/notesSlides/notesSlide6.xml><?xml version="1.0" encoding="utf-8"?>
-<p:notes xmlns:a="http://schemas.openxmlformats.org/drawingml/2006/main" xmlns:r="http://schemas.openxmlformats.org/officeDocument/2006/relationships" xmlns:p="http://schemas.openxmlformats.org/presentationml/2006/main">
-  <p:cSld>
-    <p:spTree>
-      <p:nvGrpSpPr>
         <p:cNvPr id="1" name="">
           <a:extLst>
             <a:ext uri="{FF2B5EF4-FFF2-40B4-BE49-F238E27FC236}">
@@ -1697,7 +1103,7 @@
           <a:p>
             <a:fld id="{9C900A82-9926-4DBA-8BA5-A22EEB8ACF8E}" type="slidenum">
               <a:rPr lang="en-US" smtClean="0"/>
-              <a:t>6</a:t>
+              <a:t>5</a:t>
             </a:fld>
             <a:endParaRPr lang="en-US" dirty="0"/>
           </a:p>
@@ -1716,7 +1122,7 @@
 </p:notes>
 </file>
 
-<file path=ppt/notesSlides/notesSlide7.xml><?xml version="1.0" encoding="utf-8"?>
+<file path=ppt/notesSlides/notesSlide6.xml><?xml version="1.0" encoding="utf-8"?>
 <p:notes xmlns:a="http://schemas.openxmlformats.org/drawingml/2006/main" xmlns:r="http://schemas.openxmlformats.org/officeDocument/2006/relationships" xmlns:p="http://schemas.openxmlformats.org/presentationml/2006/main">
   <p:cSld>
     <p:spTree>
@@ -1805,7 +1211,7 @@
           <a:p>
             <a:fld id="{9C900A82-9926-4DBA-8BA5-A22EEB8ACF8E}" type="slidenum">
               <a:rPr lang="en-US" smtClean="0"/>
-              <a:t>7</a:t>
+              <a:t>6</a:t>
             </a:fld>
             <a:endParaRPr lang="en-US" dirty="0"/>
           </a:p>
@@ -1824,7 +1230,7 @@
 </p:notes>
 </file>
 
-<file path=ppt/notesSlides/notesSlide8.xml><?xml version="1.0" encoding="utf-8"?>
+<file path=ppt/notesSlides/notesSlide7.xml><?xml version="1.0" encoding="utf-8"?>
 <p:notes xmlns:a="http://schemas.openxmlformats.org/drawingml/2006/main" xmlns:r="http://schemas.openxmlformats.org/officeDocument/2006/relationships" xmlns:p="http://schemas.openxmlformats.org/presentationml/2006/main">
   <p:cSld>
     <p:spTree>
@@ -1913,7 +1319,7 @@
           <a:p>
             <a:fld id="{9C900A82-9926-4DBA-8BA5-A22EEB8ACF8E}" type="slidenum">
               <a:rPr lang="en-US" smtClean="0"/>
-              <a:t>8</a:t>
+              <a:t>7</a:t>
             </a:fld>
             <a:endParaRPr lang="en-US" dirty="0"/>
           </a:p>
@@ -1923,6 +1329,114 @@
     <p:extLst>
       <p:ext uri="{BB962C8B-B14F-4D97-AF65-F5344CB8AC3E}">
         <p14:creationId xmlns:p14="http://schemas.microsoft.com/office/powerpoint/2010/main" val="1320385941"/>
+      </p:ext>
+    </p:extLst>
+  </p:cSld>
+  <p:clrMapOvr>
+    <a:masterClrMapping/>
+  </p:clrMapOvr>
+</p:notes>
+</file>
+
+<file path=ppt/notesSlides/notesSlide8.xml><?xml version="1.0" encoding="utf-8"?>
+<p:notes xmlns:a="http://schemas.openxmlformats.org/drawingml/2006/main" xmlns:r="http://schemas.openxmlformats.org/officeDocument/2006/relationships" xmlns:p="http://schemas.openxmlformats.org/presentationml/2006/main">
+  <p:cSld>
+    <p:spTree>
+      <p:nvGrpSpPr>
+        <p:cNvPr id="1" name="">
+          <a:extLst>
+            <a:ext uri="{FF2B5EF4-FFF2-40B4-BE49-F238E27FC236}">
+              <a16:creationId xmlns:a16="http://schemas.microsoft.com/office/drawing/2014/main" id="{A37C7746-7647-F4E6-9EB0-ACC476D62377}"/>
+            </a:ext>
+          </a:extLst>
+        </p:cNvPr>
+        <p:cNvGrpSpPr/>
+        <p:nvPr/>
+      </p:nvGrpSpPr>
+      <p:grpSpPr>
+        <a:xfrm>
+          <a:off x="0" y="0"/>
+          <a:ext cx="0" cy="0"/>
+          <a:chOff x="0" y="0"/>
+          <a:chExt cx="0" cy="0"/>
+        </a:xfrm>
+      </p:grpSpPr>
+      <p:sp>
+        <p:nvSpPr>
+          <p:cNvPr id="2" name="Slide Image Placeholder 1">
+            <a:extLst>
+              <a:ext uri="{FF2B5EF4-FFF2-40B4-BE49-F238E27FC236}">
+                <a16:creationId xmlns:a16="http://schemas.microsoft.com/office/drawing/2014/main" id="{95DAED4F-59C3-A35A-95A0-5CCE7076CC47}"/>
+              </a:ext>
+            </a:extLst>
+          </p:cNvPr>
+          <p:cNvSpPr>
+            <a:spLocks noGrp="1" noRot="1" noChangeAspect="1"/>
+          </p:cNvSpPr>
+          <p:nvPr>
+            <p:ph type="sldImg"/>
+          </p:nvPr>
+        </p:nvSpPr>
+        <p:spPr/>
+      </p:sp>
+      <p:sp>
+        <p:nvSpPr>
+          <p:cNvPr id="3" name="Notes Placeholder 2">
+            <a:extLst>
+              <a:ext uri="{FF2B5EF4-FFF2-40B4-BE49-F238E27FC236}">
+                <a16:creationId xmlns:a16="http://schemas.microsoft.com/office/drawing/2014/main" id="{60716454-4C22-A716-7B12-A22334B756F2}"/>
+              </a:ext>
+            </a:extLst>
+          </p:cNvPr>
+          <p:cNvSpPr>
+            <a:spLocks noGrp="1"/>
+          </p:cNvSpPr>
+          <p:nvPr>
+            <p:ph type="body" idx="1"/>
+          </p:nvPr>
+        </p:nvSpPr>
+        <p:spPr/>
+        <p:txBody>
+          <a:bodyPr/>
+          <a:lstStyle/>
+          <a:p>
+            <a:endParaRPr lang="en-US" dirty="0"/>
+          </a:p>
+        </p:txBody>
+      </p:sp>
+      <p:sp>
+        <p:nvSpPr>
+          <p:cNvPr id="4" name="Slide Number Placeholder 3">
+            <a:extLst>
+              <a:ext uri="{FF2B5EF4-FFF2-40B4-BE49-F238E27FC236}">
+                <a16:creationId xmlns:a16="http://schemas.microsoft.com/office/drawing/2014/main" id="{E523FFFA-4B97-B0B5-2E4A-5B2F704C2C75}"/>
+              </a:ext>
+            </a:extLst>
+          </p:cNvPr>
+          <p:cNvSpPr>
+            <a:spLocks noGrp="1"/>
+          </p:cNvSpPr>
+          <p:nvPr>
+            <p:ph type="sldNum" sz="quarter" idx="5"/>
+          </p:nvPr>
+        </p:nvSpPr>
+        <p:spPr/>
+        <p:txBody>
+          <a:bodyPr/>
+          <a:lstStyle/>
+          <a:p>
+            <a:fld id="{9C900A82-9926-4DBA-8BA5-A22EEB8ACF8E}" type="slidenum">
+              <a:rPr lang="en-US" smtClean="0"/>
+              <a:t>8</a:t>
+            </a:fld>
+            <a:endParaRPr lang="en-US" dirty="0"/>
+          </a:p>
+        </p:txBody>
+      </p:sp>
+    </p:spTree>
+    <p:extLst>
+      <p:ext uri="{BB962C8B-B14F-4D97-AF65-F5344CB8AC3E}">
+        <p14:creationId xmlns:p14="http://schemas.microsoft.com/office/powerpoint/2010/main" val="3166966504"/>
       </p:ext>
     </p:extLst>
   </p:cSld>
@@ -2006,7 +1520,7 @@
     </p:spTree>
     <p:extLst>
       <p:ext uri="{BB962C8B-B14F-4D97-AF65-F5344CB8AC3E}">
-        <p14:creationId xmlns:p14="http://schemas.microsoft.com/office/powerpoint/2010/main" val="607878643"/>
+        <p14:creationId xmlns:p14="http://schemas.microsoft.com/office/powerpoint/2010/main" val="1599872789"/>
       </p:ext>
     </p:extLst>
   </p:cSld>
@@ -10743,1517 +10257,6 @@
 </p:sld>
 </file>
 
-<file path=ppt/slides/slide10.xml><?xml version="1.0" encoding="utf-8"?>
-<p:sld xmlns:a="http://schemas.openxmlformats.org/drawingml/2006/main" xmlns:r="http://schemas.openxmlformats.org/officeDocument/2006/relationships" xmlns:p="http://schemas.openxmlformats.org/presentationml/2006/main">
-  <p:cSld>
-    <p:spTree>
-      <p:nvGrpSpPr>
-        <p:cNvPr id="1" name=""/>
-        <p:cNvGrpSpPr/>
-        <p:nvPr/>
-      </p:nvGrpSpPr>
-      <p:grpSpPr>
-        <a:xfrm>
-          <a:off x="0" y="0"/>
-          <a:ext cx="0" cy="0"/>
-          <a:chOff x="0" y="0"/>
-          <a:chExt cx="0" cy="0"/>
-        </a:xfrm>
-      </p:grpSpPr>
-      <p:sp>
-        <p:nvSpPr>
-          <p:cNvPr id="2" name="Title 1">
-            <a:extLst>
-              <a:ext uri="{FF2B5EF4-FFF2-40B4-BE49-F238E27FC236}">
-                <a16:creationId xmlns:a16="http://schemas.microsoft.com/office/drawing/2014/main" id="{A0952A0C-ED2A-077C-70BC-DEB140E04A7B}"/>
-              </a:ext>
-            </a:extLst>
-          </p:cNvPr>
-          <p:cNvSpPr>
-            <a:spLocks noGrp="1"/>
-          </p:cNvSpPr>
-          <p:nvPr>
-            <p:ph type="title"/>
-          </p:nvPr>
-        </p:nvSpPr>
-        <p:spPr>
-          <a:xfrm>
-            <a:off x="677334" y="694944"/>
-            <a:ext cx="3789177" cy="4572000"/>
-          </a:xfrm>
-        </p:spPr>
-        <p:txBody>
-          <a:bodyPr/>
-          <a:lstStyle/>
-          <a:p>
-            <a:r>
-              <a:rPr lang="en-US" dirty="0"/>
-              <a:t>Financial overview</a:t>
-            </a:r>
-          </a:p>
-        </p:txBody>
-      </p:sp>
-      <p:sp>
-        <p:nvSpPr>
-          <p:cNvPr id="3" name="Content Placeholder 2">
-            <a:extLst>
-              <a:ext uri="{FF2B5EF4-FFF2-40B4-BE49-F238E27FC236}">
-                <a16:creationId xmlns:a16="http://schemas.microsoft.com/office/drawing/2014/main" id="{8E9FC3B2-3EF0-BDB4-4819-4161FC7EEF1A}"/>
-              </a:ext>
-            </a:extLst>
-          </p:cNvPr>
-          <p:cNvSpPr>
-            <a:spLocks noGrp="1"/>
-          </p:cNvSpPr>
-          <p:nvPr>
-            <p:ph idx="1"/>
-          </p:nvPr>
-        </p:nvSpPr>
-        <p:spPr>
-          <a:xfrm>
-            <a:off x="5753101" y="862641"/>
-            <a:ext cx="4339805" cy="2566357"/>
-          </a:xfrm>
-        </p:spPr>
-        <p:txBody>
-          <a:bodyPr/>
-          <a:lstStyle/>
-          <a:p>
-            <a:r>
-              <a:rPr lang="en-US" dirty="0"/>
-              <a:t>Our financial overview reflects a robust and resilient fiscal performance.</a:t>
-            </a:r>
-          </a:p>
-          <a:p>
-            <a:r>
-              <a:rPr lang="en-US" dirty="0"/>
-              <a:t>Key indicators show consistent revenue growth over the past quarter, attributed to strategic cost management and successful marketing.</a:t>
-            </a:r>
-          </a:p>
-        </p:txBody>
-      </p:sp>
-      <p:sp>
-        <p:nvSpPr>
-          <p:cNvPr id="4" name="Content Placeholder 3">
-            <a:extLst>
-              <a:ext uri="{FF2B5EF4-FFF2-40B4-BE49-F238E27FC236}">
-                <a16:creationId xmlns:a16="http://schemas.microsoft.com/office/drawing/2014/main" id="{8F149607-A897-2741-D897-4F179735F7A3}"/>
-              </a:ext>
-            </a:extLst>
-          </p:cNvPr>
-          <p:cNvSpPr>
-            <a:spLocks noGrp="1"/>
-          </p:cNvSpPr>
-          <p:nvPr>
-            <p:ph idx="12"/>
-          </p:nvPr>
-        </p:nvSpPr>
-        <p:spPr>
-          <a:xfrm>
-            <a:off x="5753101" y="3657818"/>
-            <a:ext cx="4339805" cy="2734053"/>
-          </a:xfrm>
-        </p:spPr>
-        <p:txBody>
-          <a:bodyPr/>
-          <a:lstStyle/>
-          <a:p>
-            <a:r>
-              <a:rPr lang="en-US" dirty="0"/>
-              <a:t>Operating margins have improved, signaling operational efficiency, while strengthening our reserves.</a:t>
-            </a:r>
-          </a:p>
-          <a:p>
-            <a:r>
-              <a:rPr lang="en-US" dirty="0"/>
-              <a:t>This underscores our commitment to financial stability, positioning us for sustained growth. </a:t>
-            </a:r>
-          </a:p>
-        </p:txBody>
-      </p:sp>
-    </p:spTree>
-    <p:extLst>
-      <p:ext uri="{BB962C8B-B14F-4D97-AF65-F5344CB8AC3E}">
-        <p14:creationId xmlns:p14="http://schemas.microsoft.com/office/powerpoint/2010/main" val="3513107352"/>
-      </p:ext>
-    </p:extLst>
-  </p:cSld>
-  <p:clrMapOvr>
-    <a:masterClrMapping/>
-  </p:clrMapOvr>
-</p:sld>
-</file>
-
-<file path=ppt/slides/slide11.xml><?xml version="1.0" encoding="utf-8"?>
-<p:sld xmlns:a="http://schemas.openxmlformats.org/drawingml/2006/main" xmlns:r="http://schemas.openxmlformats.org/officeDocument/2006/relationships" xmlns:p="http://schemas.openxmlformats.org/presentationml/2006/main">
-  <p:cSld>
-    <p:spTree>
-      <p:nvGrpSpPr>
-        <p:cNvPr id="1" name=""/>
-        <p:cNvGrpSpPr/>
-        <p:nvPr/>
-      </p:nvGrpSpPr>
-      <p:grpSpPr>
-        <a:xfrm>
-          <a:off x="0" y="0"/>
-          <a:ext cx="0" cy="0"/>
-          <a:chOff x="0" y="0"/>
-          <a:chExt cx="0" cy="0"/>
-        </a:xfrm>
-      </p:grpSpPr>
-      <p:sp>
-        <p:nvSpPr>
-          <p:cNvPr id="3" name="Title 2">
-            <a:extLst>
-              <a:ext uri="{FF2B5EF4-FFF2-40B4-BE49-F238E27FC236}">
-                <a16:creationId xmlns:a16="http://schemas.microsoft.com/office/drawing/2014/main" id="{2633516D-AB15-124A-1833-DD5D9DE9CF65}"/>
-              </a:ext>
-            </a:extLst>
-          </p:cNvPr>
-          <p:cNvSpPr>
-            <a:spLocks noGrp="1"/>
-          </p:cNvSpPr>
-          <p:nvPr>
-            <p:ph type="title"/>
-          </p:nvPr>
-        </p:nvSpPr>
-        <p:spPr>
-          <a:xfrm>
-            <a:off x="677334" y="694945"/>
-            <a:ext cx="10058400" cy="1280160"/>
-          </a:xfrm>
-        </p:spPr>
-        <p:txBody>
-          <a:bodyPr/>
-          <a:lstStyle/>
-          <a:p>
-            <a:r>
-              <a:rPr lang="en-US" dirty="0"/>
-              <a:t>Quarterly targets</a:t>
-            </a:r>
-          </a:p>
-        </p:txBody>
-      </p:sp>
-      <p:sp>
-        <p:nvSpPr>
-          <p:cNvPr id="4" name="Content Placeholder 3">
-            <a:extLst>
-              <a:ext uri="{FF2B5EF4-FFF2-40B4-BE49-F238E27FC236}">
-                <a16:creationId xmlns:a16="http://schemas.microsoft.com/office/drawing/2014/main" id="{C69773C3-E729-93EA-2151-22EB12BF1BE0}"/>
-              </a:ext>
-            </a:extLst>
-          </p:cNvPr>
-          <p:cNvSpPr>
-            <a:spLocks noGrp="1"/>
-          </p:cNvSpPr>
-          <p:nvPr>
-            <p:ph sz="quarter" idx="13"/>
-          </p:nvPr>
-        </p:nvSpPr>
-        <p:spPr>
-          <a:xfrm>
-            <a:off x="686741" y="2140864"/>
-            <a:ext cx="3797114" cy="3494753"/>
-          </a:xfrm>
-        </p:spPr>
-        <p:txBody>
-          <a:bodyPr/>
-          <a:lstStyle/>
-          <a:p>
-            <a:r>
-              <a:rPr lang="en-US" dirty="0"/>
-              <a:t>Market expansion</a:t>
-            </a:r>
-          </a:p>
-          <a:p>
-            <a:r>
-              <a:rPr lang="en-US" dirty="0"/>
-              <a:t>Product innovation</a:t>
-            </a:r>
-          </a:p>
-          <a:p>
-            <a:r>
-              <a:rPr lang="en-US" dirty="0"/>
-              <a:t>Customer retention</a:t>
-            </a:r>
-          </a:p>
-          <a:p>
-            <a:r>
-              <a:rPr lang="en-US" dirty="0"/>
-              <a:t>Operational efficiency</a:t>
-            </a:r>
-          </a:p>
-          <a:p>
-            <a:endParaRPr lang="en-US" dirty="0"/>
-          </a:p>
-        </p:txBody>
-      </p:sp>
-      <p:graphicFrame>
-        <p:nvGraphicFramePr>
-          <p:cNvPr id="5" name="Table Placeholder 2">
-            <a:extLst>
-              <a:ext uri="{FF2B5EF4-FFF2-40B4-BE49-F238E27FC236}">
-                <a16:creationId xmlns:a16="http://schemas.microsoft.com/office/drawing/2014/main" id="{75268C26-696B-469B-6E84-E2DA897FB4F4}"/>
-              </a:ext>
-            </a:extLst>
-          </p:cNvPr>
-          <p:cNvGraphicFramePr>
-            <a:graphicFrameLocks noGrp="1"/>
-          </p:cNvGraphicFramePr>
-          <p:nvPr>
-            <p:ph type="tbl" sz="quarter" idx="14"/>
-            <p:extLst>
-              <p:ext uri="{D42A27DB-BD31-4B8C-83A1-F6EECF244321}">
-                <p14:modId xmlns:p14="http://schemas.microsoft.com/office/powerpoint/2010/main" val="1368234980"/>
-              </p:ext>
-            </p:extLst>
-          </p:nvPr>
-        </p:nvGraphicFramePr>
-        <p:xfrm>
-          <a:off x="5054600" y="2103438"/>
-          <a:ext cx="6451600" cy="3524216"/>
-        </p:xfrm>
-        <a:graphic>
-          <a:graphicData uri="http://schemas.openxmlformats.org/drawingml/2006/table">
-            <a:tbl>
-              <a:tblPr firstRow="1" bandRow="1">
-                <a:tableStyleId>{7E9639D4-E3E2-4D34-9284-5A2195B3D0D7}</a:tableStyleId>
-              </a:tblPr>
-              <a:tblGrid>
-                <a:gridCol w="1612900">
-                  <a:extLst>
-                    <a:ext uri="{9D8B030D-6E8A-4147-A177-3AD203B41FA5}">
-                      <a16:colId xmlns:a16="http://schemas.microsoft.com/office/drawing/2014/main" val="30750867"/>
-                    </a:ext>
-                  </a:extLst>
-                </a:gridCol>
-                <a:gridCol w="1612900">
-                  <a:extLst>
-                    <a:ext uri="{9D8B030D-6E8A-4147-A177-3AD203B41FA5}">
-                      <a16:colId xmlns:a16="http://schemas.microsoft.com/office/drawing/2014/main" val="1038941322"/>
-                    </a:ext>
-                  </a:extLst>
-                </a:gridCol>
-                <a:gridCol w="1612900">
-                  <a:extLst>
-                    <a:ext uri="{9D8B030D-6E8A-4147-A177-3AD203B41FA5}">
-                      <a16:colId xmlns:a16="http://schemas.microsoft.com/office/drawing/2014/main" val="529645500"/>
-                    </a:ext>
-                  </a:extLst>
-                </a:gridCol>
-                <a:gridCol w="1612900">
-                  <a:extLst>
-                    <a:ext uri="{9D8B030D-6E8A-4147-A177-3AD203B41FA5}">
-                      <a16:colId xmlns:a16="http://schemas.microsoft.com/office/drawing/2014/main" val="3469610457"/>
-                    </a:ext>
-                  </a:extLst>
-                </a:gridCol>
-              </a:tblGrid>
-              <a:tr h="930012">
-                <a:tc>
-                  <a:txBody>
-                    <a:bodyPr/>
-                    <a:lstStyle/>
-                    <a:p>
-                      <a:pPr algn="ctr"/>
-                      <a:r>
-                        <a:rPr lang="en-US" dirty="0"/>
-                        <a:t>Quarter</a:t>
-                      </a:r>
-                    </a:p>
-                  </a:txBody>
-                  <a:tcPr anchor="ctr"/>
-                </a:tc>
-                <a:tc>
-                  <a:txBody>
-                    <a:bodyPr/>
-                    <a:lstStyle/>
-                    <a:p>
-                      <a:pPr algn="ctr"/>
-                      <a:r>
-                        <a:rPr lang="en-US" dirty="0"/>
-                        <a:t>Revenue growth (%)</a:t>
-                      </a:r>
-                    </a:p>
-                  </a:txBody>
-                  <a:tcPr anchor="ctr"/>
-                </a:tc>
-                <a:tc>
-                  <a:txBody>
-                    <a:bodyPr/>
-                    <a:lstStyle/>
-                    <a:p>
-                      <a:pPr algn="ctr"/>
-                      <a:r>
-                        <a:rPr lang="en-US" dirty="0"/>
-                        <a:t>Market share increase (%)</a:t>
-                      </a:r>
-                    </a:p>
-                  </a:txBody>
-                  <a:tcPr anchor="ctr"/>
-                </a:tc>
-                <a:tc>
-                  <a:txBody>
-                    <a:bodyPr/>
-                    <a:lstStyle/>
-                    <a:p>
-                      <a:pPr algn="ctr"/>
-                      <a:r>
-                        <a:rPr lang="en-US" dirty="0"/>
-                        <a:t>Customer acquisition</a:t>
-                      </a:r>
-                    </a:p>
-                  </a:txBody>
-                  <a:tcPr anchor="ctr"/>
-                </a:tc>
-                <a:extLst>
-                  <a:ext uri="{0D108BD9-81ED-4DB2-BD59-A6C34878D82A}">
-                    <a16:rowId xmlns:a16="http://schemas.microsoft.com/office/drawing/2014/main" val="4251432886"/>
-                  </a:ext>
-                </a:extLst>
-              </a:tr>
-              <a:tr h="648551">
-                <a:tc>
-                  <a:txBody>
-                    <a:bodyPr/>
-                    <a:lstStyle/>
-                    <a:p>
-                      <a:pPr algn="ctr"/>
-                      <a:r>
-                        <a:rPr lang="en-US" dirty="0"/>
-                        <a:t>Q1</a:t>
-                      </a:r>
-                    </a:p>
-                  </a:txBody>
-                  <a:tcPr anchor="ctr"/>
-                </a:tc>
-                <a:tc>
-                  <a:txBody>
-                    <a:bodyPr/>
-                    <a:lstStyle/>
-                    <a:p>
-                      <a:pPr algn="ctr"/>
-                      <a:r>
-                        <a:rPr lang="en-US" dirty="0"/>
-                        <a:t>12</a:t>
-                      </a:r>
-                    </a:p>
-                  </a:txBody>
-                  <a:tcPr anchor="ctr"/>
-                </a:tc>
-                <a:tc>
-                  <a:txBody>
-                    <a:bodyPr/>
-                    <a:lstStyle/>
-                    <a:p>
-                      <a:pPr algn="ctr"/>
-                      <a:r>
-                        <a:rPr lang="en-US" dirty="0"/>
-                        <a:t>2</a:t>
-                      </a:r>
-                    </a:p>
-                  </a:txBody>
-                  <a:tcPr anchor="ctr"/>
-                </a:tc>
-                <a:tc>
-                  <a:txBody>
-                    <a:bodyPr/>
-                    <a:lstStyle/>
-                    <a:p>
-                      <a:pPr algn="ctr"/>
-                      <a:r>
-                        <a:rPr lang="en-US" dirty="0"/>
-                        <a:t>500</a:t>
-                      </a:r>
-                    </a:p>
-                  </a:txBody>
-                  <a:tcPr anchor="ctr"/>
-                </a:tc>
-                <a:extLst>
-                  <a:ext uri="{0D108BD9-81ED-4DB2-BD59-A6C34878D82A}">
-                    <a16:rowId xmlns:a16="http://schemas.microsoft.com/office/drawing/2014/main" val="360240625"/>
-                  </a:ext>
-                </a:extLst>
-              </a:tr>
-              <a:tr h="648551">
-                <a:tc>
-                  <a:txBody>
-                    <a:bodyPr/>
-                    <a:lstStyle/>
-                    <a:p>
-                      <a:pPr algn="ctr"/>
-                      <a:r>
-                        <a:rPr lang="en-US" dirty="0"/>
-                        <a:t>Q2</a:t>
-                      </a:r>
-                    </a:p>
-                  </a:txBody>
-                  <a:tcPr anchor="ctr"/>
-                </a:tc>
-                <a:tc>
-                  <a:txBody>
-                    <a:bodyPr/>
-                    <a:lstStyle/>
-                    <a:p>
-                      <a:pPr algn="ctr"/>
-                      <a:r>
-                        <a:rPr lang="en-US" dirty="0"/>
-                        <a:t>15</a:t>
-                      </a:r>
-                    </a:p>
-                  </a:txBody>
-                  <a:tcPr anchor="ctr"/>
-                </a:tc>
-                <a:tc>
-                  <a:txBody>
-                    <a:bodyPr/>
-                    <a:lstStyle/>
-                    <a:p>
-                      <a:pPr algn="ctr"/>
-                      <a:r>
-                        <a:rPr lang="en-US" dirty="0"/>
-                        <a:t>3</a:t>
-                      </a:r>
-                    </a:p>
-                  </a:txBody>
-                  <a:tcPr anchor="ctr"/>
-                </a:tc>
-                <a:tc>
-                  <a:txBody>
-                    <a:bodyPr/>
-                    <a:lstStyle/>
-                    <a:p>
-                      <a:pPr algn="ctr"/>
-                      <a:r>
-                        <a:rPr lang="en-US" dirty="0"/>
-                        <a:t>600</a:t>
-                      </a:r>
-                    </a:p>
-                  </a:txBody>
-                  <a:tcPr anchor="ctr"/>
-                </a:tc>
-                <a:extLst>
-                  <a:ext uri="{0D108BD9-81ED-4DB2-BD59-A6C34878D82A}">
-                    <a16:rowId xmlns:a16="http://schemas.microsoft.com/office/drawing/2014/main" val="2762393470"/>
-                  </a:ext>
-                </a:extLst>
-              </a:tr>
-              <a:tr h="648551">
-                <a:tc>
-                  <a:txBody>
-                    <a:bodyPr/>
-                    <a:lstStyle/>
-                    <a:p>
-                      <a:pPr algn="ctr"/>
-                      <a:r>
-                        <a:rPr lang="en-US" dirty="0"/>
-                        <a:t>Q3</a:t>
-                      </a:r>
-                    </a:p>
-                  </a:txBody>
-                  <a:tcPr anchor="ctr"/>
-                </a:tc>
-                <a:tc>
-                  <a:txBody>
-                    <a:bodyPr/>
-                    <a:lstStyle/>
-                    <a:p>
-                      <a:pPr algn="ctr"/>
-                      <a:r>
-                        <a:rPr lang="en-US" dirty="0"/>
-                        <a:t>18</a:t>
-                      </a:r>
-                    </a:p>
-                  </a:txBody>
-                  <a:tcPr anchor="ctr"/>
-                </a:tc>
-                <a:tc>
-                  <a:txBody>
-                    <a:bodyPr/>
-                    <a:lstStyle/>
-                    <a:p>
-                      <a:pPr algn="ctr"/>
-                      <a:r>
-                        <a:rPr lang="en-US" dirty="0"/>
-                        <a:t>4</a:t>
-                      </a:r>
-                    </a:p>
-                  </a:txBody>
-                  <a:tcPr anchor="ctr"/>
-                </a:tc>
-                <a:tc>
-                  <a:txBody>
-                    <a:bodyPr/>
-                    <a:lstStyle/>
-                    <a:p>
-                      <a:pPr algn="ctr"/>
-                      <a:r>
-                        <a:rPr lang="en-US" dirty="0"/>
-                        <a:t>700</a:t>
-                      </a:r>
-                    </a:p>
-                  </a:txBody>
-                  <a:tcPr anchor="ctr"/>
-                </a:tc>
-                <a:extLst>
-                  <a:ext uri="{0D108BD9-81ED-4DB2-BD59-A6C34878D82A}">
-                    <a16:rowId xmlns:a16="http://schemas.microsoft.com/office/drawing/2014/main" val="1311364400"/>
-                  </a:ext>
-                </a:extLst>
-              </a:tr>
-              <a:tr h="648551">
-                <a:tc>
-                  <a:txBody>
-                    <a:bodyPr/>
-                    <a:lstStyle/>
-                    <a:p>
-                      <a:pPr algn="ctr"/>
-                      <a:r>
-                        <a:rPr lang="en-US" dirty="0"/>
-                        <a:t>Q4</a:t>
-                      </a:r>
-                    </a:p>
-                  </a:txBody>
-                  <a:tcPr anchor="ctr"/>
-                </a:tc>
-                <a:tc>
-                  <a:txBody>
-                    <a:bodyPr/>
-                    <a:lstStyle/>
-                    <a:p>
-                      <a:pPr algn="ctr"/>
-                      <a:r>
-                        <a:rPr lang="en-US" dirty="0"/>
-                        <a:t>20</a:t>
-                      </a:r>
-                    </a:p>
-                  </a:txBody>
-                  <a:tcPr anchor="ctr"/>
-                </a:tc>
-                <a:tc>
-                  <a:txBody>
-                    <a:bodyPr/>
-                    <a:lstStyle/>
-                    <a:p>
-                      <a:pPr algn="ctr"/>
-                      <a:r>
-                        <a:rPr lang="en-US" dirty="0"/>
-                        <a:t>5</a:t>
-                      </a:r>
-                    </a:p>
-                  </a:txBody>
-                  <a:tcPr anchor="ctr"/>
-                </a:tc>
-                <a:tc>
-                  <a:txBody>
-                    <a:bodyPr/>
-                    <a:lstStyle/>
-                    <a:p>
-                      <a:pPr algn="ctr"/>
-                      <a:r>
-                        <a:rPr lang="en-US" dirty="0"/>
-                        <a:t>800</a:t>
-                      </a:r>
-                    </a:p>
-                  </a:txBody>
-                  <a:tcPr anchor="ctr"/>
-                </a:tc>
-                <a:extLst>
-                  <a:ext uri="{0D108BD9-81ED-4DB2-BD59-A6C34878D82A}">
-                    <a16:rowId xmlns:a16="http://schemas.microsoft.com/office/drawing/2014/main" val="2526263980"/>
-                  </a:ext>
-                </a:extLst>
-              </a:tr>
-            </a:tbl>
-          </a:graphicData>
-        </a:graphic>
-      </p:graphicFrame>
-    </p:spTree>
-    <p:extLst>
-      <p:ext uri="{BB962C8B-B14F-4D97-AF65-F5344CB8AC3E}">
-        <p14:creationId xmlns:p14="http://schemas.microsoft.com/office/powerpoint/2010/main" val="3648998020"/>
-      </p:ext>
-    </p:extLst>
-  </p:cSld>
-  <p:clrMapOvr>
-    <a:masterClrMapping/>
-  </p:clrMapOvr>
-</p:sld>
-</file>
-
-<file path=ppt/slides/slide12.xml><?xml version="1.0" encoding="utf-8"?>
-<p:sld xmlns:a="http://schemas.openxmlformats.org/drawingml/2006/main" xmlns:r="http://schemas.openxmlformats.org/officeDocument/2006/relationships" xmlns:p="http://schemas.openxmlformats.org/presentationml/2006/main">
-  <p:cSld>
-    <p:spTree>
-      <p:nvGrpSpPr>
-        <p:cNvPr id="1" name=""/>
-        <p:cNvGrpSpPr/>
-        <p:nvPr/>
-      </p:nvGrpSpPr>
-      <p:grpSpPr>
-        <a:xfrm>
-          <a:off x="0" y="0"/>
-          <a:ext cx="0" cy="0"/>
-          <a:chOff x="0" y="0"/>
-          <a:chExt cx="0" cy="0"/>
-        </a:xfrm>
-      </p:grpSpPr>
-      <p:sp>
-        <p:nvSpPr>
-          <p:cNvPr id="2" name="Title 1">
-            <a:extLst>
-              <a:ext uri="{FF2B5EF4-FFF2-40B4-BE49-F238E27FC236}">
-                <a16:creationId xmlns:a16="http://schemas.microsoft.com/office/drawing/2014/main" id="{F23D827C-C581-E816-3880-8B429F22C0BC}"/>
-              </a:ext>
-            </a:extLst>
-          </p:cNvPr>
-          <p:cNvSpPr>
-            <a:spLocks noGrp="1"/>
-          </p:cNvSpPr>
-          <p:nvPr>
-            <p:ph type="title"/>
-          </p:nvPr>
-        </p:nvSpPr>
-        <p:spPr>
-          <a:xfrm>
-            <a:off x="677334" y="694945"/>
-            <a:ext cx="10058400" cy="1280160"/>
-          </a:xfrm>
-        </p:spPr>
-        <p:txBody>
-          <a:bodyPr/>
-          <a:lstStyle/>
-          <a:p>
-            <a:r>
-              <a:rPr lang="en-US" dirty="0"/>
-              <a:t>Financial snapshot</a:t>
-            </a:r>
-          </a:p>
-        </p:txBody>
-      </p:sp>
-      <p:graphicFrame>
-        <p:nvGraphicFramePr>
-          <p:cNvPr id="6" name="Table Placeholder 3">
-            <a:extLst>
-              <a:ext uri="{FF2B5EF4-FFF2-40B4-BE49-F238E27FC236}">
-                <a16:creationId xmlns:a16="http://schemas.microsoft.com/office/drawing/2014/main" id="{3C210E2F-B4AE-58E3-BD38-70314D20862F}"/>
-              </a:ext>
-            </a:extLst>
-          </p:cNvPr>
-          <p:cNvGraphicFramePr>
-            <a:graphicFrameLocks noGrp="1"/>
-          </p:cNvGraphicFramePr>
-          <p:nvPr>
-            <p:ph type="tbl" sz="quarter" idx="12"/>
-            <p:extLst>
-              <p:ext uri="{D42A27DB-BD31-4B8C-83A1-F6EECF244321}">
-                <p14:modId xmlns:p14="http://schemas.microsoft.com/office/powerpoint/2010/main" val="1854821331"/>
-              </p:ext>
-            </p:extLst>
-          </p:nvPr>
-        </p:nvGraphicFramePr>
-        <p:xfrm>
-          <a:off x="685800" y="2103438"/>
-          <a:ext cx="10828868" cy="3702875"/>
-        </p:xfrm>
-        <a:graphic>
-          <a:graphicData uri="http://schemas.openxmlformats.org/drawingml/2006/table">
-            <a:tbl>
-              <a:tblPr firstRow="1" bandRow="1">
-                <a:tableStyleId>{7E9639D4-E3E2-4D34-9284-5A2195B3D0D7}</a:tableStyleId>
-              </a:tblPr>
-              <a:tblGrid>
-                <a:gridCol w="2707217">
-                  <a:extLst>
-                    <a:ext uri="{9D8B030D-6E8A-4147-A177-3AD203B41FA5}">
-                      <a16:colId xmlns:a16="http://schemas.microsoft.com/office/drawing/2014/main" val="130956065"/>
-                    </a:ext>
-                  </a:extLst>
-                </a:gridCol>
-                <a:gridCol w="2707217">
-                  <a:extLst>
-                    <a:ext uri="{9D8B030D-6E8A-4147-A177-3AD203B41FA5}">
-                      <a16:colId xmlns:a16="http://schemas.microsoft.com/office/drawing/2014/main" val="2749965458"/>
-                    </a:ext>
-                  </a:extLst>
-                </a:gridCol>
-                <a:gridCol w="2707217">
-                  <a:extLst>
-                    <a:ext uri="{9D8B030D-6E8A-4147-A177-3AD203B41FA5}">
-                      <a16:colId xmlns:a16="http://schemas.microsoft.com/office/drawing/2014/main" val="2116711163"/>
-                    </a:ext>
-                  </a:extLst>
-                </a:gridCol>
-                <a:gridCol w="2707217">
-                  <a:extLst>
-                    <a:ext uri="{9D8B030D-6E8A-4147-A177-3AD203B41FA5}">
-                      <a16:colId xmlns:a16="http://schemas.microsoft.com/office/drawing/2014/main" val="1186885001"/>
-                    </a:ext>
-                  </a:extLst>
-                </a:gridCol>
-              </a:tblGrid>
-              <a:tr h="918860">
-                <a:tc>
-                  <a:txBody>
-                    <a:bodyPr/>
-                    <a:lstStyle/>
-                    <a:p>
-                      <a:pPr algn="ctr"/>
-                      <a:r>
-                        <a:rPr lang="en-US" dirty="0"/>
-                        <a:t>Metric</a:t>
-                      </a:r>
-                    </a:p>
-                  </a:txBody>
-                  <a:tcPr anchor="ctr"/>
-                </a:tc>
-                <a:tc>
-                  <a:txBody>
-                    <a:bodyPr/>
-                    <a:lstStyle/>
-                    <a:p>
-                      <a:pPr algn="ctr"/>
-                      <a:r>
-                        <a:rPr lang="en-US" dirty="0"/>
-                        <a:t>Current value</a:t>
-                      </a:r>
-                    </a:p>
-                  </a:txBody>
-                  <a:tcPr anchor="ctr"/>
-                </a:tc>
-                <a:tc>
-                  <a:txBody>
-                    <a:bodyPr/>
-                    <a:lstStyle/>
-                    <a:p>
-                      <a:pPr algn="ctr"/>
-                      <a:r>
-                        <a:rPr lang="en-US" dirty="0"/>
-                        <a:t>Previous quarter</a:t>
-                      </a:r>
-                    </a:p>
-                  </a:txBody>
-                  <a:tcPr anchor="ctr"/>
-                </a:tc>
-                <a:tc>
-                  <a:txBody>
-                    <a:bodyPr/>
-                    <a:lstStyle/>
-                    <a:p>
-                      <a:pPr algn="ctr"/>
-                      <a:r>
-                        <a:rPr lang="en-US" dirty="0"/>
-                        <a:t>Change (%)</a:t>
-                      </a:r>
-                    </a:p>
-                  </a:txBody>
-                  <a:tcPr anchor="ctr"/>
-                </a:tc>
-                <a:extLst>
-                  <a:ext uri="{0D108BD9-81ED-4DB2-BD59-A6C34878D82A}">
-                    <a16:rowId xmlns:a16="http://schemas.microsoft.com/office/drawing/2014/main" val="3741017008"/>
-                  </a:ext>
-                </a:extLst>
-              </a:tr>
-              <a:tr h="556803">
-                <a:tc>
-                  <a:txBody>
-                    <a:bodyPr/>
-                    <a:lstStyle/>
-                    <a:p>
-                      <a:pPr algn="ctr"/>
-                      <a:r>
-                        <a:rPr lang="en-US" dirty="0"/>
-                        <a:t>Revenue</a:t>
-                      </a:r>
-                    </a:p>
-                  </a:txBody>
-                  <a:tcPr anchor="ctr"/>
-                </a:tc>
-                <a:tc>
-                  <a:txBody>
-                    <a:bodyPr/>
-                    <a:lstStyle/>
-                    <a:p>
-                      <a:pPr algn="ctr"/>
-                      <a:r>
-                        <a:rPr lang="en-US" dirty="0"/>
-                        <a:t>$2,500,000</a:t>
-                      </a:r>
-                    </a:p>
-                  </a:txBody>
-                  <a:tcPr anchor="ctr"/>
-                </a:tc>
-                <a:tc>
-                  <a:txBody>
-                    <a:bodyPr/>
-                    <a:lstStyle/>
-                    <a:p>
-                      <a:pPr algn="ctr"/>
-                      <a:r>
-                        <a:rPr lang="en-US" dirty="0"/>
-                        <a:t>2,200,000</a:t>
-                      </a:r>
-                    </a:p>
-                  </a:txBody>
-                  <a:tcPr anchor="ctr"/>
-                </a:tc>
-                <a:tc>
-                  <a:txBody>
-                    <a:bodyPr/>
-                    <a:lstStyle/>
-                    <a:p>
-                      <a:pPr algn="ctr"/>
-                      <a:r>
-                        <a:rPr lang="en-US" dirty="0"/>
-                        <a:t>+14%</a:t>
-                      </a:r>
-                    </a:p>
-                  </a:txBody>
-                  <a:tcPr anchor="ctr"/>
-                </a:tc>
-                <a:extLst>
-                  <a:ext uri="{0D108BD9-81ED-4DB2-BD59-A6C34878D82A}">
-                    <a16:rowId xmlns:a16="http://schemas.microsoft.com/office/drawing/2014/main" val="511888340"/>
-                  </a:ext>
-                </a:extLst>
-              </a:tr>
-              <a:tr h="556803">
-                <a:tc>
-                  <a:txBody>
-                    <a:bodyPr/>
-                    <a:lstStyle/>
-                    <a:p>
-                      <a:pPr algn="ctr"/>
-                      <a:r>
-                        <a:rPr lang="en-US" dirty="0"/>
-                        <a:t>Operating expenses</a:t>
-                      </a:r>
-                    </a:p>
-                  </a:txBody>
-                  <a:tcPr anchor="ctr"/>
-                </a:tc>
-                <a:tc>
-                  <a:txBody>
-                    <a:bodyPr/>
-                    <a:lstStyle/>
-                    <a:p>
-                      <a:pPr algn="ctr"/>
-                      <a:r>
-                        <a:rPr lang="en-US" dirty="0"/>
-                        <a:t>$1,200,000	</a:t>
-                      </a:r>
-                    </a:p>
-                  </a:txBody>
-                  <a:tcPr anchor="ctr"/>
-                </a:tc>
-                <a:tc>
-                  <a:txBody>
-                    <a:bodyPr/>
-                    <a:lstStyle/>
-                    <a:p>
-                      <a:pPr algn="ctr"/>
-                      <a:r>
-                        <a:rPr lang="en-US" dirty="0"/>
-                        <a:t>$1,400,000	</a:t>
-                      </a:r>
-                    </a:p>
-                  </a:txBody>
-                  <a:tcPr anchor="ctr"/>
-                </a:tc>
-                <a:tc>
-                  <a:txBody>
-                    <a:bodyPr/>
-                    <a:lstStyle/>
-                    <a:p>
-                      <a:pPr algn="ctr"/>
-                      <a:r>
-                        <a:rPr lang="en-US" dirty="0"/>
-                        <a:t>-14%</a:t>
-                      </a:r>
-                    </a:p>
-                  </a:txBody>
-                  <a:tcPr anchor="ctr"/>
-                </a:tc>
-                <a:extLst>
-                  <a:ext uri="{0D108BD9-81ED-4DB2-BD59-A6C34878D82A}">
-                    <a16:rowId xmlns:a16="http://schemas.microsoft.com/office/drawing/2014/main" val="3937089168"/>
-                  </a:ext>
-                </a:extLst>
-              </a:tr>
-              <a:tr h="556803">
-                <a:tc>
-                  <a:txBody>
-                    <a:bodyPr/>
-                    <a:lstStyle/>
-                    <a:p>
-                      <a:pPr algn="ctr"/>
-                      <a:r>
-                        <a:rPr lang="en-US" dirty="0"/>
-                        <a:t>Net profit</a:t>
-                      </a:r>
-                    </a:p>
-                  </a:txBody>
-                  <a:tcPr anchor="ctr"/>
-                </a:tc>
-                <a:tc>
-                  <a:txBody>
-                    <a:bodyPr/>
-                    <a:lstStyle/>
-                    <a:p>
-                      <a:pPr algn="ctr"/>
-                      <a:r>
-                        <a:rPr lang="en-US" dirty="0"/>
-                        <a:t>$1,000,000	</a:t>
-                      </a:r>
-                    </a:p>
-                  </a:txBody>
-                  <a:tcPr anchor="ctr"/>
-                </a:tc>
-                <a:tc>
-                  <a:txBody>
-                    <a:bodyPr/>
-                    <a:lstStyle/>
-                    <a:p>
-                      <a:pPr algn="ctr"/>
-                      <a:r>
-                        <a:rPr lang="en-US" dirty="0"/>
-                        <a:t>$800,000	</a:t>
-                      </a:r>
-                    </a:p>
-                  </a:txBody>
-                  <a:tcPr anchor="ctr"/>
-                </a:tc>
-                <a:tc>
-                  <a:txBody>
-                    <a:bodyPr/>
-                    <a:lstStyle/>
-                    <a:p>
-                      <a:pPr algn="ctr"/>
-                      <a:r>
-                        <a:rPr lang="en-US" dirty="0"/>
-                        <a:t>+25%</a:t>
-                      </a:r>
-                    </a:p>
-                  </a:txBody>
-                  <a:tcPr anchor="ctr"/>
-                </a:tc>
-                <a:extLst>
-                  <a:ext uri="{0D108BD9-81ED-4DB2-BD59-A6C34878D82A}">
-                    <a16:rowId xmlns:a16="http://schemas.microsoft.com/office/drawing/2014/main" val="1031597798"/>
-                  </a:ext>
-                </a:extLst>
-              </a:tr>
-              <a:tr h="556803">
-                <a:tc>
-                  <a:txBody>
-                    <a:bodyPr/>
-                    <a:lstStyle/>
-                    <a:p>
-                      <a:pPr algn="ctr"/>
-                      <a:r>
-                        <a:rPr lang="en-US" dirty="0"/>
-                        <a:t>Operating margin</a:t>
-                      </a:r>
-                    </a:p>
-                  </a:txBody>
-                  <a:tcPr anchor="ctr"/>
-                </a:tc>
-                <a:tc>
-                  <a:txBody>
-                    <a:bodyPr/>
-                    <a:lstStyle/>
-                    <a:p>
-                      <a:pPr algn="ctr"/>
-                      <a:r>
-                        <a:rPr lang="en-US" dirty="0"/>
-                        <a:t>40%</a:t>
-                      </a:r>
-                    </a:p>
-                  </a:txBody>
-                  <a:tcPr anchor="ctr"/>
-                </a:tc>
-                <a:tc>
-                  <a:txBody>
-                    <a:bodyPr/>
-                    <a:lstStyle/>
-                    <a:p>
-                      <a:pPr algn="ctr"/>
-                      <a:r>
-                        <a:rPr lang="en-US" dirty="0"/>
-                        <a:t>36%</a:t>
-                      </a:r>
-                    </a:p>
-                  </a:txBody>
-                  <a:tcPr anchor="ctr"/>
-                </a:tc>
-                <a:tc>
-                  <a:txBody>
-                    <a:bodyPr/>
-                    <a:lstStyle/>
-                    <a:p>
-                      <a:pPr algn="ctr"/>
-                      <a:r>
-                        <a:rPr lang="en-US" dirty="0"/>
-                        <a:t>+4%</a:t>
-                      </a:r>
-                    </a:p>
-                  </a:txBody>
-                  <a:tcPr anchor="ctr"/>
-                </a:tc>
-                <a:extLst>
-                  <a:ext uri="{0D108BD9-81ED-4DB2-BD59-A6C34878D82A}">
-                    <a16:rowId xmlns:a16="http://schemas.microsoft.com/office/drawing/2014/main" val="1194376521"/>
-                  </a:ext>
-                </a:extLst>
-              </a:tr>
-              <a:tr h="556803">
-                <a:tc>
-                  <a:txBody>
-                    <a:bodyPr/>
-                    <a:lstStyle/>
-                    <a:p>
-                      <a:pPr algn="ctr"/>
-                      <a:r>
-                        <a:rPr lang="en-US" dirty="0"/>
-                        <a:t>Cash reserves</a:t>
-                      </a:r>
-                    </a:p>
-                  </a:txBody>
-                  <a:tcPr anchor="ctr"/>
-                </a:tc>
-                <a:tc>
-                  <a:txBody>
-                    <a:bodyPr/>
-                    <a:lstStyle/>
-                    <a:p>
-                      <a:pPr algn="ctr"/>
-                      <a:r>
-                        <a:rPr lang="en-US" dirty="0"/>
-                        <a:t>$5,000,000	</a:t>
-                      </a:r>
-                    </a:p>
-                  </a:txBody>
-                  <a:tcPr anchor="ctr"/>
-                </a:tc>
-                <a:tc>
-                  <a:txBody>
-                    <a:bodyPr/>
-                    <a:lstStyle/>
-                    <a:p>
-                      <a:pPr algn="ctr"/>
-                      <a:r>
-                        <a:rPr lang="en-US" dirty="0"/>
-                        <a:t>$4,500,000	</a:t>
-                      </a:r>
-                    </a:p>
-                  </a:txBody>
-                  <a:tcPr anchor="ctr"/>
-                </a:tc>
-                <a:tc>
-                  <a:txBody>
-                    <a:bodyPr/>
-                    <a:lstStyle/>
-                    <a:p>
-                      <a:pPr algn="ctr"/>
-                      <a:r>
-                        <a:rPr lang="en-US" dirty="0"/>
-                        <a:t>+11%</a:t>
-                      </a:r>
-                    </a:p>
-                  </a:txBody>
-                  <a:tcPr anchor="ctr"/>
-                </a:tc>
-                <a:extLst>
-                  <a:ext uri="{0D108BD9-81ED-4DB2-BD59-A6C34878D82A}">
-                    <a16:rowId xmlns:a16="http://schemas.microsoft.com/office/drawing/2014/main" val="1918266800"/>
-                  </a:ext>
-                </a:extLst>
-              </a:tr>
-            </a:tbl>
-          </a:graphicData>
-        </a:graphic>
-      </p:graphicFrame>
-    </p:spTree>
-    <p:extLst>
-      <p:ext uri="{BB962C8B-B14F-4D97-AF65-F5344CB8AC3E}">
-        <p14:creationId xmlns:p14="http://schemas.microsoft.com/office/powerpoint/2010/main" val="3943410913"/>
-      </p:ext>
-    </p:extLst>
-  </p:cSld>
-  <p:clrMapOvr>
-    <a:masterClrMapping/>
-  </p:clrMapOvr>
-</p:sld>
-</file>
-
-<file path=ppt/slides/slide13.xml><?xml version="1.0" encoding="utf-8"?>
-<p:sld xmlns:a="http://schemas.openxmlformats.org/drawingml/2006/main" xmlns:r="http://schemas.openxmlformats.org/officeDocument/2006/relationships" xmlns:p="http://schemas.openxmlformats.org/presentationml/2006/main">
-  <p:cSld>
-    <p:spTree>
-      <p:nvGrpSpPr>
-        <p:cNvPr id="1" name=""/>
-        <p:cNvGrpSpPr/>
-        <p:nvPr/>
-      </p:nvGrpSpPr>
-      <p:grpSpPr>
-        <a:xfrm>
-          <a:off x="0" y="0"/>
-          <a:ext cx="0" cy="0"/>
-          <a:chOff x="0" y="0"/>
-          <a:chExt cx="0" cy="0"/>
-        </a:xfrm>
-      </p:grpSpPr>
-      <p:pic>
-        <p:nvPicPr>
-          <p:cNvPr id="8" name="Picture Placeholder 7" descr="A person standing on a spiral staircase">
-            <a:extLst>
-              <a:ext uri="{FF2B5EF4-FFF2-40B4-BE49-F238E27FC236}">
-                <a16:creationId xmlns:a16="http://schemas.microsoft.com/office/drawing/2014/main" id="{8519191A-B0D9-CFD8-E089-8A6ECDC4958C}"/>
-              </a:ext>
-            </a:extLst>
-          </p:cNvPr>
-          <p:cNvPicPr>
-            <a:picLocks noGrp="1" noChangeAspect="1"/>
-          </p:cNvPicPr>
-          <p:nvPr>
-            <p:ph type="pic" sz="quarter" idx="10"/>
-          </p:nvPr>
-        </p:nvPicPr>
-        <p:blipFill>
-          <a:blip r:embed="rId3">
-            <a:duotone>
-              <a:schemeClr val="accent1">
-                <a:shade val="45000"/>
-                <a:satMod val="135000"/>
-              </a:schemeClr>
-              <a:prstClr val="white"/>
-            </a:duotone>
-            <a:extLst>
-              <a:ext uri="{BEBA8EAE-BF5A-486C-A8C5-ECC9F3942E4B}">
-                <a14:imgProps xmlns:a14="http://schemas.microsoft.com/office/drawing/2010/main">
-                  <a14:imgLayer r:embed="rId4">
-                    <a14:imgEffect>
-                      <a14:brightnessContrast bright="-20000" contrast="40000"/>
-                    </a14:imgEffect>
-                  </a14:imgLayer>
-                </a14:imgProps>
-              </a:ext>
-            </a:extLst>
-          </a:blip>
-          <a:srcRect l="23" r="23"/>
-          <a:stretch/>
-        </p:blipFill>
-        <p:spPr>
-          <a:xfrm>
-            <a:off x="3523091" y="3427812"/>
-            <a:ext cx="5143494" cy="3430188"/>
-          </a:xfrm>
-        </p:spPr>
-      </p:pic>
-      <p:sp>
-        <p:nvSpPr>
-          <p:cNvPr id="3" name="Title 2">
-            <a:extLst>
-              <a:ext uri="{FF2B5EF4-FFF2-40B4-BE49-F238E27FC236}">
-                <a16:creationId xmlns:a16="http://schemas.microsoft.com/office/drawing/2014/main" id="{B27C4A00-6204-4111-3D1E-D4DFA3FA8113}"/>
-              </a:ext>
-            </a:extLst>
-          </p:cNvPr>
-          <p:cNvSpPr>
-            <a:spLocks noGrp="1"/>
-          </p:cNvSpPr>
-          <p:nvPr>
-            <p:ph type="ctrTitle"/>
-          </p:nvPr>
-        </p:nvSpPr>
-        <p:spPr>
-          <a:xfrm>
-            <a:off x="685799" y="685798"/>
-            <a:ext cx="10058400" cy="3266440"/>
-          </a:xfrm>
-        </p:spPr>
-        <p:txBody>
-          <a:bodyPr/>
-          <a:lstStyle/>
-          <a:p>
-            <a:r>
-              <a:rPr lang="en-US" dirty="0"/>
-              <a:t>Innovative solutions</a:t>
-            </a:r>
-          </a:p>
-        </p:txBody>
-      </p:sp>
-    </p:spTree>
-    <p:extLst>
-      <p:ext uri="{BB962C8B-B14F-4D97-AF65-F5344CB8AC3E}">
-        <p14:creationId xmlns:p14="http://schemas.microsoft.com/office/powerpoint/2010/main" val="1314130369"/>
-      </p:ext>
-    </p:extLst>
-  </p:cSld>
-  <p:clrMapOvr>
-    <a:masterClrMapping/>
-  </p:clrMapOvr>
-</p:sld>
-</file>
-
-<file path=ppt/slides/slide14.xml><?xml version="1.0" encoding="utf-8"?>
-<p:sld xmlns:a="http://schemas.openxmlformats.org/drawingml/2006/main" xmlns:r="http://schemas.openxmlformats.org/officeDocument/2006/relationships" xmlns:p="http://schemas.openxmlformats.org/presentationml/2006/main">
-  <p:cSld>
-    <p:spTree>
-      <p:nvGrpSpPr>
-        <p:cNvPr id="1" name=""/>
-        <p:cNvGrpSpPr/>
-        <p:nvPr/>
-      </p:nvGrpSpPr>
-      <p:grpSpPr>
-        <a:xfrm>
-          <a:off x="0" y="0"/>
-          <a:ext cx="0" cy="0"/>
-          <a:chOff x="0" y="0"/>
-          <a:chExt cx="0" cy="0"/>
-        </a:xfrm>
-      </p:grpSpPr>
-      <p:sp>
-        <p:nvSpPr>
-          <p:cNvPr id="2" name="Title 1">
-            <a:extLst>
-              <a:ext uri="{FF2B5EF4-FFF2-40B4-BE49-F238E27FC236}">
-                <a16:creationId xmlns:a16="http://schemas.microsoft.com/office/drawing/2014/main" id="{0148750B-D232-4688-407A-DAC2407E279C}"/>
-              </a:ext>
-            </a:extLst>
-          </p:cNvPr>
-          <p:cNvSpPr>
-            <a:spLocks noGrp="1"/>
-          </p:cNvSpPr>
-          <p:nvPr>
-            <p:ph type="title"/>
-          </p:nvPr>
-        </p:nvSpPr>
-        <p:spPr>
-          <a:xfrm>
-            <a:off x="677334" y="694944"/>
-            <a:ext cx="9584266" cy="1387852"/>
-          </a:xfrm>
-        </p:spPr>
-        <p:txBody>
-          <a:bodyPr/>
-          <a:lstStyle/>
-          <a:p>
-            <a:r>
-              <a:rPr lang="en-US" dirty="0"/>
-              <a:t>Future initiatives</a:t>
-            </a:r>
-          </a:p>
-        </p:txBody>
-      </p:sp>
-      <p:sp>
-        <p:nvSpPr>
-          <p:cNvPr id="11" name="Content Placeholder 10">
-            <a:extLst>
-              <a:ext uri="{FF2B5EF4-FFF2-40B4-BE49-F238E27FC236}">
-                <a16:creationId xmlns:a16="http://schemas.microsoft.com/office/drawing/2014/main" id="{56DA1357-F081-D7F6-4FB3-08E62F6C3A41}"/>
-              </a:ext>
-            </a:extLst>
-          </p:cNvPr>
-          <p:cNvSpPr>
-            <a:spLocks noGrp="1"/>
-          </p:cNvSpPr>
-          <p:nvPr>
-            <p:ph sz="quarter" idx="12"/>
-          </p:nvPr>
-        </p:nvSpPr>
-        <p:spPr>
-          <a:xfrm>
-            <a:off x="677334" y="2552698"/>
-            <a:ext cx="5964766" cy="3083217"/>
-          </a:xfrm>
-        </p:spPr>
-        <p:txBody>
-          <a:bodyPr/>
-          <a:lstStyle/>
-          <a:p>
-            <a:r>
-              <a:rPr lang="en-US" dirty="0"/>
-              <a:t>Product enhancement. Introduce regular updates and features to enhance product offerings.</a:t>
-            </a:r>
-          </a:p>
-          <a:p>
-            <a:r>
-              <a:rPr lang="en-US" dirty="0"/>
-              <a:t>Technology integration. Explore emerging technologies for potential integration into our operations.</a:t>
-            </a:r>
-          </a:p>
-          <a:p>
-            <a:r>
-              <a:rPr lang="en-US" dirty="0"/>
-              <a:t>Collaborative partnerships. Foster collaborations with tech innovators and industry leaders to drive innovation.</a:t>
-            </a:r>
-          </a:p>
-        </p:txBody>
-      </p:sp>
-      <p:sp>
-        <p:nvSpPr>
-          <p:cNvPr id="36" name="Content Placeholder 35">
-            <a:extLst>
-              <a:ext uri="{FF2B5EF4-FFF2-40B4-BE49-F238E27FC236}">
-                <a16:creationId xmlns:a16="http://schemas.microsoft.com/office/drawing/2014/main" id="{735FF7FE-86A0-34D0-5382-E2CB802957BB}"/>
-              </a:ext>
-            </a:extLst>
-          </p:cNvPr>
-          <p:cNvSpPr>
-            <a:spLocks noGrp="1"/>
-          </p:cNvSpPr>
-          <p:nvPr>
-            <p:ph sz="quarter" idx="13"/>
-          </p:nvPr>
-        </p:nvSpPr>
-        <p:spPr>
-          <a:xfrm>
-            <a:off x="7656513" y="2552699"/>
-            <a:ext cx="3842913" cy="3083216"/>
-          </a:xfrm>
-        </p:spPr>
-        <p:txBody>
-          <a:bodyPr/>
-          <a:lstStyle/>
-          <a:p>
-            <a:r>
-              <a:rPr lang="en-US" dirty="0"/>
-              <a:t>Green supply chain</a:t>
-            </a:r>
-          </a:p>
-          <a:p>
-            <a:r>
-              <a:rPr lang="en-US" dirty="0"/>
-              <a:t>Reduced carbon footprint</a:t>
-            </a:r>
-          </a:p>
-          <a:p>
-            <a:r>
-              <a:rPr lang="en-US" dirty="0"/>
-              <a:t>Waste reduction</a:t>
-            </a:r>
-          </a:p>
-          <a:p>
-            <a:r>
-              <a:rPr lang="en-US" dirty="0"/>
-              <a:t>Water conservation</a:t>
-            </a:r>
-          </a:p>
-        </p:txBody>
-      </p:sp>
-    </p:spTree>
-    <p:extLst>
-      <p:ext uri="{BB962C8B-B14F-4D97-AF65-F5344CB8AC3E}">
-        <p14:creationId xmlns:p14="http://schemas.microsoft.com/office/powerpoint/2010/main" val="2363995522"/>
-      </p:ext>
-    </p:extLst>
-  </p:cSld>
-  <p:clrMapOvr>
-    <a:masterClrMapping/>
-  </p:clrMapOvr>
-</p:sld>
-</file>
-
-<file path=ppt/slides/slide15.xml><?xml version="1.0" encoding="utf-8"?>
-<p:sld xmlns:a="http://schemas.openxmlformats.org/drawingml/2006/main" xmlns:r="http://schemas.openxmlformats.org/officeDocument/2006/relationships" xmlns:p="http://schemas.openxmlformats.org/presentationml/2006/main">
-  <p:cSld>
-    <p:spTree>
-      <p:nvGrpSpPr>
-        <p:cNvPr id="1" name=""/>
-        <p:cNvGrpSpPr/>
-        <p:nvPr/>
-      </p:nvGrpSpPr>
-      <p:grpSpPr>
-        <a:xfrm>
-          <a:off x="0" y="0"/>
-          <a:ext cx="0" cy="0"/>
-          <a:chOff x="0" y="0"/>
-          <a:chExt cx="0" cy="0"/>
-        </a:xfrm>
-      </p:grpSpPr>
-      <p:sp>
-        <p:nvSpPr>
-          <p:cNvPr id="2" name="Title 1">
-            <a:extLst>
-              <a:ext uri="{FF2B5EF4-FFF2-40B4-BE49-F238E27FC236}">
-                <a16:creationId xmlns:a16="http://schemas.microsoft.com/office/drawing/2014/main" id="{604B4EB3-85F1-8A77-09E4-9D41686BDAF4}"/>
-              </a:ext>
-            </a:extLst>
-          </p:cNvPr>
-          <p:cNvSpPr>
-            <a:spLocks noGrp="1"/>
-          </p:cNvSpPr>
-          <p:nvPr>
-            <p:ph type="ctrTitle"/>
-          </p:nvPr>
-        </p:nvSpPr>
-        <p:spPr>
-          <a:xfrm>
-            <a:off x="685800" y="685799"/>
-            <a:ext cx="10058400" cy="4572000"/>
-          </a:xfrm>
-        </p:spPr>
-        <p:txBody>
-          <a:bodyPr/>
-          <a:lstStyle/>
-          <a:p>
-            <a:r>
-              <a:rPr lang="en-US" dirty="0"/>
-              <a:t>Thank you</a:t>
-            </a:r>
-          </a:p>
-        </p:txBody>
-      </p:sp>
-      <p:sp>
-        <p:nvSpPr>
-          <p:cNvPr id="3" name="Subtitle 2">
-            <a:extLst>
-              <a:ext uri="{FF2B5EF4-FFF2-40B4-BE49-F238E27FC236}">
-                <a16:creationId xmlns:a16="http://schemas.microsoft.com/office/drawing/2014/main" id="{FB1FE37F-A983-EE97-55B3-FC18A8719DCE}"/>
-              </a:ext>
-            </a:extLst>
-          </p:cNvPr>
-          <p:cNvSpPr>
-            <a:spLocks noGrp="1"/>
-          </p:cNvSpPr>
-          <p:nvPr>
-            <p:ph type="subTitle" idx="1"/>
-          </p:nvPr>
-        </p:nvSpPr>
-        <p:spPr>
-          <a:xfrm>
-            <a:off x="685799" y="5257798"/>
-            <a:ext cx="10820397" cy="911425"/>
-          </a:xfrm>
-        </p:spPr>
-        <p:txBody>
-          <a:bodyPr>
-            <a:normAutofit/>
-          </a:bodyPr>
-          <a:lstStyle/>
-          <a:p>
-            <a:r>
-              <a:rPr lang="en-US" dirty="0"/>
-              <a:t>Sonu Jain | sjain@contoso.com | www.contoso.com</a:t>
-            </a:r>
-          </a:p>
-        </p:txBody>
-      </p:sp>
-    </p:spTree>
-    <p:extLst>
-      <p:ext uri="{BB962C8B-B14F-4D97-AF65-F5344CB8AC3E}">
-        <p14:creationId xmlns:p14="http://schemas.microsoft.com/office/powerpoint/2010/main" val="2767128779"/>
-      </p:ext>
-    </p:extLst>
-  </p:cSld>
-  <p:clrMapOvr>
-    <a:masterClrMapping/>
-  </p:clrMapOvr>
-</p:sld>
-</file>
-
 <file path=ppt/slides/slide2.xml><?xml version="1.0" encoding="utf-8"?>
 <p:sld xmlns:a="http://schemas.openxmlformats.org/drawingml/2006/main" xmlns:r="http://schemas.openxmlformats.org/officeDocument/2006/relationships" xmlns:p="http://schemas.openxmlformats.org/presentationml/2006/main">
   <p:cSld>
@@ -12613,137 +10616,6 @@
 <file path=ppt/slides/slide5.xml><?xml version="1.0" encoding="utf-8"?>
 <p:sld xmlns:a="http://schemas.openxmlformats.org/drawingml/2006/main" xmlns:r="http://schemas.openxmlformats.org/officeDocument/2006/relationships" xmlns:p="http://schemas.openxmlformats.org/presentationml/2006/main">
   <p:cSld>
-    <p:spTree>
-      <p:nvGrpSpPr>
-        <p:cNvPr id="1" name=""/>
-        <p:cNvGrpSpPr/>
-        <p:nvPr/>
-      </p:nvGrpSpPr>
-      <p:grpSpPr>
-        <a:xfrm>
-          <a:off x="0" y="0"/>
-          <a:ext cx="0" cy="0"/>
-          <a:chOff x="0" y="0"/>
-          <a:chExt cx="0" cy="0"/>
-        </a:xfrm>
-      </p:grpSpPr>
-      <p:sp>
-        <p:nvSpPr>
-          <p:cNvPr id="2" name="Title 1">
-            <a:extLst>
-              <a:ext uri="{FF2B5EF4-FFF2-40B4-BE49-F238E27FC236}">
-                <a16:creationId xmlns:a16="http://schemas.microsoft.com/office/drawing/2014/main" id="{0EFDD6A8-6FA8-F972-AAD2-741B9BF2C81A}"/>
-              </a:ext>
-            </a:extLst>
-          </p:cNvPr>
-          <p:cNvSpPr>
-            <a:spLocks noGrp="1"/>
-          </p:cNvSpPr>
-          <p:nvPr>
-            <p:ph type="ctrTitle"/>
-          </p:nvPr>
-        </p:nvSpPr>
-        <p:spPr>
-          <a:xfrm>
-            <a:off x="2283137" y="400925"/>
-            <a:ext cx="8913947" cy="4061745"/>
-          </a:xfrm>
-        </p:spPr>
-        <p:txBody>
-          <a:bodyPr anchor="b" anchorCtr="0"/>
-          <a:lstStyle/>
-          <a:p>
-            <a:r>
-              <a:rPr lang="en-US" dirty="0"/>
-              <a:t>Visual Code Explanation</a:t>
-            </a:r>
-          </a:p>
-        </p:txBody>
-      </p:sp>
-      <p:sp>
-        <p:nvSpPr>
-          <p:cNvPr id="3" name="Subtitle 2">
-            <a:extLst>
-              <a:ext uri="{FF2B5EF4-FFF2-40B4-BE49-F238E27FC236}">
-                <a16:creationId xmlns:a16="http://schemas.microsoft.com/office/drawing/2014/main" id="{CEEC6127-908D-01C6-5422-BC2838C6323F}"/>
-              </a:ext>
-            </a:extLst>
-          </p:cNvPr>
-          <p:cNvSpPr>
-            <a:spLocks noGrp="1"/>
-          </p:cNvSpPr>
-          <p:nvPr>
-            <p:ph type="subTitle" idx="1"/>
-          </p:nvPr>
-        </p:nvSpPr>
-        <p:spPr>
-          <a:xfrm>
-            <a:off x="2283140" y="4519311"/>
-            <a:ext cx="8913949" cy="1657202"/>
-          </a:xfrm>
-        </p:spPr>
-        <p:txBody>
-          <a:bodyPr anchor="t" anchorCtr="0">
-            <a:normAutofit/>
-          </a:bodyPr>
-          <a:lstStyle/>
-          <a:p>
-            <a:endParaRPr lang="en-US" dirty="0"/>
-          </a:p>
-        </p:txBody>
-      </p:sp>
-      <p:pic>
-        <p:nvPicPr>
-          <p:cNvPr id="22" name="Picture Placeholder 21" descr="A person typing on a computer">
-            <a:extLst>
-              <a:ext uri="{FF2B5EF4-FFF2-40B4-BE49-F238E27FC236}">
-                <a16:creationId xmlns:a16="http://schemas.microsoft.com/office/drawing/2014/main" id="{BB5EA285-56AA-74C5-2380-BA7A6930FA7F}"/>
-              </a:ext>
-            </a:extLst>
-          </p:cNvPr>
-          <p:cNvPicPr>
-            <a:picLocks noGrp="1" noChangeAspect="1"/>
-          </p:cNvPicPr>
-          <p:nvPr>
-            <p:ph type="pic" sz="quarter" idx="10"/>
-          </p:nvPr>
-        </p:nvPicPr>
-        <p:blipFill>
-          <a:blip r:embed="rId3">
-            <a:duotone>
-              <a:schemeClr val="accent1">
-                <a:shade val="45000"/>
-                <a:satMod val="135000"/>
-              </a:schemeClr>
-              <a:prstClr val="white"/>
-            </a:duotone>
-          </a:blip>
-          <a:srcRect l="41445" r="41445"/>
-          <a:stretch/>
-        </p:blipFill>
-        <p:spPr>
-          <a:xfrm>
-            <a:off x="2" y="972878"/>
-            <a:ext cx="1264455" cy="4926287"/>
-          </a:xfrm>
-        </p:spPr>
-      </p:pic>
-    </p:spTree>
-    <p:extLst>
-      <p:ext uri="{BB962C8B-B14F-4D97-AF65-F5344CB8AC3E}">
-        <p14:creationId xmlns:p14="http://schemas.microsoft.com/office/powerpoint/2010/main" val="3317929717"/>
-      </p:ext>
-    </p:extLst>
-  </p:cSld>
-  <p:clrMapOvr>
-    <a:masterClrMapping/>
-  </p:clrMapOvr>
-</p:sld>
-</file>
-
-<file path=ppt/slides/slide6.xml><?xml version="1.0" encoding="utf-8"?>
-<p:sld xmlns:a="http://schemas.openxmlformats.org/drawingml/2006/main" xmlns:r="http://schemas.openxmlformats.org/officeDocument/2006/relationships" xmlns:p="http://schemas.openxmlformats.org/presentationml/2006/main">
-  <p:cSld>
     <p:bg>
       <p:bgPr>
         <a:solidFill>
@@ -12873,10 +10745,18 @@
           <a:p>
             <a:r>
               <a:rPr lang="en-US" altLang="en-US" dirty="0"/>
-              <a:t>Tracks match details, betting odds, the user's selected outcome, and uses commands to update the UI through data binding. It </a:t>
-            </a:r>
-            <a:r>
-              <a:rPr lang="en-US" altLang="en-US" dirty="0" err="1"/>
+              <a:t>Tracks match details, betting odds, the user's selected outcome, and uses </a:t>
+            </a:r>
+            <a:r>
+              <a:rPr lang="en-US" altLang="en-US" b="1" dirty="0"/>
+              <a:t>commands</a:t>
+            </a:r>
+            <a:r>
+              <a:rPr lang="en-US" altLang="en-US" dirty="0"/>
+              <a:t> to update the UI through data binding. It </a:t>
+            </a:r>
+            <a:r>
+              <a:rPr lang="en-US" altLang="en-US" b="1" dirty="0" err="1"/>
               <a:t>INotifyPropertyChanged</a:t>
             </a:r>
             <a:r>
@@ -12899,7 +10779,7 @@
 </p:sld>
 </file>
 
-<file path=ppt/slides/slide7.xml><?xml version="1.0" encoding="utf-8"?>
+<file path=ppt/slides/slide6.xml><?xml version="1.0" encoding="utf-8"?>
 <p:sld xmlns:a="http://schemas.openxmlformats.org/drawingml/2006/main" xmlns:r="http://schemas.openxmlformats.org/officeDocument/2006/relationships" xmlns:p="http://schemas.openxmlformats.org/presentationml/2006/main">
   <p:cSld>
     <p:spTree>
@@ -13014,7 +10894,7 @@
 </p:sld>
 </file>
 
-<file path=ppt/slides/slide8.xml><?xml version="1.0" encoding="utf-8"?>
+<file path=ppt/slides/slide7.xml><?xml version="1.0" encoding="utf-8"?>
 <p:sld xmlns:a="http://schemas.openxmlformats.org/drawingml/2006/main" xmlns:r="http://schemas.openxmlformats.org/officeDocument/2006/relationships" xmlns:p="http://schemas.openxmlformats.org/presentationml/2006/main">
   <p:cSld>
     <p:spTree>
@@ -13075,7 +10955,27 @@
             </a:br>
             <a:r>
               <a:rPr lang="en-US" dirty="0" err="1"/>
-              <a:t>baseviewmodel.cs</a:t>
+              <a:t>betviewmodel</a:t>
+            </a:r>
+            <a:br>
+              <a:rPr lang="en-US" dirty="0"/>
+            </a:br>
+            <a:br>
+              <a:rPr lang="en-US" dirty="0"/>
+            </a:br>
+            <a:r>
+              <a:rPr lang="en-US" dirty="0" err="1"/>
+              <a:t>loginviewmodel</a:t>
+            </a:r>
+            <a:br>
+              <a:rPr lang="en-US" dirty="0"/>
+            </a:br>
+            <a:br>
+              <a:rPr lang="en-US" dirty="0"/>
+            </a:br>
+            <a:r>
+              <a:rPr lang="en-US" dirty="0" err="1"/>
+              <a:t>matchlistviewmodel</a:t>
             </a:r>
             <a:endParaRPr lang="en-US" dirty="0"/>
           </a:p>
@@ -13099,8 +10999,8 @@
         </p:nvSpPr>
         <p:spPr bwMode="auto">
           <a:xfrm>
-            <a:off x="5591336" y="553259"/>
-            <a:ext cx="4993457" cy="4017704"/>
+            <a:off x="5591336" y="553258"/>
+            <a:ext cx="5015704" cy="5692093"/>
           </a:xfrm>
           <a:prstGeom prst="rect">
             <a:avLst/>
@@ -13115,24 +11015,65 @@
           <a:p>
             <a:r>
               <a:rPr lang="en-US" b="1" dirty="0" err="1"/>
-              <a:t>baseviewmodel.cs</a:t>
-            </a:r>
-            <a:r>
-              <a:rPr lang="en-US" b="1" dirty="0"/>
+              <a:t>Betviewmodel</a:t>
+            </a:r>
+            <a:r>
+              <a:rPr lang="en-US" dirty="0"/>
               <a:t>: </a:t>
             </a:r>
             <a:r>
+              <a:rPr lang="en-US" altLang="en-US" dirty="0"/>
+              <a:t>The </a:t>
+            </a:r>
+            <a:r>
+              <a:rPr lang="en-US" altLang="en-US" dirty="0" err="1"/>
+              <a:t>BetViewModel</a:t>
+            </a:r>
+            <a:r>
+              <a:rPr lang="en-US" altLang="en-US" dirty="0"/>
+              <a:t> class retrieves a user's bets from the database and stores them in an observable collection, enabling real-time updates to the UI.</a:t>
+            </a:r>
+          </a:p>
+          <a:p>
+            <a:endParaRPr lang="en-US" altLang="en-US" dirty="0"/>
+          </a:p>
+          <a:p>
+            <a:r>
+              <a:rPr lang="en-US" altLang="en-US" b="1" dirty="0" err="1"/>
+              <a:t>Loginviewmodel</a:t>
+            </a:r>
+            <a:r>
+              <a:rPr lang="en-US" altLang="en-US" b="1" dirty="0"/>
+              <a:t>: </a:t>
+            </a:r>
+            <a:r>
               <a:rPr lang="en-US" dirty="0"/>
-              <a:t>its main purpose is to support data binding between the </a:t>
-            </a:r>
-            <a:r>
-              <a:rPr lang="en-US" dirty="0" err="1"/>
-              <a:t>ViewModel</a:t>
+              <a:t>handles user authentication and registration by validating credentials through the database service that I create using azure.</a:t>
+            </a:r>
+          </a:p>
+          <a:p>
+            <a:endParaRPr lang="en-US" altLang="en-US" b="1" dirty="0"/>
+          </a:p>
+          <a:p>
+            <a:r>
+              <a:rPr lang="en-US" altLang="en-US" b="1" dirty="0" err="1"/>
+              <a:t>Matchlistviewmodel</a:t>
+            </a:r>
+            <a:r>
+              <a:rPr lang="en-US" altLang="en-US" b="1" dirty="0"/>
+              <a:t>: </a:t>
             </a:r>
             <a:r>
               <a:rPr lang="en-US" dirty="0"/>
-              <a:t> and the UI.</a:t>
-            </a:r>
+              <a:t>retrieves a list of upcoming soccer matches with betting odds, manages user interaction for selecting outcomes and placing bets, and updates the UI accordingly</a:t>
+            </a:r>
+            <a:endParaRPr lang="en-US" altLang="en-US" b="1" dirty="0"/>
+          </a:p>
+          <a:p>
+            <a:endParaRPr lang="en-US" altLang="en-US" dirty="0"/>
+          </a:p>
+          <a:p>
+            <a:endParaRPr lang="en-US" dirty="0"/>
           </a:p>
           <a:p>
             <a:endParaRPr lang="en-US" altLang="en-US" dirty="0"/>
@@ -13143,6 +11084,205 @@
     <p:extLst>
       <p:ext uri="{BB962C8B-B14F-4D97-AF65-F5344CB8AC3E}">
         <p14:creationId xmlns:p14="http://schemas.microsoft.com/office/powerpoint/2010/main" val="3403845436"/>
+      </p:ext>
+    </p:extLst>
+  </p:cSld>
+  <p:clrMapOvr>
+    <a:masterClrMapping/>
+  </p:clrMapOvr>
+</p:sld>
+</file>
+
+<file path=ppt/slides/slide8.xml><?xml version="1.0" encoding="utf-8"?>
+<p:sld xmlns:a="http://schemas.openxmlformats.org/drawingml/2006/main" xmlns:r="http://schemas.openxmlformats.org/officeDocument/2006/relationships" xmlns:p="http://schemas.openxmlformats.org/presentationml/2006/main">
+  <p:cSld>
+    <p:spTree>
+      <p:nvGrpSpPr>
+        <p:cNvPr id="1" name="">
+          <a:extLst>
+            <a:ext uri="{FF2B5EF4-FFF2-40B4-BE49-F238E27FC236}">
+              <a16:creationId xmlns:a16="http://schemas.microsoft.com/office/drawing/2014/main" id="{164F58DE-0ACB-9856-A366-2961FB5AA828}"/>
+            </a:ext>
+          </a:extLst>
+        </p:cNvPr>
+        <p:cNvGrpSpPr/>
+        <p:nvPr/>
+      </p:nvGrpSpPr>
+      <p:grpSpPr>
+        <a:xfrm>
+          <a:off x="0" y="0"/>
+          <a:ext cx="0" cy="0"/>
+          <a:chOff x="0" y="0"/>
+          <a:chExt cx="0" cy="0"/>
+        </a:xfrm>
+      </p:grpSpPr>
+      <p:sp>
+        <p:nvSpPr>
+          <p:cNvPr id="2" name="Title 1">
+            <a:extLst>
+              <a:ext uri="{FF2B5EF4-FFF2-40B4-BE49-F238E27FC236}">
+                <a16:creationId xmlns:a16="http://schemas.microsoft.com/office/drawing/2014/main" id="{C51CEE0A-55A4-E0F1-B14C-4D117D60FEE2}"/>
+              </a:ext>
+            </a:extLst>
+          </p:cNvPr>
+          <p:cNvSpPr>
+            <a:spLocks noGrp="1"/>
+          </p:cNvSpPr>
+          <p:nvPr>
+            <p:ph type="title"/>
+          </p:nvPr>
+        </p:nvSpPr>
+        <p:spPr>
+          <a:noFill/>
+        </p:spPr>
+        <p:txBody>
+          <a:bodyPr>
+            <a:noAutofit/>
+          </a:bodyPr>
+          <a:lstStyle/>
+          <a:p>
+            <a:pPr algn="ctr"/>
+            <a:r>
+              <a:rPr lang="en-US" dirty="0"/>
+              <a:t>Services</a:t>
+            </a:r>
+            <a:br>
+              <a:rPr lang="en-US" dirty="0"/>
+            </a:br>
+            <a:endParaRPr lang="en-US" dirty="0"/>
+          </a:p>
+        </p:txBody>
+      </p:sp>
+      <p:sp>
+        <p:nvSpPr>
+          <p:cNvPr id="10" name="Rectangle 7">
+            <a:extLst>
+              <a:ext uri="{FF2B5EF4-FFF2-40B4-BE49-F238E27FC236}">
+                <a16:creationId xmlns:a16="http://schemas.microsoft.com/office/drawing/2014/main" id="{FE48C467-7FC8-EA86-8A28-36EE472D15A4}"/>
+              </a:ext>
+            </a:extLst>
+          </p:cNvPr>
+          <p:cNvSpPr>
+            <a:spLocks noGrp="1" noChangeArrowheads="1"/>
+          </p:cNvSpPr>
+          <p:nvPr>
+            <p:ph idx="1"/>
+          </p:nvPr>
+        </p:nvSpPr>
+        <p:spPr bwMode="auto">
+          <a:xfrm>
+            <a:off x="5591336" y="553258"/>
+            <a:ext cx="5015704" cy="5692093"/>
+          </a:xfrm>
+          <a:prstGeom prst="rect">
+            <a:avLst/>
+          </a:prstGeom>
+          <a:noFill/>
+        </p:spPr>
+        <p:txBody>
+          <a:bodyPr vert="horz" lIns="0" tIns="0" rIns="0" bIns="0" rtlCol="0" anchor="t" anchorCtr="0">
+            <a:normAutofit fontScale="92500"/>
+          </a:bodyPr>
+          <a:lstStyle/>
+          <a:p>
+            <a:r>
+              <a:rPr lang="en-US" b="1" dirty="0" err="1"/>
+              <a:t>Azuresqlservice</a:t>
+            </a:r>
+            <a:r>
+              <a:rPr lang="en-US" b="1" dirty="0"/>
+              <a:t>: </a:t>
+            </a:r>
+            <a:r>
+              <a:rPr lang="en-US" dirty="0"/>
+              <a:t>manages all interactions with the Azure SQL database, includes user authentication, registration, bet placement, and retrieval of user bets, providing secure and asynchronous database operations for the backend of the soccer betting app.</a:t>
+            </a:r>
+            <a:endParaRPr lang="en-US" altLang="en-US" b="1" dirty="0"/>
+          </a:p>
+          <a:p>
+            <a:r>
+              <a:rPr lang="en-US" altLang="en-US" b="1" dirty="0" err="1"/>
+              <a:t>Servicehelper</a:t>
+            </a:r>
+            <a:r>
+              <a:rPr lang="en-US" altLang="en-US" dirty="0"/>
+              <a:t>: class to retrieve instances of </a:t>
+            </a:r>
+            <a:r>
+              <a:rPr lang="en-US" altLang="en-US" dirty="0" err="1"/>
+              <a:t>AzureSqlService</a:t>
+            </a:r>
+            <a:r>
+              <a:rPr lang="en-US" altLang="en-US" dirty="0"/>
+              <a:t> and </a:t>
+            </a:r>
+            <a:r>
+              <a:rPr lang="en-US" altLang="en-US" dirty="0" err="1"/>
+              <a:t>UserService</a:t>
+            </a:r>
+            <a:r>
+              <a:rPr lang="en-US" altLang="en-US" dirty="0"/>
+              <a:t> in my </a:t>
+            </a:r>
+            <a:r>
+              <a:rPr lang="en-US" altLang="en-US" dirty="0" err="1"/>
+              <a:t>matchlistviewmodel.cs</a:t>
+            </a:r>
+            <a:r>
+              <a:rPr lang="en-US" altLang="en-US" dirty="0"/>
+              <a:t>.</a:t>
+            </a:r>
+          </a:p>
+          <a:p>
+            <a:r>
+              <a:rPr lang="en-US" altLang="en-US" b="1" dirty="0" err="1"/>
+              <a:t>Soccerapiservice</a:t>
+            </a:r>
+            <a:r>
+              <a:rPr lang="en-US" altLang="en-US" b="1" dirty="0"/>
+              <a:t>: </a:t>
+            </a:r>
+            <a:r>
+              <a:rPr lang="en-US" dirty="0"/>
+              <a:t>retrieves soccer match data and betting odds from a remote SportMonks API, deserializes the response into model objects, and maps key odds (Home, Draw, Away) to each match</a:t>
+            </a:r>
+          </a:p>
+          <a:p>
+            <a:r>
+              <a:rPr lang="en-US" altLang="en-US" b="1" dirty="0" err="1"/>
+              <a:t>Userservice</a:t>
+            </a:r>
+            <a:r>
+              <a:rPr lang="en-US" altLang="en-US" b="1" dirty="0"/>
+              <a:t>: </a:t>
+            </a:r>
+            <a:r>
+              <a:rPr lang="en-US" dirty="0"/>
+              <a:t>manages the current user session by simulating login functionality, storing user data in memory.</a:t>
+            </a:r>
+            <a:endParaRPr lang="en-US" altLang="en-US" b="1" dirty="0"/>
+          </a:p>
+          <a:p>
+            <a:r>
+              <a:rPr lang="en-US" altLang="en-US" dirty="0"/>
+              <a:t> </a:t>
+            </a:r>
+          </a:p>
+          <a:p>
+            <a:endParaRPr lang="en-US" altLang="en-US" dirty="0"/>
+          </a:p>
+          <a:p>
+            <a:endParaRPr lang="en-US" dirty="0"/>
+          </a:p>
+          <a:p>
+            <a:endParaRPr lang="en-US" altLang="en-US" dirty="0"/>
+          </a:p>
+        </p:txBody>
+      </p:sp>
+    </p:spTree>
+    <p:extLst>
+      <p:ext uri="{BB962C8B-B14F-4D97-AF65-F5344CB8AC3E}">
+        <p14:creationId xmlns:p14="http://schemas.microsoft.com/office/powerpoint/2010/main" val="1496076191"/>
       </p:ext>
     </p:extLst>
   </p:cSld>
@@ -13171,10 +11311,10 @@
       </p:grpSpPr>
       <p:sp>
         <p:nvSpPr>
-          <p:cNvPr id="3" name="Title 2">
+          <p:cNvPr id="2" name="Title 1">
             <a:extLst>
               <a:ext uri="{FF2B5EF4-FFF2-40B4-BE49-F238E27FC236}">
-                <a16:creationId xmlns:a16="http://schemas.microsoft.com/office/drawing/2014/main" id="{5539E868-C38F-BE6F-C489-F81E4EA421B8}"/>
+                <a16:creationId xmlns:a16="http://schemas.microsoft.com/office/drawing/2014/main" id="{604B4EB3-85F1-8A77-09E4-9D41686BDAF4}"/>
               </a:ext>
             </a:extLst>
           </p:cNvPr>
@@ -13182,13 +11322,13 @@
             <a:spLocks noGrp="1"/>
           </p:cNvSpPr>
           <p:nvPr>
-            <p:ph type="title"/>
+            <p:ph type="ctrTitle"/>
           </p:nvPr>
         </p:nvSpPr>
         <p:spPr>
           <a:xfrm>
-            <a:off x="677334" y="694944"/>
-            <a:ext cx="5880629" cy="1690444"/>
+            <a:off x="685800" y="685799"/>
+            <a:ext cx="10058400" cy="4572000"/>
           </a:xfrm>
         </p:spPr>
         <p:txBody>
@@ -13197,17 +11337,17 @@
           <a:p>
             <a:r>
               <a:rPr lang="en-US" dirty="0"/>
-              <a:t>Marketing strategies</a:t>
+              <a:t>Thank you</a:t>
             </a:r>
           </a:p>
         </p:txBody>
       </p:sp>
       <p:sp>
         <p:nvSpPr>
-          <p:cNvPr id="2" name="Content Placeholder 1">
+          <p:cNvPr id="3" name="Subtitle 2">
             <a:extLst>
               <a:ext uri="{FF2B5EF4-FFF2-40B4-BE49-F238E27FC236}">
-                <a16:creationId xmlns:a16="http://schemas.microsoft.com/office/drawing/2014/main" id="{4AF53888-D548-07B3-4DD3-A6B963163C0C}"/>
+                <a16:creationId xmlns:a16="http://schemas.microsoft.com/office/drawing/2014/main" id="{FB1FE37F-A983-EE97-55B3-FC18A8719DCE}"/>
               </a:ext>
             </a:extLst>
           </p:cNvPr>
@@ -13215,92 +11355,29 @@
             <a:spLocks noGrp="1"/>
           </p:cNvSpPr>
           <p:nvPr>
-            <p:ph idx="14"/>
+            <p:ph type="subTitle" idx="1"/>
           </p:nvPr>
         </p:nvSpPr>
         <p:spPr>
           <a:xfrm>
-            <a:off x="677334" y="2476239"/>
-            <a:ext cx="5880629" cy="3237948"/>
+            <a:off x="685799" y="5257798"/>
+            <a:ext cx="10820397" cy="911425"/>
           </a:xfrm>
         </p:spPr>
         <p:txBody>
-          <a:bodyPr/>
+          <a:bodyPr>
+            <a:normAutofit/>
+          </a:bodyPr>
           <a:lstStyle/>
           <a:p>
-            <a:r>
-              <a:rPr lang="en-US" dirty="0"/>
-              <a:t>Implement personalized engagement strategies</a:t>
-            </a:r>
-          </a:p>
-          <a:p>
-            <a:r>
-              <a:rPr lang="en-US" dirty="0"/>
-              <a:t>Tailor campaigns to resonate with specific demographics, fostering a sense of relevance and connection</a:t>
-            </a:r>
-          </a:p>
-          <a:p>
-            <a:r>
-              <a:rPr lang="en-US" dirty="0"/>
-              <a:t>Collaborate with influencers and thought leaders to amplify our brand message</a:t>
-            </a:r>
-          </a:p>
-          <a:p>
             <a:endParaRPr lang="en-US" dirty="0"/>
           </a:p>
         </p:txBody>
       </p:sp>
-      <p:pic>
-        <p:nvPicPr>
-          <p:cNvPr id="11" name="Picture Placeholder 10" descr="A person writing on a glass board">
-            <a:extLst>
-              <a:ext uri="{FF2B5EF4-FFF2-40B4-BE49-F238E27FC236}">
-                <a16:creationId xmlns:a16="http://schemas.microsoft.com/office/drawing/2014/main" id="{D78464A7-BA23-769A-56AD-2AE7CBC9CF8B}"/>
-              </a:ext>
-            </a:extLst>
-          </p:cNvPr>
-          <p:cNvPicPr>
-            <a:picLocks noGrp="1" noChangeAspect="1"/>
-          </p:cNvPicPr>
-          <p:nvPr>
-            <p:ph type="pic" sz="quarter" idx="15"/>
-          </p:nvPr>
-        </p:nvPicPr>
-        <p:blipFill>
-          <a:blip r:embed="rId3">
-            <a:duotone>
-              <a:schemeClr val="accent1">
-                <a:shade val="45000"/>
-                <a:satMod val="135000"/>
-              </a:schemeClr>
-              <a:prstClr val="white"/>
-            </a:duotone>
-            <a:extLst>
-              <a:ext uri="{BEBA8EAE-BF5A-486C-A8C5-ECC9F3942E4B}">
-                <a14:imgProps xmlns:a14="http://schemas.microsoft.com/office/drawing/2010/main">
-                  <a14:imgLayer r:embed="rId4">
-                    <a14:imgEffect>
-                      <a14:brightnessContrast bright="-20000"/>
-                    </a14:imgEffect>
-                  </a14:imgLayer>
-                </a14:imgProps>
-              </a:ext>
-            </a:extLst>
-          </a:blip>
-          <a:srcRect l="24873" r="24873"/>
-          <a:stretch/>
-        </p:blipFill>
-        <p:spPr>
-          <a:xfrm>
-            <a:off x="7018338" y="0"/>
-            <a:ext cx="5173662" cy="6858000"/>
-          </a:xfrm>
-        </p:spPr>
-      </p:pic>
     </p:spTree>
     <p:extLst>
       <p:ext uri="{BB962C8B-B14F-4D97-AF65-F5344CB8AC3E}">
-        <p14:creationId xmlns:p14="http://schemas.microsoft.com/office/powerpoint/2010/main" val="2203045136"/>
+        <p14:creationId xmlns:p14="http://schemas.microsoft.com/office/powerpoint/2010/main" val="2767128779"/>
       </p:ext>
     </p:extLst>
   </p:cSld>

</xml_diff>